<commit_message>
removed file that was not part of this project.
</commit_message>
<xml_diff>
--- a/Depression and Poverty.pptx
+++ b/Depression and Poverty.pptx
@@ -159,13 +159,37 @@
 <file path=ppt/revisionInfo.xml><?xml version="1.0" encoding="utf-8"?>
 <p1510:revInfo xmlns:a="http://schemas.openxmlformats.org/drawingml/2006/main" xmlns:r="http://schemas.openxmlformats.org/officeDocument/2006/relationships" xmlns:p1510="http://schemas.microsoft.com/office/powerpoint/2015/10/main">
   <p1510:revLst>
-    <p1510:client id="{A86D79B3-C284-41A8-B44B-358A997353BD}" v="1" dt="2022-10-22T06:47:57.607"/>
+    <p1510:client id="{90D4A433-95B9-4F5E-B3D6-EAA0E7AE3F32}" v="1" dt="2022-10-23T08:26:54.908"/>
   </p1510:revLst>
 </p1510:revInfo>
 </file>
 
 <file path=ppt/changesInfos/changesInfo1.xml><?xml version="1.0" encoding="utf-8"?>
 <pc:chgInfo xmlns:a="http://schemas.openxmlformats.org/drawingml/2006/main" xmlns:r="http://schemas.openxmlformats.org/officeDocument/2006/relationships" xmlns:ac="http://schemas.microsoft.com/office/drawing/2013/main/command" xmlns:pc="http://schemas.microsoft.com/office/powerpoint/2013/main/command">
+  <pc:docChgLst>
+    <pc:chgData name="Daniel Lagos" userId="e08ab8c445020617" providerId="LiveId" clId="{90D4A433-95B9-4F5E-B3D6-EAA0E7AE3F32}"/>
+    <pc:docChg chg="custSel modSld">
+      <pc:chgData name="Daniel Lagos" userId="e08ab8c445020617" providerId="LiveId" clId="{90D4A433-95B9-4F5E-B3D6-EAA0E7AE3F32}" dt="2022-10-23T08:26:57.390" v="9" actId="27636"/>
+      <pc:docMkLst>
+        <pc:docMk/>
+      </pc:docMkLst>
+      <pc:sldChg chg="modSp mod">
+        <pc:chgData name="Daniel Lagos" userId="e08ab8c445020617" providerId="LiveId" clId="{90D4A433-95B9-4F5E-B3D6-EAA0E7AE3F32}" dt="2022-10-23T08:26:57.390" v="9" actId="27636"/>
+        <pc:sldMkLst>
+          <pc:docMk/>
+          <pc:sldMk cId="2803136203" sldId="277"/>
+        </pc:sldMkLst>
+        <pc:spChg chg="mod">
+          <ac:chgData name="Daniel Lagos" userId="e08ab8c445020617" providerId="LiveId" clId="{90D4A433-95B9-4F5E-B3D6-EAA0E7AE3F32}" dt="2022-10-23T08:26:57.390" v="9" actId="27636"/>
+          <ac:spMkLst>
+            <pc:docMk/>
+            <pc:sldMk cId="2803136203" sldId="277"/>
+            <ac:spMk id="3" creationId="{616351BD-4BE1-47AD-8B65-1472A3BE63E4}"/>
+          </ac:spMkLst>
+        </pc:spChg>
+      </pc:sldChg>
+    </pc:docChg>
+  </pc:docChgLst>
   <pc:docChgLst>
     <pc:chgData name="Daniel Lagos" userId="e08ab8c445020617" providerId="LiveId" clId="{A86D79B3-C284-41A8-B44B-358A997353BD}"/>
     <pc:docChg chg="custSel modSld">
@@ -275,7 +299,7 @@
           <a:p>
             <a:fld id="{181EC09C-9CDC-48F0-BB82-ED223F986966}" type="datetimeFigureOut">
               <a:rPr lang="en-US" smtClean="0"/>
-              <a:t>10/21/2022</a:t>
+              <a:t>10/23/2022</a:t>
             </a:fld>
             <a:endParaRPr lang="en-US" dirty="0"/>
           </a:p>
@@ -769,7 +793,7 @@
           <a:p>
             <a:fld id="{9D874152-028B-486A-9CCC-467A5536A7DC}" type="datetime1">
               <a:rPr lang="en-US" smtClean="0"/>
-              <a:t>10/21/2022</a:t>
+              <a:t>10/23/2022</a:t>
             </a:fld>
             <a:endParaRPr lang="en-US" dirty="0"/>
           </a:p>
@@ -1097,7 +1121,7 @@
           <a:p>
             <a:fld id="{8A1558FF-9F53-4DAD-84A1-1EEE4F190FF1}" type="datetime1">
               <a:rPr lang="en-US" smtClean="0"/>
-              <a:t>10/21/2022</a:t>
+              <a:t>10/23/2022</a:t>
             </a:fld>
             <a:endParaRPr lang="en-US" dirty="0"/>
           </a:p>
@@ -1370,7 +1394,7 @@
           <a:p>
             <a:fld id="{A78FA1A6-D89D-4E0B-ACDC-F92429034F56}" type="datetime1">
               <a:rPr lang="en-US" smtClean="0"/>
-              <a:t>10/21/2022</a:t>
+              <a:t>10/23/2022</a:t>
             </a:fld>
             <a:endParaRPr lang="en-US" dirty="0"/>
           </a:p>
@@ -1933,7 +1957,7 @@
           <a:p>
             <a:fld id="{8BA382F0-6EA8-4D82-951F-1579D6A93CC4}" type="datetime1">
               <a:rPr lang="en-US" smtClean="0"/>
-              <a:t>10/21/2022</a:t>
+              <a:t>10/23/2022</a:t>
             </a:fld>
             <a:endParaRPr lang="en-US" dirty="0"/>
           </a:p>
@@ -2206,7 +2230,7 @@
           <a:p>
             <a:fld id="{CDBE913C-F349-4CE3-A910-0EA13427FE0D}" type="datetime1">
               <a:rPr lang="en-US" smtClean="0"/>
-              <a:t>10/21/2022</a:t>
+              <a:t>10/23/2022</a:t>
             </a:fld>
             <a:endParaRPr lang="en-US" dirty="0"/>
           </a:p>
@@ -2763,7 +2787,7 @@
           <a:p>
             <a:fld id="{70D4C5C7-4D27-4EBE-9DB8-92F5F0F40B34}" type="datetime1">
               <a:rPr lang="en-US" smtClean="0"/>
-              <a:t>10/21/2022</a:t>
+              <a:t>10/23/2022</a:t>
             </a:fld>
             <a:endParaRPr lang="en-US" dirty="0"/>
           </a:p>
@@ -3085,7 +3109,7 @@
           <a:p>
             <a:fld id="{B6CDAF82-EDB2-4FBF-83F4-247A1B3455CB}" type="datetime1">
               <a:rPr lang="en-US" smtClean="0"/>
-              <a:t>10/21/2022</a:t>
+              <a:t>10/23/2022</a:t>
             </a:fld>
             <a:endParaRPr lang="en-US" dirty="0"/>
           </a:p>
@@ -3257,7 +3281,7 @@
           <a:p>
             <a:fld id="{2D5E59DB-4C5A-44A3-897C-FF6803F94296}" type="datetime1">
               <a:rPr lang="en-US" smtClean="0"/>
-              <a:t>10/21/2022</a:t>
+              <a:t>10/23/2022</a:t>
             </a:fld>
             <a:endParaRPr lang="en-US" dirty="0"/>
           </a:p>
@@ -3488,7 +3512,7 @@
           <a:p>
             <a:fld id="{E9F6B6E0-E0F8-4800-BD74-7D33DFE5ED7E}" type="datetime1">
               <a:rPr lang="en-US" smtClean="0"/>
-              <a:t>10/21/2022</a:t>
+              <a:t>10/23/2022</a:t>
             </a:fld>
             <a:endParaRPr lang="en-US" dirty="0"/>
           </a:p>
@@ -3682,7 +3706,7 @@
           <a:p>
             <a:fld id="{6E6DC824-D0E7-4046-8B44-4AAD1C4DE2CF}" type="datetime1">
               <a:rPr lang="en-US" smtClean="0"/>
-              <a:t>10/21/2022</a:t>
+              <a:t>10/23/2022</a:t>
             </a:fld>
             <a:endParaRPr lang="en-US" dirty="0"/>
           </a:p>
@@ -3953,7 +3977,7 @@
           <a:p>
             <a:fld id="{FEFC221C-17A4-4F42-9F54-9F7E03AA1BBB}" type="datetime1">
               <a:rPr lang="en-US" smtClean="0"/>
-              <a:t>10/21/2022</a:t>
+              <a:t>10/23/2022</a:t>
             </a:fld>
             <a:endParaRPr lang="en-US" dirty="0"/>
           </a:p>
@@ -4212,7 +4236,7 @@
           <a:p>
             <a:fld id="{38CD7CBA-5256-42F3-BAB5-33F095514AE3}" type="datetime1">
               <a:rPr lang="en-US" smtClean="0"/>
-              <a:t>10/21/2022</a:t>
+              <a:t>10/23/2022</a:t>
             </a:fld>
             <a:endParaRPr lang="en-US" dirty="0"/>
           </a:p>
@@ -4579,7 +4603,7 @@
           <a:p>
             <a:fld id="{8EB80C04-2E33-403B-B014-7E203A57326C}" type="datetime1">
               <a:rPr lang="en-US" smtClean="0"/>
-              <a:t>10/21/2022</a:t>
+              <a:t>10/23/2022</a:t>
             </a:fld>
             <a:endParaRPr lang="en-US" dirty="0"/>
           </a:p>
@@ -4722,7 +4746,7 @@
           <a:p>
             <a:fld id="{8C92A49D-7D7F-4D69-A8AA-65D6B58C15F2}" type="datetime1">
               <a:rPr lang="en-US" smtClean="0"/>
-              <a:t>10/21/2022</a:t>
+              <a:t>10/23/2022</a:t>
             </a:fld>
             <a:endParaRPr lang="en-US" dirty="0"/>
           </a:p>
@@ -4843,7 +4867,7 @@
           <a:p>
             <a:fld id="{09E02903-36C1-4F6B-9F27-EA2305255204}" type="datetime1">
               <a:rPr lang="en-US" smtClean="0"/>
-              <a:t>10/21/2022</a:t>
+              <a:t>10/23/2022</a:t>
             </a:fld>
             <a:endParaRPr lang="en-US" dirty="0"/>
           </a:p>
@@ -5122,7 +5146,7 @@
           <a:p>
             <a:fld id="{2E8BBFA8-C775-4121-A7F6-6851C8035873}" type="datetime1">
               <a:rPr lang="en-US" smtClean="0"/>
-              <a:t>10/21/2022</a:t>
+              <a:t>10/23/2022</a:t>
             </a:fld>
             <a:endParaRPr lang="en-US" dirty="0"/>
           </a:p>
@@ -5440,7 +5464,7 @@
           <a:p>
             <a:fld id="{6EC01760-8EEC-4A4C-BD0D-3CDAAA80A266}" type="datetime1">
               <a:rPr lang="en-US" smtClean="0"/>
-              <a:t>10/21/2022</a:t>
+              <a:t>10/23/2022</a:t>
             </a:fld>
             <a:endParaRPr lang="en-US" dirty="0"/>
           </a:p>
@@ -5648,7 +5672,7 @@
           <a:p>
             <a:fld id="{B183DE74-4CAD-4852-95E7-A055FD779420}" type="datetime1">
               <a:rPr lang="en-US" smtClean="0"/>
-              <a:t>10/21/2022</a:t>
+              <a:t>10/23/2022</a:t>
             </a:fld>
             <a:endParaRPr lang="en-US" dirty="0"/>
           </a:p>
@@ -6331,7 +6355,7 @@
         </p:spPr>
         <p:txBody>
           <a:bodyPr>
-            <a:normAutofit fontScale="92500" lnSpcReduction="20000"/>
+            <a:normAutofit fontScale="92500" lnSpcReduction="10000"/>
           </a:bodyPr>
           <a:lstStyle/>
           <a:p>
@@ -6352,22 +6376,18 @@
             <a:pPr algn="ctr"/>
             <a:r>
               <a:rPr lang="en-US" dirty="0"/>
-              <a:t>October 16, 2022</a:t>
+              <a:t>October 23, 2022</a:t>
             </a:r>
           </a:p>
           <a:p>
             <a:pPr algn="ctr"/>
             <a:r>
-              <a:rPr lang="en-US" dirty="0">
+              <a:rPr lang="en-US">
                 <a:hlinkClick r:id="rId2"/>
               </a:rPr>
-              <a:t>https://github.com/danlagos/ANA500-Week-3</a:t>
-            </a:r>
-            <a:endParaRPr lang="en-US" dirty="0"/>
-          </a:p>
-          <a:p>
-            <a:pPr algn="ctr"/>
-            <a:endParaRPr lang="en-US" dirty="0"/>
+              <a:t>https://github.com/danlagos/ANA500-Week-4</a:t>
+            </a:r>
+            <a:endParaRPr lang="en-US"/>
           </a:p>
         </p:txBody>
       </p:sp>
@@ -15089,14 +15109,6 @@
 </file>
 
 <file path=customXml/item1.xml><?xml version="1.0" encoding="utf-8"?>
-<p:properties xmlns:p="http://schemas.microsoft.com/office/2006/metadata/properties" xmlns:xsi="http://www.w3.org/2001/XMLSchema-instance" xmlns:pc="http://schemas.microsoft.com/office/infopath/2007/PartnerControls">
-  <documentManagement>
-    <MediaServiceKeyPoints xmlns="71af3243-3dd4-4a8d-8c0d-dd76da1f02a5" xsi:nil="true"/>
-  </documentManagement>
-</p:properties>
-</file>
-
-<file path=customXml/item2.xml><?xml version="1.0" encoding="utf-8"?>
 <ct:contentTypeSchema xmlns:ct="http://schemas.microsoft.com/office/2006/metadata/contentType" xmlns:ma="http://schemas.microsoft.com/office/2006/metadata/properties/metaAttributes" ct:_="" ma:_="" ma:contentTypeName="Document" ma:contentTypeID="0x01010079F111ED35F8CC479449609E8A0923A6" ma:contentTypeVersion="11" ma:contentTypeDescription="Create a new document." ma:contentTypeScope="" ma:versionID="9677210f24a1be23c92c90fd886aa0aa">
   <xsd:schema xmlns:xsd="http://www.w3.org/2001/XMLSchema" xmlns:xs="http://www.w3.org/2001/XMLSchema" xmlns:p="http://schemas.microsoft.com/office/2006/metadata/properties" xmlns:ns2="71af3243-3dd4-4a8d-8c0d-dd76da1f02a5" xmlns:ns3="16c05727-aa75-4e4a-9b5f-8a80a1165891" targetNamespace="http://schemas.microsoft.com/office/2006/metadata/properties" ma:root="true" ma:fieldsID="60e05723c5c1908df1a1a4ebf11d344e" ns2:_="" ns3:_="">
     <xsd:import namespace="71af3243-3dd4-4a8d-8c0d-dd76da1f02a5"/>
@@ -15307,7 +15319,7 @@
 </ct:contentTypeSchema>
 </file>
 
-<file path=customXml/item3.xml><?xml version="1.0" encoding="utf-8"?>
+<file path=customXml/item2.xml><?xml version="1.0" encoding="utf-8"?>
 <?mso-contentType ?>
 <FormTemplates xmlns="http://schemas.microsoft.com/sharepoint/v3/contenttype/forms">
   <Display>DocumentLibraryForm</Display>
@@ -15316,17 +15328,15 @@
 </FormTemplates>
 </file>
 
-<file path=customXml/itemProps1.xml><?xml version="1.0" encoding="utf-8"?>
-<ds:datastoreItem xmlns:ds="http://schemas.openxmlformats.org/officeDocument/2006/customXml" ds:itemID="{B26D5668-1971-40BB-BC7C-94C9B101AAB7}">
-  <ds:schemaRefs>
-    <ds:schemaRef ds:uri="http://schemas.microsoft.com/office/2006/metadata/properties"/>
-    <ds:schemaRef ds:uri="http://schemas.microsoft.com/office/infopath/2007/PartnerControls"/>
-    <ds:schemaRef ds:uri="71af3243-3dd4-4a8d-8c0d-dd76da1f02a5"/>
-  </ds:schemaRefs>
-</ds:datastoreItem>
+<file path=customXml/item3.xml><?xml version="1.0" encoding="utf-8"?>
+<p:properties xmlns:p="http://schemas.microsoft.com/office/2006/metadata/properties" xmlns:xsi="http://www.w3.org/2001/XMLSchema-instance" xmlns:pc="http://schemas.microsoft.com/office/infopath/2007/PartnerControls">
+  <documentManagement>
+    <MediaServiceKeyPoints xmlns="71af3243-3dd4-4a8d-8c0d-dd76da1f02a5" xsi:nil="true"/>
+  </documentManagement>
+</p:properties>
 </file>
 
-<file path=customXml/itemProps2.xml><?xml version="1.0" encoding="utf-8"?>
+<file path=customXml/itemProps1.xml><?xml version="1.0" encoding="utf-8"?>
 <ds:datastoreItem xmlns:ds="http://schemas.openxmlformats.org/officeDocument/2006/customXml" ds:itemID="{3370F4A1-FC59-4361-989F-6C79533DA565}">
   <ds:schemaRefs>
     <ds:schemaRef ds:uri="http://schemas.microsoft.com/office/2006/metadata/contentType"/>
@@ -15345,10 +15355,20 @@
 </ds:datastoreItem>
 </file>
 
-<file path=customXml/itemProps3.xml><?xml version="1.0" encoding="utf-8"?>
+<file path=customXml/itemProps2.xml><?xml version="1.0" encoding="utf-8"?>
 <ds:datastoreItem xmlns:ds="http://schemas.openxmlformats.org/officeDocument/2006/customXml" ds:itemID="{FE57094B-4684-420B-AFE0-4E41CA2AF714}">
   <ds:schemaRefs>
     <ds:schemaRef ds:uri="http://schemas.microsoft.com/sharepoint/v3/contenttype/forms"/>
   </ds:schemaRefs>
 </ds:datastoreItem>
+</file>
+
+<file path=customXml/itemProps3.xml><?xml version="1.0" encoding="utf-8"?>
+<ds:datastoreItem xmlns:ds="http://schemas.openxmlformats.org/officeDocument/2006/customXml" ds:itemID="{B26D5668-1971-40BB-BC7C-94C9B101AAB7}">
+  <ds:schemaRefs>
+    <ds:schemaRef ds:uri="http://schemas.microsoft.com/office/2006/metadata/properties"/>
+    <ds:schemaRef ds:uri="http://schemas.microsoft.com/office/infopath/2007/PartnerControls"/>
+    <ds:schemaRef ds:uri="71af3243-3dd4-4a8d-8c0d-dd76da1f02a5"/>
+  </ds:schemaRefs>
+</ds:datastoreItem>
 </file>
</xml_diff>

<commit_message>
presentation ready for proofreading.
</commit_message>
<xml_diff>
--- a/Depression and Poverty.pptx
+++ b/Depression and Poverty.pptx
@@ -44,10 +44,10 @@
     <p:sldId id="312" r:id="rId38"/>
     <p:sldId id="313" r:id="rId39"/>
     <p:sldId id="314" r:id="rId40"/>
-    <p:sldId id="315" r:id="rId41"/>
-    <p:sldId id="316" r:id="rId42"/>
+    <p:sldId id="318" r:id="rId41"/>
+    <p:sldId id="315" r:id="rId42"/>
     <p:sldId id="317" r:id="rId43"/>
-    <p:sldId id="318" r:id="rId44"/>
+    <p:sldId id="316" r:id="rId44"/>
     <p:sldId id="319" r:id="rId45"/>
     <p:sldId id="320" r:id="rId46"/>
   </p:sldIdLst>
@@ -159,7 +159,7 @@
 <file path=ppt/revisionInfo.xml><?xml version="1.0" encoding="utf-8"?>
 <p1510:revInfo xmlns:a="http://schemas.openxmlformats.org/drawingml/2006/main" xmlns:r="http://schemas.openxmlformats.org/officeDocument/2006/relationships" xmlns:p1510="http://schemas.microsoft.com/office/powerpoint/2015/10/main">
   <p1510:revLst>
-    <p1510:client id="{90D4A433-95B9-4F5E-B3D6-EAA0E7AE3F32}" v="1" dt="2022-10-23T08:26:54.908"/>
+    <p1510:client id="{90D4A433-95B9-4F5E-B3D6-EAA0E7AE3F32}" v="69" dt="2022-10-24T03:06:08.061"/>
   </p1510:revLst>
 </p1510:revInfo>
 </file>
@@ -168,8 +168,8 @@
 <pc:chgInfo xmlns:a="http://schemas.openxmlformats.org/drawingml/2006/main" xmlns:r="http://schemas.openxmlformats.org/officeDocument/2006/relationships" xmlns:ac="http://schemas.microsoft.com/office/drawing/2013/main/command" xmlns:pc="http://schemas.microsoft.com/office/powerpoint/2013/main/command">
   <pc:docChgLst>
     <pc:chgData name="Daniel Lagos" userId="e08ab8c445020617" providerId="LiveId" clId="{90D4A433-95B9-4F5E-B3D6-EAA0E7AE3F32}"/>
-    <pc:docChg chg="custSel modSld">
-      <pc:chgData name="Daniel Lagos" userId="e08ab8c445020617" providerId="LiveId" clId="{90D4A433-95B9-4F5E-B3D6-EAA0E7AE3F32}" dt="2022-10-23T08:26:57.390" v="9" actId="27636"/>
+    <pc:docChg chg="undo redo custSel addSld delSld modSld sldOrd">
+      <pc:chgData name="Daniel Lagos" userId="e08ab8c445020617" providerId="LiveId" clId="{90D4A433-95B9-4F5E-B3D6-EAA0E7AE3F32}" dt="2022-10-24T04:29:27.445" v="7354" actId="20577"/>
       <pc:docMkLst>
         <pc:docMk/>
       </pc:docMkLst>
@@ -185,6 +185,1050 @@
             <pc:docMk/>
             <pc:sldMk cId="2803136203" sldId="277"/>
             <ac:spMk id="3" creationId="{616351BD-4BE1-47AD-8B65-1472A3BE63E4}"/>
+          </ac:spMkLst>
+        </pc:spChg>
+      </pc:sldChg>
+      <pc:sldChg chg="modSp mod">
+        <pc:chgData name="Daniel Lagos" userId="e08ab8c445020617" providerId="LiveId" clId="{90D4A433-95B9-4F5E-B3D6-EAA0E7AE3F32}" dt="2022-10-24T02:52:41.260" v="759" actId="1076"/>
+        <pc:sldMkLst>
+          <pc:docMk/>
+          <pc:sldMk cId="4126573441" sldId="283"/>
+        </pc:sldMkLst>
+        <pc:spChg chg="mod">
+          <ac:chgData name="Daniel Lagos" userId="e08ab8c445020617" providerId="LiveId" clId="{90D4A433-95B9-4F5E-B3D6-EAA0E7AE3F32}" dt="2022-10-24T02:48:59.134" v="667" actId="14100"/>
+          <ac:spMkLst>
+            <pc:docMk/>
+            <pc:sldMk cId="4126573441" sldId="283"/>
+            <ac:spMk id="9" creationId="{82897CBC-9B08-C028-2CBF-719F95FE5D97}"/>
+          </ac:spMkLst>
+        </pc:spChg>
+        <pc:spChg chg="mod">
+          <ac:chgData name="Daniel Lagos" userId="e08ab8c445020617" providerId="LiveId" clId="{90D4A433-95B9-4F5E-B3D6-EAA0E7AE3F32}" dt="2022-10-24T02:51:39.863" v="737" actId="313"/>
+          <ac:spMkLst>
+            <pc:docMk/>
+            <pc:sldMk cId="4126573441" sldId="283"/>
+            <ac:spMk id="10" creationId="{3CB3DFDA-F26E-E5E2-B786-79BAAF85ADD2}"/>
+          </ac:spMkLst>
+        </pc:spChg>
+        <pc:spChg chg="mod">
+          <ac:chgData name="Daniel Lagos" userId="e08ab8c445020617" providerId="LiveId" clId="{90D4A433-95B9-4F5E-B3D6-EAA0E7AE3F32}" dt="2022-10-24T02:52:36.774" v="758" actId="1076"/>
+          <ac:spMkLst>
+            <pc:docMk/>
+            <pc:sldMk cId="4126573441" sldId="283"/>
+            <ac:spMk id="11" creationId="{A8C70CBF-E63A-3FCD-C87F-7BAA740713EA}"/>
+          </ac:spMkLst>
+        </pc:spChg>
+        <pc:cxnChg chg="mod">
+          <ac:chgData name="Daniel Lagos" userId="e08ab8c445020617" providerId="LiveId" clId="{90D4A433-95B9-4F5E-B3D6-EAA0E7AE3F32}" dt="2022-10-24T02:48:59.134" v="667" actId="14100"/>
+          <ac:cxnSpMkLst>
+            <pc:docMk/>
+            <pc:sldMk cId="4126573441" sldId="283"/>
+            <ac:cxnSpMk id="13" creationId="{36BC1B62-0EA4-1BC7-FCF2-B60E93D79889}"/>
+          </ac:cxnSpMkLst>
+        </pc:cxnChg>
+        <pc:cxnChg chg="mod">
+          <ac:chgData name="Daniel Lagos" userId="e08ab8c445020617" providerId="LiveId" clId="{90D4A433-95B9-4F5E-B3D6-EAA0E7AE3F32}" dt="2022-10-24T02:52:00.758" v="741" actId="1076"/>
+          <ac:cxnSpMkLst>
+            <pc:docMk/>
+            <pc:sldMk cId="4126573441" sldId="283"/>
+            <ac:cxnSpMk id="14" creationId="{92F669AD-A3E3-440B-A371-8AD1B00BA245}"/>
+          </ac:cxnSpMkLst>
+        </pc:cxnChg>
+        <pc:cxnChg chg="mod">
+          <ac:chgData name="Daniel Lagos" userId="e08ab8c445020617" providerId="LiveId" clId="{90D4A433-95B9-4F5E-B3D6-EAA0E7AE3F32}" dt="2022-10-24T02:51:58.848" v="740" actId="1076"/>
+          <ac:cxnSpMkLst>
+            <pc:docMk/>
+            <pc:sldMk cId="4126573441" sldId="283"/>
+            <ac:cxnSpMk id="16" creationId="{A2FCC821-8FFC-762B-88E3-01B44C830A8B}"/>
+          </ac:cxnSpMkLst>
+        </pc:cxnChg>
+        <pc:cxnChg chg="mod">
+          <ac:chgData name="Daniel Lagos" userId="e08ab8c445020617" providerId="LiveId" clId="{90D4A433-95B9-4F5E-B3D6-EAA0E7AE3F32}" dt="2022-10-24T02:52:41.260" v="759" actId="1076"/>
+          <ac:cxnSpMkLst>
+            <pc:docMk/>
+            <pc:sldMk cId="4126573441" sldId="283"/>
+            <ac:cxnSpMk id="18" creationId="{4CA1B684-9F7C-9EBC-8A75-E6A409081A66}"/>
+          </ac:cxnSpMkLst>
+        </pc:cxnChg>
+      </pc:sldChg>
+      <pc:sldChg chg="modSp mod setBg">
+        <pc:chgData name="Daniel Lagos" userId="e08ab8c445020617" providerId="LiveId" clId="{90D4A433-95B9-4F5E-B3D6-EAA0E7AE3F32}" dt="2022-10-24T03:03:26.941" v="1655" actId="26606"/>
+        <pc:sldMkLst>
+          <pc:docMk/>
+          <pc:sldMk cId="280559214" sldId="292"/>
+        </pc:sldMkLst>
+        <pc:spChg chg="mod">
+          <ac:chgData name="Daniel Lagos" userId="e08ab8c445020617" providerId="LiveId" clId="{90D4A433-95B9-4F5E-B3D6-EAA0E7AE3F32}" dt="2022-10-24T03:03:26.941" v="1655" actId="26606"/>
+          <ac:spMkLst>
+            <pc:docMk/>
+            <pc:sldMk cId="280559214" sldId="292"/>
+            <ac:spMk id="2" creationId="{D8352247-5641-33B8-E8F7-D3E377FAF38F}"/>
+          </ac:spMkLst>
+        </pc:spChg>
+        <pc:spChg chg="mod">
+          <ac:chgData name="Daniel Lagos" userId="e08ab8c445020617" providerId="LiveId" clId="{90D4A433-95B9-4F5E-B3D6-EAA0E7AE3F32}" dt="2022-10-24T03:03:26.941" v="1655" actId="26606"/>
+          <ac:spMkLst>
+            <pc:docMk/>
+            <pc:sldMk cId="280559214" sldId="292"/>
+            <ac:spMk id="3" creationId="{54150C9F-49BE-04F3-BC18-86672F43659D}"/>
+          </ac:spMkLst>
+        </pc:spChg>
+        <pc:picChg chg="mod">
+          <ac:chgData name="Daniel Lagos" userId="e08ab8c445020617" providerId="LiveId" clId="{90D4A433-95B9-4F5E-B3D6-EAA0E7AE3F32}" dt="2022-10-24T03:03:26.941" v="1655" actId="26606"/>
+          <ac:picMkLst>
+            <pc:docMk/>
+            <pc:sldMk cId="280559214" sldId="292"/>
+            <ac:picMk id="5" creationId="{ACAFC115-055C-50FA-DB08-40667D5C97EB}"/>
+          </ac:picMkLst>
+        </pc:picChg>
+      </pc:sldChg>
+      <pc:sldChg chg="addSp delSp modSp mod">
+        <pc:chgData name="Daniel Lagos" userId="e08ab8c445020617" providerId="LiveId" clId="{90D4A433-95B9-4F5E-B3D6-EAA0E7AE3F32}" dt="2022-10-24T02:41:34.895" v="324" actId="20577"/>
+        <pc:sldMkLst>
+          <pc:docMk/>
+          <pc:sldMk cId="2666384942" sldId="298"/>
+        </pc:sldMkLst>
+        <pc:spChg chg="mod">
+          <ac:chgData name="Daniel Lagos" userId="e08ab8c445020617" providerId="LiveId" clId="{90D4A433-95B9-4F5E-B3D6-EAA0E7AE3F32}" dt="2022-10-24T02:41:34.895" v="324" actId="20577"/>
+          <ac:spMkLst>
+            <pc:docMk/>
+            <pc:sldMk cId="2666384942" sldId="298"/>
+            <ac:spMk id="3" creationId="{DC85A989-5402-BC96-C2B7-D8D33791FA38}"/>
+          </ac:spMkLst>
+        </pc:spChg>
+        <pc:spChg chg="add del">
+          <ac:chgData name="Daniel Lagos" userId="e08ab8c445020617" providerId="LiveId" clId="{90D4A433-95B9-4F5E-B3D6-EAA0E7AE3F32}" dt="2022-10-24T02:39:26.155" v="22" actId="26606"/>
+          <ac:spMkLst>
+            <pc:docMk/>
+            <pc:sldMk cId="2666384942" sldId="298"/>
+            <ac:spMk id="21" creationId="{1C04857D-B1C1-41ED-B1B4-E3D6E3C7C4E6}"/>
+          </ac:spMkLst>
+        </pc:spChg>
+        <pc:spChg chg="add del">
+          <ac:chgData name="Daniel Lagos" userId="e08ab8c445020617" providerId="LiveId" clId="{90D4A433-95B9-4F5E-B3D6-EAA0E7AE3F32}" dt="2022-10-24T02:39:26.155" v="22" actId="26606"/>
+          <ac:spMkLst>
+            <pc:docMk/>
+            <pc:sldMk cId="2666384942" sldId="298"/>
+            <ac:spMk id="22" creationId="{E5A9FA1E-7A9B-4CDA-91BB-87575F63E28F}"/>
+          </ac:spMkLst>
+        </pc:spChg>
+        <pc:spChg chg="add del">
+          <ac:chgData name="Daniel Lagos" userId="e08ab8c445020617" providerId="LiveId" clId="{90D4A433-95B9-4F5E-B3D6-EAA0E7AE3F32}" dt="2022-10-24T02:39:26.144" v="21" actId="26606"/>
+          <ac:spMkLst>
+            <pc:docMk/>
+            <pc:sldMk cId="2666384942" sldId="298"/>
+            <ac:spMk id="1031" creationId="{738C413B-57E4-4FAD-AF00-1E89B4273170}"/>
+          </ac:spMkLst>
+        </pc:spChg>
+        <pc:spChg chg="add del">
+          <ac:chgData name="Daniel Lagos" userId="e08ab8c445020617" providerId="LiveId" clId="{90D4A433-95B9-4F5E-B3D6-EAA0E7AE3F32}" dt="2022-10-24T02:39:26.144" v="21" actId="26606"/>
+          <ac:spMkLst>
+            <pc:docMk/>
+            <pc:sldMk cId="2666384942" sldId="298"/>
+            <ac:spMk id="1033" creationId="{96184565-6B22-40B8-AEFC-E5D103C5504C}"/>
+          </ac:spMkLst>
+        </pc:spChg>
+        <pc:spChg chg="add del">
+          <ac:chgData name="Daniel Lagos" userId="e08ab8c445020617" providerId="LiveId" clId="{90D4A433-95B9-4F5E-B3D6-EAA0E7AE3F32}" dt="2022-10-24T02:39:26.144" v="21" actId="26606"/>
+          <ac:spMkLst>
+            <pc:docMk/>
+            <pc:sldMk cId="2666384942" sldId="298"/>
+            <ac:spMk id="1035" creationId="{A9B5337D-1BB2-4459-9BD6-59184E3832CF}"/>
+          </ac:spMkLst>
+        </pc:spChg>
+        <pc:spChg chg="add">
+          <ac:chgData name="Daniel Lagos" userId="e08ab8c445020617" providerId="LiveId" clId="{90D4A433-95B9-4F5E-B3D6-EAA0E7AE3F32}" dt="2022-10-24T02:39:26.155" v="22" actId="26606"/>
+          <ac:spMkLst>
+            <pc:docMk/>
+            <pc:sldMk cId="2666384942" sldId="298"/>
+            <ac:spMk id="1037" creationId="{1C04857D-B1C1-41ED-B1B4-E3D6E3C7C4E6}"/>
+          </ac:spMkLst>
+        </pc:spChg>
+        <pc:spChg chg="add">
+          <ac:chgData name="Daniel Lagos" userId="e08ab8c445020617" providerId="LiveId" clId="{90D4A433-95B9-4F5E-B3D6-EAA0E7AE3F32}" dt="2022-10-24T02:39:26.155" v="22" actId="26606"/>
+          <ac:spMkLst>
+            <pc:docMk/>
+            <pc:sldMk cId="2666384942" sldId="298"/>
+            <ac:spMk id="1038" creationId="{E5A9FA1E-7A9B-4CDA-91BB-87575F63E28F}"/>
+          </ac:spMkLst>
+        </pc:spChg>
+        <pc:picChg chg="add del">
+          <ac:chgData name="Daniel Lagos" userId="e08ab8c445020617" providerId="LiveId" clId="{90D4A433-95B9-4F5E-B3D6-EAA0E7AE3F32}" dt="2022-10-24T02:38:24.009" v="12" actId="22"/>
+          <ac:picMkLst>
+            <pc:docMk/>
+            <pc:sldMk cId="2666384942" sldId="298"/>
+            <ac:picMk id="5" creationId="{3FDA3A64-6184-187A-D2F8-39F65514406F}"/>
+          </ac:picMkLst>
+        </pc:picChg>
+        <pc:picChg chg="add mod">
+          <ac:chgData name="Daniel Lagos" userId="e08ab8c445020617" providerId="LiveId" clId="{90D4A433-95B9-4F5E-B3D6-EAA0E7AE3F32}" dt="2022-10-24T02:39:43.348" v="127" actId="1035"/>
+          <ac:picMkLst>
+            <pc:docMk/>
+            <pc:sldMk cId="2666384942" sldId="298"/>
+            <ac:picMk id="7" creationId="{52E62D81-396B-18F0-1716-845F08951ABA}"/>
+          </ac:picMkLst>
+        </pc:picChg>
+        <pc:picChg chg="del">
+          <ac:chgData name="Daniel Lagos" userId="e08ab8c445020617" providerId="LiveId" clId="{90D4A433-95B9-4F5E-B3D6-EAA0E7AE3F32}" dt="2022-10-24T02:38:15.977" v="10" actId="478"/>
+          <ac:picMkLst>
+            <pc:docMk/>
+            <pc:sldMk cId="2666384942" sldId="298"/>
+            <ac:picMk id="8" creationId="{E9CE5829-30D5-A94B-71DD-F2E0F92A5C29}"/>
+          </ac:picMkLst>
+        </pc:picChg>
+        <pc:picChg chg="del">
+          <ac:chgData name="Daniel Lagos" userId="e08ab8c445020617" providerId="LiveId" clId="{90D4A433-95B9-4F5E-B3D6-EAA0E7AE3F32}" dt="2022-10-24T02:38:50.727" v="13" actId="478"/>
+          <ac:picMkLst>
+            <pc:docMk/>
+            <pc:sldMk cId="2666384942" sldId="298"/>
+            <ac:picMk id="10" creationId="{6D87407C-7549-7608-29B3-30718BDFE9F8}"/>
+          </ac:picMkLst>
+        </pc:picChg>
+        <pc:picChg chg="add mod">
+          <ac:chgData name="Daniel Lagos" userId="e08ab8c445020617" providerId="LiveId" clId="{90D4A433-95B9-4F5E-B3D6-EAA0E7AE3F32}" dt="2022-10-24T02:39:37.956" v="84" actId="1036"/>
+          <ac:picMkLst>
+            <pc:docMk/>
+            <pc:sldMk cId="2666384942" sldId="298"/>
+            <ac:picMk id="1026" creationId="{94EFF6D2-7E3E-C12C-C241-5096ACCB24D9}"/>
+          </ac:picMkLst>
+        </pc:picChg>
+      </pc:sldChg>
+      <pc:sldChg chg="modSp mod">
+        <pc:chgData name="Daniel Lagos" userId="e08ab8c445020617" providerId="LiveId" clId="{90D4A433-95B9-4F5E-B3D6-EAA0E7AE3F32}" dt="2022-10-24T03:11:58.063" v="1697" actId="20577"/>
+        <pc:sldMkLst>
+          <pc:docMk/>
+          <pc:sldMk cId="2818571481" sldId="305"/>
+        </pc:sldMkLst>
+        <pc:spChg chg="mod">
+          <ac:chgData name="Daniel Lagos" userId="e08ab8c445020617" providerId="LiveId" clId="{90D4A433-95B9-4F5E-B3D6-EAA0E7AE3F32}" dt="2022-10-24T02:53:38.941" v="797" actId="1076"/>
+          <ac:spMkLst>
+            <pc:docMk/>
+            <pc:sldMk cId="2818571481" sldId="305"/>
+            <ac:spMk id="2" creationId="{F36F0777-D328-4722-D77C-91CD50AAF31B}"/>
+          </ac:spMkLst>
+        </pc:spChg>
+        <pc:spChg chg="mod">
+          <ac:chgData name="Daniel Lagos" userId="e08ab8c445020617" providerId="LiveId" clId="{90D4A433-95B9-4F5E-B3D6-EAA0E7AE3F32}" dt="2022-10-24T02:56:38.891" v="1142" actId="14100"/>
+          <ac:spMkLst>
+            <pc:docMk/>
+            <pc:sldMk cId="2818571481" sldId="305"/>
+            <ac:spMk id="9" creationId="{82897CBC-9B08-C028-2CBF-719F95FE5D97}"/>
+          </ac:spMkLst>
+        </pc:spChg>
+        <pc:spChg chg="mod">
+          <ac:chgData name="Daniel Lagos" userId="e08ab8c445020617" providerId="LiveId" clId="{90D4A433-95B9-4F5E-B3D6-EAA0E7AE3F32}" dt="2022-10-24T03:11:43.671" v="1689" actId="20577"/>
+          <ac:spMkLst>
+            <pc:docMk/>
+            <pc:sldMk cId="2818571481" sldId="305"/>
+            <ac:spMk id="10" creationId="{3CB3DFDA-F26E-E5E2-B786-79BAAF85ADD2}"/>
+          </ac:spMkLst>
+        </pc:spChg>
+        <pc:spChg chg="mod">
+          <ac:chgData name="Daniel Lagos" userId="e08ab8c445020617" providerId="LiveId" clId="{90D4A433-95B9-4F5E-B3D6-EAA0E7AE3F32}" dt="2022-10-24T03:11:58.063" v="1697" actId="20577"/>
+          <ac:spMkLst>
+            <pc:docMk/>
+            <pc:sldMk cId="2818571481" sldId="305"/>
+            <ac:spMk id="11" creationId="{A8C70CBF-E63A-3FCD-C87F-7BAA740713EA}"/>
+          </ac:spMkLst>
+        </pc:spChg>
+        <pc:cxnChg chg="mod">
+          <ac:chgData name="Daniel Lagos" userId="e08ab8c445020617" providerId="LiveId" clId="{90D4A433-95B9-4F5E-B3D6-EAA0E7AE3F32}" dt="2022-10-24T02:56:53.725" v="1171" actId="1038"/>
+          <ac:cxnSpMkLst>
+            <pc:docMk/>
+            <pc:sldMk cId="2818571481" sldId="305"/>
+            <ac:cxnSpMk id="5" creationId="{18581119-4677-F15C-D0B7-CC58A8E57A2D}"/>
+          </ac:cxnSpMkLst>
+        </pc:cxnChg>
+        <pc:cxnChg chg="mod">
+          <ac:chgData name="Daniel Lagos" userId="e08ab8c445020617" providerId="LiveId" clId="{90D4A433-95B9-4F5E-B3D6-EAA0E7AE3F32}" dt="2022-10-24T02:56:45.508" v="1165" actId="1036"/>
+          <ac:cxnSpMkLst>
+            <pc:docMk/>
+            <pc:sldMk cId="2818571481" sldId="305"/>
+            <ac:cxnSpMk id="13" creationId="{36BC1B62-0EA4-1BC7-FCF2-B60E93D79889}"/>
+          </ac:cxnSpMkLst>
+        </pc:cxnChg>
+        <pc:cxnChg chg="mod">
+          <ac:chgData name="Daniel Lagos" userId="e08ab8c445020617" providerId="LiveId" clId="{90D4A433-95B9-4F5E-B3D6-EAA0E7AE3F32}" dt="2022-10-24T02:56:49.263" v="1168" actId="1038"/>
+          <ac:cxnSpMkLst>
+            <pc:docMk/>
+            <pc:sldMk cId="2818571481" sldId="305"/>
+            <ac:cxnSpMk id="14" creationId="{92F669AD-A3E3-440B-A371-8AD1B00BA245}"/>
+          </ac:cxnSpMkLst>
+        </pc:cxnChg>
+        <pc:cxnChg chg="mod">
+          <ac:chgData name="Daniel Lagos" userId="e08ab8c445020617" providerId="LiveId" clId="{90D4A433-95B9-4F5E-B3D6-EAA0E7AE3F32}" dt="2022-10-24T02:56:53.725" v="1171" actId="1038"/>
+          <ac:cxnSpMkLst>
+            <pc:docMk/>
+            <pc:sldMk cId="2818571481" sldId="305"/>
+            <ac:cxnSpMk id="16" creationId="{A2FCC821-8FFC-762B-88E3-01B44C830A8B}"/>
+          </ac:cxnSpMkLst>
+        </pc:cxnChg>
+      </pc:sldChg>
+      <pc:sldChg chg="modSp mod">
+        <pc:chgData name="Daniel Lagos" userId="e08ab8c445020617" providerId="LiveId" clId="{90D4A433-95B9-4F5E-B3D6-EAA0E7AE3F32}" dt="2022-10-24T03:01:06.341" v="1535" actId="14100"/>
+        <pc:sldMkLst>
+          <pc:docMk/>
+          <pc:sldMk cId="1156792870" sldId="306"/>
+        </pc:sldMkLst>
+        <pc:spChg chg="mod">
+          <ac:chgData name="Daniel Lagos" userId="e08ab8c445020617" providerId="LiveId" clId="{90D4A433-95B9-4F5E-B3D6-EAA0E7AE3F32}" dt="2022-10-24T03:01:06.341" v="1535" actId="14100"/>
+          <ac:spMkLst>
+            <pc:docMk/>
+            <pc:sldMk cId="1156792870" sldId="306"/>
+            <ac:spMk id="9" creationId="{82897CBC-9B08-C028-2CBF-719F95FE5D97}"/>
+          </ac:spMkLst>
+        </pc:spChg>
+        <pc:spChg chg="mod">
+          <ac:chgData name="Daniel Lagos" userId="e08ab8c445020617" providerId="LiveId" clId="{90D4A433-95B9-4F5E-B3D6-EAA0E7AE3F32}" dt="2022-10-24T03:01:00.721" v="1534" actId="1036"/>
+          <ac:spMkLst>
+            <pc:docMk/>
+            <pc:sldMk cId="1156792870" sldId="306"/>
+            <ac:spMk id="10" creationId="{3CB3DFDA-F26E-E5E2-B786-79BAAF85ADD2}"/>
+          </ac:spMkLst>
+        </pc:spChg>
+        <pc:cxnChg chg="mod">
+          <ac:chgData name="Daniel Lagos" userId="e08ab8c445020617" providerId="LiveId" clId="{90D4A433-95B9-4F5E-B3D6-EAA0E7AE3F32}" dt="2022-10-24T03:01:00.721" v="1534" actId="1036"/>
+          <ac:cxnSpMkLst>
+            <pc:docMk/>
+            <pc:sldMk cId="1156792870" sldId="306"/>
+            <ac:cxnSpMk id="13" creationId="{36BC1B62-0EA4-1BC7-FCF2-B60E93D79889}"/>
+          </ac:cxnSpMkLst>
+        </pc:cxnChg>
+        <pc:cxnChg chg="mod">
+          <ac:chgData name="Daniel Lagos" userId="e08ab8c445020617" providerId="LiveId" clId="{90D4A433-95B9-4F5E-B3D6-EAA0E7AE3F32}" dt="2022-10-24T03:01:00.721" v="1534" actId="1036"/>
+          <ac:cxnSpMkLst>
+            <pc:docMk/>
+            <pc:sldMk cId="1156792870" sldId="306"/>
+            <ac:cxnSpMk id="14" creationId="{92F669AD-A3E3-440B-A371-8AD1B00BA245}"/>
+          </ac:cxnSpMkLst>
+        </pc:cxnChg>
+      </pc:sldChg>
+      <pc:sldChg chg="addSp delSp modSp mod setBg">
+        <pc:chgData name="Daniel Lagos" userId="e08ab8c445020617" providerId="LiveId" clId="{90D4A433-95B9-4F5E-B3D6-EAA0E7AE3F32}" dt="2022-10-24T03:06:08.779" v="1678" actId="26606"/>
+        <pc:sldMkLst>
+          <pc:docMk/>
+          <pc:sldMk cId="3391942627" sldId="309"/>
+        </pc:sldMkLst>
+        <pc:spChg chg="mod">
+          <ac:chgData name="Daniel Lagos" userId="e08ab8c445020617" providerId="LiveId" clId="{90D4A433-95B9-4F5E-B3D6-EAA0E7AE3F32}" dt="2022-10-24T03:06:08.779" v="1678" actId="26606"/>
+          <ac:spMkLst>
+            <pc:docMk/>
+            <pc:sldMk cId="3391942627" sldId="309"/>
+            <ac:spMk id="2" creationId="{FA4A219A-70F0-773A-81B8-08A45FCF39FA}"/>
+          </ac:spMkLst>
+        </pc:spChg>
+        <pc:spChg chg="mod">
+          <ac:chgData name="Daniel Lagos" userId="e08ab8c445020617" providerId="LiveId" clId="{90D4A433-95B9-4F5E-B3D6-EAA0E7AE3F32}" dt="2022-10-24T03:06:08.779" v="1678" actId="26606"/>
+          <ac:spMkLst>
+            <pc:docMk/>
+            <pc:sldMk cId="3391942627" sldId="309"/>
+            <ac:spMk id="3" creationId="{64C827AE-726E-2566-B465-6E9719C90FAC}"/>
+          </ac:spMkLst>
+        </pc:spChg>
+        <pc:picChg chg="add del mod">
+          <ac:chgData name="Daniel Lagos" userId="e08ab8c445020617" providerId="LiveId" clId="{90D4A433-95B9-4F5E-B3D6-EAA0E7AE3F32}" dt="2022-10-24T03:06:08.061" v="1677"/>
+          <ac:picMkLst>
+            <pc:docMk/>
+            <pc:sldMk cId="3391942627" sldId="309"/>
+            <ac:picMk id="4" creationId="{A329297A-BB3F-189B-9512-F51D3C038515}"/>
+          </ac:picMkLst>
+        </pc:picChg>
+      </pc:sldChg>
+      <pc:sldChg chg="addSp delSp modSp mod">
+        <pc:chgData name="Daniel Lagos" userId="e08ab8c445020617" providerId="LiveId" clId="{90D4A433-95B9-4F5E-B3D6-EAA0E7AE3F32}" dt="2022-10-24T03:21:42.885" v="2385" actId="20577"/>
+        <pc:sldMkLst>
+          <pc:docMk/>
+          <pc:sldMk cId="2275938262" sldId="310"/>
+        </pc:sldMkLst>
+        <pc:spChg chg="mod">
+          <ac:chgData name="Daniel Lagos" userId="e08ab8c445020617" providerId="LiveId" clId="{90D4A433-95B9-4F5E-B3D6-EAA0E7AE3F32}" dt="2022-10-24T03:17:38.601" v="2045" actId="26606"/>
+          <ac:spMkLst>
+            <pc:docMk/>
+            <pc:sldMk cId="2275938262" sldId="310"/>
+            <ac:spMk id="2" creationId="{FA4A219A-70F0-773A-81B8-08A45FCF39FA}"/>
+          </ac:spMkLst>
+        </pc:spChg>
+        <pc:spChg chg="mod">
+          <ac:chgData name="Daniel Lagos" userId="e08ab8c445020617" providerId="LiveId" clId="{90D4A433-95B9-4F5E-B3D6-EAA0E7AE3F32}" dt="2022-10-24T03:21:42.885" v="2385" actId="20577"/>
+          <ac:spMkLst>
+            <pc:docMk/>
+            <pc:sldMk cId="2275938262" sldId="310"/>
+            <ac:spMk id="3" creationId="{64C827AE-726E-2566-B465-6E9719C90FAC}"/>
+          </ac:spMkLst>
+        </pc:spChg>
+        <pc:picChg chg="del">
+          <ac:chgData name="Daniel Lagos" userId="e08ab8c445020617" providerId="LiveId" clId="{90D4A433-95B9-4F5E-B3D6-EAA0E7AE3F32}" dt="2022-10-24T03:17:35.916" v="2043" actId="478"/>
+          <ac:picMkLst>
+            <pc:docMk/>
+            <pc:sldMk cId="2275938262" sldId="310"/>
+            <ac:picMk id="5" creationId="{F3D7FA0B-77F8-6D08-B846-1F8CA35430F1}"/>
+          </ac:picMkLst>
+        </pc:picChg>
+        <pc:picChg chg="add mod">
+          <ac:chgData name="Daniel Lagos" userId="e08ab8c445020617" providerId="LiveId" clId="{90D4A433-95B9-4F5E-B3D6-EAA0E7AE3F32}" dt="2022-10-24T03:17:49.588" v="2047" actId="27614"/>
+          <ac:picMkLst>
+            <pc:docMk/>
+            <pc:sldMk cId="2275938262" sldId="310"/>
+            <ac:picMk id="6" creationId="{C49BBC22-866A-C6A4-EE0C-2E34A7D78CA6}"/>
+          </ac:picMkLst>
+        </pc:picChg>
+      </pc:sldChg>
+      <pc:sldChg chg="addSp delSp modSp mod addAnim delAnim">
+        <pc:chgData name="Daniel Lagos" userId="e08ab8c445020617" providerId="LiveId" clId="{90D4A433-95B9-4F5E-B3D6-EAA0E7AE3F32}" dt="2022-10-24T03:25:25.460" v="2646" actId="26606"/>
+        <pc:sldMkLst>
+          <pc:docMk/>
+          <pc:sldMk cId="4139129174" sldId="311"/>
+        </pc:sldMkLst>
+        <pc:spChg chg="mod">
+          <ac:chgData name="Daniel Lagos" userId="e08ab8c445020617" providerId="LiveId" clId="{90D4A433-95B9-4F5E-B3D6-EAA0E7AE3F32}" dt="2022-10-24T03:25:25.460" v="2646" actId="26606"/>
+          <ac:spMkLst>
+            <pc:docMk/>
+            <pc:sldMk cId="4139129174" sldId="311"/>
+            <ac:spMk id="2" creationId="{FA4A219A-70F0-773A-81B8-08A45FCF39FA}"/>
+          </ac:spMkLst>
+        </pc:spChg>
+        <pc:spChg chg="mod">
+          <ac:chgData name="Daniel Lagos" userId="e08ab8c445020617" providerId="LiveId" clId="{90D4A433-95B9-4F5E-B3D6-EAA0E7AE3F32}" dt="2022-10-24T03:25:25.460" v="2646" actId="26606"/>
+          <ac:spMkLst>
+            <pc:docMk/>
+            <pc:sldMk cId="4139129174" sldId="311"/>
+            <ac:spMk id="3" creationId="{64C827AE-726E-2566-B465-6E9719C90FAC}"/>
+          </ac:spMkLst>
+        </pc:spChg>
+        <pc:spChg chg="del">
+          <ac:chgData name="Daniel Lagos" userId="e08ab8c445020617" providerId="LiveId" clId="{90D4A433-95B9-4F5E-B3D6-EAA0E7AE3F32}" dt="2022-10-24T03:24:17.782" v="2390" actId="26606"/>
+          <ac:spMkLst>
+            <pc:docMk/>
+            <pc:sldMk cId="4139129174" sldId="311"/>
+            <ac:spMk id="15" creationId="{9B898DA6-F186-4D59-8802-5BC1FE9B7939}"/>
+          </ac:spMkLst>
+        </pc:spChg>
+        <pc:spChg chg="add del">
+          <ac:chgData name="Daniel Lagos" userId="e08ab8c445020617" providerId="LiveId" clId="{90D4A433-95B9-4F5E-B3D6-EAA0E7AE3F32}" dt="2022-10-24T03:24:45.056" v="2395" actId="26606"/>
+          <ac:spMkLst>
+            <pc:docMk/>
+            <pc:sldMk cId="4139129174" sldId="311"/>
+            <ac:spMk id="27" creationId="{F26FC45A-52BC-4102-84DD-911303AD34C9}"/>
+          </ac:spMkLst>
+        </pc:spChg>
+        <pc:spChg chg="add del">
+          <ac:chgData name="Daniel Lagos" userId="e08ab8c445020617" providerId="LiveId" clId="{90D4A433-95B9-4F5E-B3D6-EAA0E7AE3F32}" dt="2022-10-24T03:24:45.056" v="2395" actId="26606"/>
+          <ac:spMkLst>
+            <pc:docMk/>
+            <pc:sldMk cId="4139129174" sldId="311"/>
+            <ac:spMk id="28" creationId="{091EC05A-89DB-4492-8034-80B7A3133B01}"/>
+          </ac:spMkLst>
+        </pc:spChg>
+        <pc:spChg chg="add del">
+          <ac:chgData name="Daniel Lagos" userId="e08ab8c445020617" providerId="LiveId" clId="{90D4A433-95B9-4F5E-B3D6-EAA0E7AE3F32}" dt="2022-10-24T03:24:45.056" v="2395" actId="26606"/>
+          <ac:spMkLst>
+            <pc:docMk/>
+            <pc:sldMk cId="4139129174" sldId="311"/>
+            <ac:spMk id="29" creationId="{0263BACB-325F-4E89-9AE5-E5E4B14AEBFB}"/>
+          </ac:spMkLst>
+        </pc:spChg>
+        <pc:spChg chg="add del">
+          <ac:chgData name="Daniel Lagos" userId="e08ab8c445020617" providerId="LiveId" clId="{90D4A433-95B9-4F5E-B3D6-EAA0E7AE3F32}" dt="2022-10-24T03:25:25.460" v="2646" actId="26606"/>
+          <ac:spMkLst>
+            <pc:docMk/>
+            <pc:sldMk cId="4139129174" sldId="311"/>
+            <ac:spMk id="31" creationId="{812F6BC3-2C27-4D47-B3FC-14C36ABB720A}"/>
+          </ac:spMkLst>
+        </pc:spChg>
+        <pc:spChg chg="add del">
+          <ac:chgData name="Daniel Lagos" userId="e08ab8c445020617" providerId="LiveId" clId="{90D4A433-95B9-4F5E-B3D6-EAA0E7AE3F32}" dt="2022-10-24T03:25:25.460" v="2646" actId="26606"/>
+          <ac:spMkLst>
+            <pc:docMk/>
+            <pc:sldMk cId="4139129174" sldId="311"/>
+            <ac:spMk id="33" creationId="{8B10BF6C-3665-4F44-AECF-93A3A986EEFF}"/>
+          </ac:spMkLst>
+        </pc:spChg>
+        <pc:spChg chg="add del">
+          <ac:chgData name="Daniel Lagos" userId="e08ab8c445020617" providerId="LiveId" clId="{90D4A433-95B9-4F5E-B3D6-EAA0E7AE3F32}" dt="2022-10-24T03:25:25.460" v="2646" actId="26606"/>
+          <ac:spMkLst>
+            <pc:docMk/>
+            <pc:sldMk cId="4139129174" sldId="311"/>
+            <ac:spMk id="34" creationId="{2686FD45-663C-4668-8418-20199A171676}"/>
+          </ac:spMkLst>
+        </pc:spChg>
+        <pc:spChg chg="add del">
+          <ac:chgData name="Daniel Lagos" userId="e08ab8c445020617" providerId="LiveId" clId="{90D4A433-95B9-4F5E-B3D6-EAA0E7AE3F32}" dt="2022-10-24T03:25:25.460" v="2646" actId="26606"/>
+          <ac:spMkLst>
+            <pc:docMk/>
+            <pc:sldMk cId="4139129174" sldId="311"/>
+            <ac:spMk id="41" creationId="{366A5986-DB91-4DD9-9D1F-C79C0C0E85B0}"/>
+          </ac:spMkLst>
+        </pc:spChg>
+        <pc:picChg chg="add mod ord">
+          <ac:chgData name="Daniel Lagos" userId="e08ab8c445020617" providerId="LiveId" clId="{90D4A433-95B9-4F5E-B3D6-EAA0E7AE3F32}" dt="2022-10-24T03:25:25.460" v="2646" actId="26606"/>
+          <ac:picMkLst>
+            <pc:docMk/>
+            <pc:sldMk cId="4139129174" sldId="311"/>
+            <ac:picMk id="5" creationId="{7667E22D-B2C0-FF6C-D341-E3DF1DF7CC6A}"/>
+          </ac:picMkLst>
+        </pc:picChg>
+        <pc:picChg chg="del">
+          <ac:chgData name="Daniel Lagos" userId="e08ab8c445020617" providerId="LiveId" clId="{90D4A433-95B9-4F5E-B3D6-EAA0E7AE3F32}" dt="2022-10-24T03:23:48.746" v="2387" actId="478"/>
+          <ac:picMkLst>
+            <pc:docMk/>
+            <pc:sldMk cId="4139129174" sldId="311"/>
+            <ac:picMk id="6" creationId="{1465E392-B091-18E9-0CB9-6440B7DAA9B0}"/>
+          </ac:picMkLst>
+        </pc:picChg>
+        <pc:picChg chg="del">
+          <ac:chgData name="Daniel Lagos" userId="e08ab8c445020617" providerId="LiveId" clId="{90D4A433-95B9-4F5E-B3D6-EAA0E7AE3F32}" dt="2022-10-24T03:23:49.425" v="2388" actId="478"/>
+          <ac:picMkLst>
+            <pc:docMk/>
+            <pc:sldMk cId="4139129174" sldId="311"/>
+            <ac:picMk id="8" creationId="{80346EFF-D8AB-BD24-1860-4597B7ED1A47}"/>
+          </ac:picMkLst>
+        </pc:picChg>
+        <pc:picChg chg="add mod ord">
+          <ac:chgData name="Daniel Lagos" userId="e08ab8c445020617" providerId="LiveId" clId="{90D4A433-95B9-4F5E-B3D6-EAA0E7AE3F32}" dt="2022-10-24T03:25:25.460" v="2646" actId="26606"/>
+          <ac:picMkLst>
+            <pc:docMk/>
+            <pc:sldMk cId="4139129174" sldId="311"/>
+            <ac:picMk id="9" creationId="{5EC8CE47-9AC0-28E4-6350-617D365C7257}"/>
+          </ac:picMkLst>
+        </pc:picChg>
+        <pc:picChg chg="add mod ord">
+          <ac:chgData name="Daniel Lagos" userId="e08ab8c445020617" providerId="LiveId" clId="{90D4A433-95B9-4F5E-B3D6-EAA0E7AE3F32}" dt="2022-10-24T03:25:25.460" v="2646" actId="26606"/>
+          <ac:picMkLst>
+            <pc:docMk/>
+            <pc:sldMk cId="4139129174" sldId="311"/>
+            <ac:picMk id="11" creationId="{EC861F9C-A746-ED60-73CE-9C4A0E8402B3}"/>
+          </ac:picMkLst>
+        </pc:picChg>
+        <pc:picChg chg="del">
+          <ac:chgData name="Daniel Lagos" userId="e08ab8c445020617" providerId="LiveId" clId="{90D4A433-95B9-4F5E-B3D6-EAA0E7AE3F32}" dt="2022-10-24T03:24:17.782" v="2390" actId="26606"/>
+          <ac:picMkLst>
+            <pc:docMk/>
+            <pc:sldMk cId="4139129174" sldId="311"/>
+            <ac:picMk id="13" creationId="{83543A10-04EE-49E0-A9DE-22E1FAB9AED9}"/>
+          </ac:picMkLst>
+        </pc:picChg>
+        <pc:picChg chg="add del">
+          <ac:chgData name="Daniel Lagos" userId="e08ab8c445020617" providerId="LiveId" clId="{90D4A433-95B9-4F5E-B3D6-EAA0E7AE3F32}" dt="2022-10-24T03:24:45.066" v="2396" actId="26606"/>
+          <ac:picMkLst>
+            <pc:docMk/>
+            <pc:sldMk cId="4139129174" sldId="311"/>
+            <ac:picMk id="20" creationId="{83543A10-04EE-49E0-A9DE-22E1FAB9AED9}"/>
+          </ac:picMkLst>
+        </pc:picChg>
+        <pc:picChg chg="add del">
+          <ac:chgData name="Daniel Lagos" userId="e08ab8c445020617" providerId="LiveId" clId="{90D4A433-95B9-4F5E-B3D6-EAA0E7AE3F32}" dt="2022-10-24T03:24:42.458" v="2393" actId="26606"/>
+          <ac:picMkLst>
+            <pc:docMk/>
+            <pc:sldMk cId="4139129174" sldId="311"/>
+            <ac:picMk id="25" creationId="{E5AA88FA-FA9B-40A0-AB33-86E7729DA88E}"/>
+          </ac:picMkLst>
+        </pc:picChg>
+        <pc:picChg chg="add del">
+          <ac:chgData name="Daniel Lagos" userId="e08ab8c445020617" providerId="LiveId" clId="{90D4A433-95B9-4F5E-B3D6-EAA0E7AE3F32}" dt="2022-10-24T03:25:25.460" v="2646" actId="26606"/>
+          <ac:picMkLst>
+            <pc:docMk/>
+            <pc:sldMk cId="4139129174" sldId="311"/>
+            <ac:picMk id="32" creationId="{E5AA88FA-FA9B-40A0-AB33-86E7729DA88E}"/>
+          </ac:picMkLst>
+        </pc:picChg>
+        <pc:picChg chg="add del">
+          <ac:chgData name="Daniel Lagos" userId="e08ab8c445020617" providerId="LiveId" clId="{90D4A433-95B9-4F5E-B3D6-EAA0E7AE3F32}" dt="2022-10-24T03:25:25.460" v="2646" actId="26606"/>
+          <ac:picMkLst>
+            <pc:docMk/>
+            <pc:sldMk cId="4139129174" sldId="311"/>
+            <ac:picMk id="39" creationId="{A183E0A0-23AC-4C43-8723-54948740E73B}"/>
+          </ac:picMkLst>
+        </pc:picChg>
+      </pc:sldChg>
+      <pc:sldChg chg="addSp delSp modSp mod addAnim delAnim">
+        <pc:chgData name="Daniel Lagos" userId="e08ab8c445020617" providerId="LiveId" clId="{90D4A433-95B9-4F5E-B3D6-EAA0E7AE3F32}" dt="2022-10-24T03:26:46.866" v="2657" actId="26606"/>
+        <pc:sldMkLst>
+          <pc:docMk/>
+          <pc:sldMk cId="970076332" sldId="312"/>
+        </pc:sldMkLst>
+        <pc:spChg chg="mod">
+          <ac:chgData name="Daniel Lagos" userId="e08ab8c445020617" providerId="LiveId" clId="{90D4A433-95B9-4F5E-B3D6-EAA0E7AE3F32}" dt="2022-10-24T03:26:46.856" v="2656" actId="26606"/>
+          <ac:spMkLst>
+            <pc:docMk/>
+            <pc:sldMk cId="970076332" sldId="312"/>
+            <ac:spMk id="2" creationId="{FA4A219A-70F0-773A-81B8-08A45FCF39FA}"/>
+          </ac:spMkLst>
+        </pc:spChg>
+        <pc:spChg chg="mod">
+          <ac:chgData name="Daniel Lagos" userId="e08ab8c445020617" providerId="LiveId" clId="{90D4A433-95B9-4F5E-B3D6-EAA0E7AE3F32}" dt="2022-10-24T03:26:46.856" v="2656" actId="26606"/>
+          <ac:spMkLst>
+            <pc:docMk/>
+            <pc:sldMk cId="970076332" sldId="312"/>
+            <ac:spMk id="3" creationId="{64C827AE-726E-2566-B465-6E9719C90FAC}"/>
+          </ac:spMkLst>
+        </pc:spChg>
+        <pc:spChg chg="del">
+          <ac:chgData name="Daniel Lagos" userId="e08ab8c445020617" providerId="LiveId" clId="{90D4A433-95B9-4F5E-B3D6-EAA0E7AE3F32}" dt="2022-10-24T03:26:20.543" v="2651" actId="26606"/>
+          <ac:spMkLst>
+            <pc:docMk/>
+            <pc:sldMk cId="970076332" sldId="312"/>
+            <ac:spMk id="25" creationId="{9B898DA6-F186-4D59-8802-5BC1FE9B7939}"/>
+          </ac:spMkLst>
+        </pc:spChg>
+        <pc:spChg chg="add del">
+          <ac:chgData name="Daniel Lagos" userId="e08ab8c445020617" providerId="LiveId" clId="{90D4A433-95B9-4F5E-B3D6-EAA0E7AE3F32}" dt="2022-10-24T03:26:39.070" v="2653" actId="26606"/>
+          <ac:spMkLst>
+            <pc:docMk/>
+            <pc:sldMk cId="970076332" sldId="312"/>
+            <ac:spMk id="32" creationId="{19F92939-EC60-4457-B10D-2C2830118821}"/>
+          </ac:spMkLst>
+        </pc:spChg>
+        <pc:spChg chg="add del">
+          <ac:chgData name="Daniel Lagos" userId="e08ab8c445020617" providerId="LiveId" clId="{90D4A433-95B9-4F5E-B3D6-EAA0E7AE3F32}" dt="2022-10-24T03:26:39.070" v="2653" actId="26606"/>
+          <ac:spMkLst>
+            <pc:docMk/>
+            <pc:sldMk cId="970076332" sldId="312"/>
+            <ac:spMk id="34" creationId="{0623D470-E9E2-4D90-9F00-E214DDDC0814}"/>
+          </ac:spMkLst>
+        </pc:spChg>
+        <pc:spChg chg="add del">
+          <ac:chgData name="Daniel Lagos" userId="e08ab8c445020617" providerId="LiveId" clId="{90D4A433-95B9-4F5E-B3D6-EAA0E7AE3F32}" dt="2022-10-24T03:26:46.856" v="2656" actId="26606"/>
+          <ac:spMkLst>
+            <pc:docMk/>
+            <pc:sldMk cId="970076332" sldId="312"/>
+            <ac:spMk id="46" creationId="{366A5986-DB91-4DD9-9D1F-C79C0C0E85B0}"/>
+          </ac:spMkLst>
+        </pc:spChg>
+        <pc:spChg chg="add">
+          <ac:chgData name="Daniel Lagos" userId="e08ab8c445020617" providerId="LiveId" clId="{90D4A433-95B9-4F5E-B3D6-EAA0E7AE3F32}" dt="2022-10-24T03:26:46.866" v="2657" actId="26606"/>
+          <ac:spMkLst>
+            <pc:docMk/>
+            <pc:sldMk cId="970076332" sldId="312"/>
+            <ac:spMk id="48" creationId="{2686FD45-663C-4668-8418-20199A171676}"/>
+          </ac:spMkLst>
+        </pc:spChg>
+        <pc:spChg chg="add">
+          <ac:chgData name="Daniel Lagos" userId="e08ab8c445020617" providerId="LiveId" clId="{90D4A433-95B9-4F5E-B3D6-EAA0E7AE3F32}" dt="2022-10-24T03:26:46.866" v="2657" actId="26606"/>
+          <ac:spMkLst>
+            <pc:docMk/>
+            <pc:sldMk cId="970076332" sldId="312"/>
+            <ac:spMk id="50" creationId="{812F6BC3-2C27-4D47-B3FC-14C36ABB720A}"/>
+          </ac:spMkLst>
+        </pc:spChg>
+        <pc:spChg chg="add">
+          <ac:chgData name="Daniel Lagos" userId="e08ab8c445020617" providerId="LiveId" clId="{90D4A433-95B9-4F5E-B3D6-EAA0E7AE3F32}" dt="2022-10-24T03:26:46.866" v="2657" actId="26606"/>
+          <ac:spMkLst>
+            <pc:docMk/>
+            <pc:sldMk cId="970076332" sldId="312"/>
+            <ac:spMk id="51" creationId="{8B10BF6C-3665-4F44-AECF-93A3A986EEFF}"/>
+          </ac:spMkLst>
+        </pc:spChg>
+        <pc:picChg chg="del">
+          <ac:chgData name="Daniel Lagos" userId="e08ab8c445020617" providerId="LiveId" clId="{90D4A433-95B9-4F5E-B3D6-EAA0E7AE3F32}" dt="2022-10-24T03:26:00.067" v="2647" actId="478"/>
+          <ac:picMkLst>
+            <pc:docMk/>
+            <pc:sldMk cId="970076332" sldId="312"/>
+            <ac:picMk id="5" creationId="{A1067835-8955-56C8-9DB0-5BD88085CD21}"/>
+          </ac:picMkLst>
+        </pc:picChg>
+        <pc:picChg chg="add mod">
+          <ac:chgData name="Daniel Lagos" userId="e08ab8c445020617" providerId="LiveId" clId="{90D4A433-95B9-4F5E-B3D6-EAA0E7AE3F32}" dt="2022-10-24T03:26:46.866" v="2657" actId="26606"/>
+          <ac:picMkLst>
+            <pc:docMk/>
+            <pc:sldMk cId="970076332" sldId="312"/>
+            <ac:picMk id="6" creationId="{25042640-965F-4618-345F-80B5D3DDFCDE}"/>
+          </ac:picMkLst>
+        </pc:picChg>
+        <pc:picChg chg="add mod ord">
+          <ac:chgData name="Daniel Lagos" userId="e08ab8c445020617" providerId="LiveId" clId="{90D4A433-95B9-4F5E-B3D6-EAA0E7AE3F32}" dt="2022-10-24T03:26:46.866" v="2657" actId="26606"/>
+          <ac:picMkLst>
+            <pc:docMk/>
+            <pc:sldMk cId="970076332" sldId="312"/>
+            <ac:picMk id="8" creationId="{2C04A818-1C2C-01DE-1FF1-0619887844FF}"/>
+          </ac:picMkLst>
+        </pc:picChg>
+        <pc:picChg chg="del">
+          <ac:chgData name="Daniel Lagos" userId="e08ab8c445020617" providerId="LiveId" clId="{90D4A433-95B9-4F5E-B3D6-EAA0E7AE3F32}" dt="2022-10-24T03:26:00.854" v="2648" actId="478"/>
+          <ac:picMkLst>
+            <pc:docMk/>
+            <pc:sldMk cId="970076332" sldId="312"/>
+            <ac:picMk id="9" creationId="{E5E9A08F-27A3-9FAA-D9B6-BA7E6DD58FA3}"/>
+          </ac:picMkLst>
+        </pc:picChg>
+        <pc:picChg chg="add mod ord">
+          <ac:chgData name="Daniel Lagos" userId="e08ab8c445020617" providerId="LiveId" clId="{90D4A433-95B9-4F5E-B3D6-EAA0E7AE3F32}" dt="2022-10-24T03:26:46.866" v="2657" actId="26606"/>
+          <ac:picMkLst>
+            <pc:docMk/>
+            <pc:sldMk cId="970076332" sldId="312"/>
+            <ac:picMk id="11" creationId="{30DE8C28-D44B-DFD3-5349-B02025181B13}"/>
+          </ac:picMkLst>
+        </pc:picChg>
+        <pc:picChg chg="del">
+          <ac:chgData name="Daniel Lagos" userId="e08ab8c445020617" providerId="LiveId" clId="{90D4A433-95B9-4F5E-B3D6-EAA0E7AE3F32}" dt="2022-10-24T03:26:20.543" v="2651" actId="26606"/>
+          <ac:picMkLst>
+            <pc:docMk/>
+            <pc:sldMk cId="970076332" sldId="312"/>
+            <ac:picMk id="23" creationId="{83543A10-04EE-49E0-A9DE-22E1FAB9AED9}"/>
+          </ac:picMkLst>
+        </pc:picChg>
+        <pc:picChg chg="add del">
+          <ac:chgData name="Daniel Lagos" userId="e08ab8c445020617" providerId="LiveId" clId="{90D4A433-95B9-4F5E-B3D6-EAA0E7AE3F32}" dt="2022-10-24T03:26:39.070" v="2653" actId="26606"/>
+          <ac:picMkLst>
+            <pc:docMk/>
+            <pc:sldMk cId="970076332" sldId="312"/>
+            <ac:picMk id="30" creationId="{83543A10-04EE-49E0-A9DE-22E1FAB9AED9}"/>
+          </ac:picMkLst>
+        </pc:picChg>
+        <pc:picChg chg="add del">
+          <ac:chgData name="Daniel Lagos" userId="e08ab8c445020617" providerId="LiveId" clId="{90D4A433-95B9-4F5E-B3D6-EAA0E7AE3F32}" dt="2022-10-24T03:26:46.866" v="2657" actId="26606"/>
+          <ac:picMkLst>
+            <pc:docMk/>
+            <pc:sldMk cId="970076332" sldId="312"/>
+            <ac:picMk id="39" creationId="{E5AA88FA-FA9B-40A0-AB33-86E7729DA88E}"/>
+          </ac:picMkLst>
+        </pc:picChg>
+        <pc:picChg chg="add del">
+          <ac:chgData name="Daniel Lagos" userId="e08ab8c445020617" providerId="LiveId" clId="{90D4A433-95B9-4F5E-B3D6-EAA0E7AE3F32}" dt="2022-10-24T03:26:46.856" v="2656" actId="26606"/>
+          <ac:picMkLst>
+            <pc:docMk/>
+            <pc:sldMk cId="970076332" sldId="312"/>
+            <ac:picMk id="44" creationId="{A183E0A0-23AC-4C43-8723-54948740E73B}"/>
+          </ac:picMkLst>
+        </pc:picChg>
+        <pc:picChg chg="add">
+          <ac:chgData name="Daniel Lagos" userId="e08ab8c445020617" providerId="LiveId" clId="{90D4A433-95B9-4F5E-B3D6-EAA0E7AE3F32}" dt="2022-10-24T03:26:46.866" v="2657" actId="26606"/>
+          <ac:picMkLst>
+            <pc:docMk/>
+            <pc:sldMk cId="970076332" sldId="312"/>
+            <ac:picMk id="49" creationId="{E5AA88FA-FA9B-40A0-AB33-86E7729DA88E}"/>
+          </ac:picMkLst>
+        </pc:picChg>
+      </pc:sldChg>
+      <pc:sldChg chg="modSp mod">
+        <pc:chgData name="Daniel Lagos" userId="e08ab8c445020617" providerId="LiveId" clId="{90D4A433-95B9-4F5E-B3D6-EAA0E7AE3F32}" dt="2022-10-24T03:50:50.541" v="3881" actId="20577"/>
+        <pc:sldMkLst>
+          <pc:docMk/>
+          <pc:sldMk cId="4165333721" sldId="313"/>
+        </pc:sldMkLst>
+        <pc:spChg chg="mod">
+          <ac:chgData name="Daniel Lagos" userId="e08ab8c445020617" providerId="LiveId" clId="{90D4A433-95B9-4F5E-B3D6-EAA0E7AE3F32}" dt="2022-10-24T03:50:50.541" v="3881" actId="20577"/>
+          <ac:spMkLst>
+            <pc:docMk/>
+            <pc:sldMk cId="4165333721" sldId="313"/>
+            <ac:spMk id="3" creationId="{64C827AE-726E-2566-B465-6E9719C90FAC}"/>
+          </ac:spMkLst>
+        </pc:spChg>
+      </pc:sldChg>
+      <pc:sldChg chg="modSp mod">
+        <pc:chgData name="Daniel Lagos" userId="e08ab8c445020617" providerId="LiveId" clId="{90D4A433-95B9-4F5E-B3D6-EAA0E7AE3F32}" dt="2022-10-24T03:53:17.508" v="3952" actId="20577"/>
+        <pc:sldMkLst>
+          <pc:docMk/>
+          <pc:sldMk cId="3981641965" sldId="314"/>
+        </pc:sldMkLst>
+        <pc:spChg chg="mod">
+          <ac:chgData name="Daniel Lagos" userId="e08ab8c445020617" providerId="LiveId" clId="{90D4A433-95B9-4F5E-B3D6-EAA0E7AE3F32}" dt="2022-10-24T03:53:17.508" v="3952" actId="20577"/>
+          <ac:spMkLst>
+            <pc:docMk/>
+            <pc:sldMk cId="3981641965" sldId="314"/>
+            <ac:spMk id="3" creationId="{64C827AE-726E-2566-B465-6E9719C90FAC}"/>
+          </ac:spMkLst>
+        </pc:spChg>
+      </pc:sldChg>
+      <pc:sldChg chg="addSp delSp modSp mod">
+        <pc:chgData name="Daniel Lagos" userId="e08ab8c445020617" providerId="LiveId" clId="{90D4A433-95B9-4F5E-B3D6-EAA0E7AE3F32}" dt="2022-10-24T03:56:17.943" v="4198" actId="20577"/>
+        <pc:sldMkLst>
+          <pc:docMk/>
+          <pc:sldMk cId="3846949896" sldId="315"/>
+        </pc:sldMkLst>
+        <pc:spChg chg="mod">
+          <ac:chgData name="Daniel Lagos" userId="e08ab8c445020617" providerId="LiveId" clId="{90D4A433-95B9-4F5E-B3D6-EAA0E7AE3F32}" dt="2022-10-24T03:54:44.120" v="4019" actId="26606"/>
+          <ac:spMkLst>
+            <pc:docMk/>
+            <pc:sldMk cId="3846949896" sldId="315"/>
+            <ac:spMk id="2" creationId="{FA4A219A-70F0-773A-81B8-08A45FCF39FA}"/>
+          </ac:spMkLst>
+        </pc:spChg>
+        <pc:spChg chg="mod">
+          <ac:chgData name="Daniel Lagos" userId="e08ab8c445020617" providerId="LiveId" clId="{90D4A433-95B9-4F5E-B3D6-EAA0E7AE3F32}" dt="2022-10-24T03:56:17.943" v="4198" actId="20577"/>
+          <ac:spMkLst>
+            <pc:docMk/>
+            <pc:sldMk cId="3846949896" sldId="315"/>
+            <ac:spMk id="3" creationId="{64C827AE-726E-2566-B465-6E9719C90FAC}"/>
+          </ac:spMkLst>
+        </pc:spChg>
+        <pc:picChg chg="add del mod">
+          <ac:chgData name="Daniel Lagos" userId="e08ab8c445020617" providerId="LiveId" clId="{90D4A433-95B9-4F5E-B3D6-EAA0E7AE3F32}" dt="2022-10-24T03:54:51.521" v="4025" actId="478"/>
+          <ac:picMkLst>
+            <pc:docMk/>
+            <pc:sldMk cId="3846949896" sldId="315"/>
+            <ac:picMk id="5" creationId="{F9F0E386-1582-1EF5-B0B3-D6CDEAFE2E1F}"/>
+          </ac:picMkLst>
+        </pc:picChg>
+        <pc:picChg chg="del">
+          <ac:chgData name="Daniel Lagos" userId="e08ab8c445020617" providerId="LiveId" clId="{90D4A433-95B9-4F5E-B3D6-EAA0E7AE3F32}" dt="2022-10-24T03:53:51.916" v="3953" actId="478"/>
+          <ac:picMkLst>
+            <pc:docMk/>
+            <pc:sldMk cId="3846949896" sldId="315"/>
+            <ac:picMk id="7" creationId="{CE8FE8A1-277D-996F-1C76-1714EBEC4341}"/>
+          </ac:picMkLst>
+        </pc:picChg>
+        <pc:picChg chg="add del mod">
+          <ac:chgData name="Daniel Lagos" userId="e08ab8c445020617" providerId="LiveId" clId="{90D4A433-95B9-4F5E-B3D6-EAA0E7AE3F32}" dt="2022-10-24T03:55:18.205" v="4050" actId="478"/>
+          <ac:picMkLst>
+            <pc:docMk/>
+            <pc:sldMk cId="3846949896" sldId="315"/>
+            <ac:picMk id="8" creationId="{C5D169DD-7AB1-63FB-A570-F50244ABAC30}"/>
+          </ac:picMkLst>
+        </pc:picChg>
+        <pc:picChg chg="add mod">
+          <ac:chgData name="Daniel Lagos" userId="e08ab8c445020617" providerId="LiveId" clId="{90D4A433-95B9-4F5E-B3D6-EAA0E7AE3F32}" dt="2022-10-24T03:55:32.741" v="4052" actId="26606"/>
+          <ac:picMkLst>
+            <pc:docMk/>
+            <pc:sldMk cId="3846949896" sldId="315"/>
+            <ac:picMk id="10" creationId="{F508A979-7F97-0E41-1F5F-0536AA78143A}"/>
+          </ac:picMkLst>
+        </pc:picChg>
+      </pc:sldChg>
+      <pc:sldChg chg="addSp delSp modSp mod ord">
+        <pc:chgData name="Daniel Lagos" userId="e08ab8c445020617" providerId="LiveId" clId="{90D4A433-95B9-4F5E-B3D6-EAA0E7AE3F32}" dt="2022-10-24T04:09:19.929" v="5207" actId="20577"/>
+        <pc:sldMkLst>
+          <pc:docMk/>
+          <pc:sldMk cId="1978051639" sldId="316"/>
+        </pc:sldMkLst>
+        <pc:spChg chg="mod">
+          <ac:chgData name="Daniel Lagos" userId="e08ab8c445020617" providerId="LiveId" clId="{90D4A433-95B9-4F5E-B3D6-EAA0E7AE3F32}" dt="2022-10-24T04:02:15.258" v="4350" actId="26606"/>
+          <ac:spMkLst>
+            <pc:docMk/>
+            <pc:sldMk cId="1978051639" sldId="316"/>
+            <ac:spMk id="2" creationId="{FA4A219A-70F0-773A-81B8-08A45FCF39FA}"/>
+          </ac:spMkLst>
+        </pc:spChg>
+        <pc:spChg chg="mod">
+          <ac:chgData name="Daniel Lagos" userId="e08ab8c445020617" providerId="LiveId" clId="{90D4A433-95B9-4F5E-B3D6-EAA0E7AE3F32}" dt="2022-10-24T04:09:19.929" v="5207" actId="20577"/>
+          <ac:spMkLst>
+            <pc:docMk/>
+            <pc:sldMk cId="1978051639" sldId="316"/>
+            <ac:spMk id="3" creationId="{64C827AE-726E-2566-B465-6E9719C90FAC}"/>
+          </ac:spMkLst>
+        </pc:spChg>
+        <pc:spChg chg="del">
+          <ac:chgData name="Daniel Lagos" userId="e08ab8c445020617" providerId="LiveId" clId="{90D4A433-95B9-4F5E-B3D6-EAA0E7AE3F32}" dt="2022-10-24T04:02:15.258" v="4350" actId="26606"/>
+          <ac:spMkLst>
+            <pc:docMk/>
+            <pc:sldMk cId="1978051639" sldId="316"/>
+            <ac:spMk id="12" creationId="{1C04857D-B1C1-41ED-B1B4-E3D6E3C7C4E6}"/>
+          </ac:spMkLst>
+        </pc:spChg>
+        <pc:spChg chg="del">
+          <ac:chgData name="Daniel Lagos" userId="e08ab8c445020617" providerId="LiveId" clId="{90D4A433-95B9-4F5E-B3D6-EAA0E7AE3F32}" dt="2022-10-24T04:02:15.258" v="4350" actId="26606"/>
+          <ac:spMkLst>
+            <pc:docMk/>
+            <pc:sldMk cId="1978051639" sldId="316"/>
+            <ac:spMk id="14" creationId="{E5A9FA1E-7A9B-4CDA-91BB-87575F63E28F}"/>
+          </ac:spMkLst>
+        </pc:spChg>
+        <pc:picChg chg="del">
+          <ac:chgData name="Daniel Lagos" userId="e08ab8c445020617" providerId="LiveId" clId="{90D4A433-95B9-4F5E-B3D6-EAA0E7AE3F32}" dt="2022-10-24T03:59:29.906" v="4347" actId="478"/>
+          <ac:picMkLst>
+            <pc:docMk/>
+            <pc:sldMk cId="1978051639" sldId="316"/>
+            <ac:picMk id="5" creationId="{27EF342B-891F-A73E-7857-E28CC8FF40A9}"/>
+          </ac:picMkLst>
+        </pc:picChg>
+        <pc:picChg chg="add mod">
+          <ac:chgData name="Daniel Lagos" userId="e08ab8c445020617" providerId="LiveId" clId="{90D4A433-95B9-4F5E-B3D6-EAA0E7AE3F32}" dt="2022-10-24T04:02:15.258" v="4350" actId="26606"/>
+          <ac:picMkLst>
+            <pc:docMk/>
+            <pc:sldMk cId="1978051639" sldId="316"/>
+            <ac:picMk id="6" creationId="{97FB48DA-B472-1B98-6AAB-891EB434F583}"/>
+          </ac:picMkLst>
+        </pc:picChg>
+        <pc:picChg chg="del">
+          <ac:chgData name="Daniel Lagos" userId="e08ab8c445020617" providerId="LiveId" clId="{90D4A433-95B9-4F5E-B3D6-EAA0E7AE3F32}" dt="2022-10-24T03:59:30.541" v="4348" actId="478"/>
+          <ac:picMkLst>
+            <pc:docMk/>
+            <pc:sldMk cId="1978051639" sldId="316"/>
+            <ac:picMk id="7" creationId="{CEDCF21C-136D-CE2B-80BD-3B09A9273EEC}"/>
+          </ac:picMkLst>
+        </pc:picChg>
+      </pc:sldChg>
+      <pc:sldChg chg="addSp delSp modSp mod">
+        <pc:chgData name="Daniel Lagos" userId="e08ab8c445020617" providerId="LiveId" clId="{90D4A433-95B9-4F5E-B3D6-EAA0E7AE3F32}" dt="2022-10-24T04:06:54.791" v="5034" actId="20577"/>
+        <pc:sldMkLst>
+          <pc:docMk/>
+          <pc:sldMk cId="966987848" sldId="317"/>
+        </pc:sldMkLst>
+        <pc:spChg chg="mod">
+          <ac:chgData name="Daniel Lagos" userId="e08ab8c445020617" providerId="LiveId" clId="{90D4A433-95B9-4F5E-B3D6-EAA0E7AE3F32}" dt="2022-10-24T03:57:22.761" v="4201" actId="26606"/>
+          <ac:spMkLst>
+            <pc:docMk/>
+            <pc:sldMk cId="966987848" sldId="317"/>
+            <ac:spMk id="2" creationId="{FA4A219A-70F0-773A-81B8-08A45FCF39FA}"/>
+          </ac:spMkLst>
+        </pc:spChg>
+        <pc:spChg chg="mod">
+          <ac:chgData name="Daniel Lagos" userId="e08ab8c445020617" providerId="LiveId" clId="{90D4A433-95B9-4F5E-B3D6-EAA0E7AE3F32}" dt="2022-10-24T04:06:54.791" v="5034" actId="20577"/>
+          <ac:spMkLst>
+            <pc:docMk/>
+            <pc:sldMk cId="966987848" sldId="317"/>
+            <ac:spMk id="3" creationId="{64C827AE-726E-2566-B465-6E9719C90FAC}"/>
+          </ac:spMkLst>
+        </pc:spChg>
+        <pc:picChg chg="add mod">
+          <ac:chgData name="Daniel Lagos" userId="e08ab8c445020617" providerId="LiveId" clId="{90D4A433-95B9-4F5E-B3D6-EAA0E7AE3F32}" dt="2022-10-24T03:57:22.761" v="4201" actId="26606"/>
+          <ac:picMkLst>
+            <pc:docMk/>
+            <pc:sldMk cId="966987848" sldId="317"/>
+            <ac:picMk id="5" creationId="{EE00B99E-D8F6-FBA4-25DE-2DFF8CDFCA23}"/>
+          </ac:picMkLst>
+        </pc:picChg>
+        <pc:picChg chg="del">
+          <ac:chgData name="Daniel Lagos" userId="e08ab8c445020617" providerId="LiveId" clId="{90D4A433-95B9-4F5E-B3D6-EAA0E7AE3F32}" dt="2022-10-24T03:57:18.074" v="4199" actId="478"/>
+          <ac:picMkLst>
+            <pc:docMk/>
+            <pc:sldMk cId="966987848" sldId="317"/>
+            <ac:picMk id="6" creationId="{928699FC-97FA-0298-F1A7-F12C6EEF59D1}"/>
+          </ac:picMkLst>
+        </pc:picChg>
+        <pc:picChg chg="add">
+          <ac:chgData name="Daniel Lagos" userId="e08ab8c445020617" providerId="LiveId" clId="{90D4A433-95B9-4F5E-B3D6-EAA0E7AE3F32}" dt="2022-10-24T03:57:22.761" v="4201" actId="26606"/>
+          <ac:picMkLst>
+            <pc:docMk/>
+            <pc:sldMk cId="966987848" sldId="317"/>
+            <ac:picMk id="10" creationId="{6AF6706C-CF07-43A1-BCC4-CBA5D33820DA}"/>
+          </ac:picMkLst>
+        </pc:picChg>
+      </pc:sldChg>
+      <pc:sldChg chg="addSp delSp modSp mod ord">
+        <pc:chgData name="Daniel Lagos" userId="e08ab8c445020617" providerId="LiveId" clId="{90D4A433-95B9-4F5E-B3D6-EAA0E7AE3F32}" dt="2022-10-24T04:06:23.070" v="5017" actId="14100"/>
+        <pc:sldMkLst>
+          <pc:docMk/>
+          <pc:sldMk cId="2523414989" sldId="318"/>
+        </pc:sldMkLst>
+        <pc:spChg chg="mod">
+          <ac:chgData name="Daniel Lagos" userId="e08ab8c445020617" providerId="LiveId" clId="{90D4A433-95B9-4F5E-B3D6-EAA0E7AE3F32}" dt="2022-10-24T04:04:13.638" v="4591" actId="26606"/>
+          <ac:spMkLst>
+            <pc:docMk/>
+            <pc:sldMk cId="2523414989" sldId="318"/>
+            <ac:spMk id="2" creationId="{FA4A219A-70F0-773A-81B8-08A45FCF39FA}"/>
+          </ac:spMkLst>
+        </pc:spChg>
+        <pc:spChg chg="mod">
+          <ac:chgData name="Daniel Lagos" userId="e08ab8c445020617" providerId="LiveId" clId="{90D4A433-95B9-4F5E-B3D6-EAA0E7AE3F32}" dt="2022-10-24T04:05:46.705" v="5012" actId="20577"/>
+          <ac:spMkLst>
+            <pc:docMk/>
+            <pc:sldMk cId="2523414989" sldId="318"/>
+            <ac:spMk id="3" creationId="{64C827AE-726E-2566-B465-6E9719C90FAC}"/>
+          </ac:spMkLst>
+        </pc:spChg>
+        <pc:picChg chg="add mod">
+          <ac:chgData name="Daniel Lagos" userId="e08ab8c445020617" providerId="LiveId" clId="{90D4A433-95B9-4F5E-B3D6-EAA0E7AE3F32}" dt="2022-10-24T04:06:23.070" v="5017" actId="14100"/>
+          <ac:picMkLst>
+            <pc:docMk/>
+            <pc:sldMk cId="2523414989" sldId="318"/>
+            <ac:picMk id="5" creationId="{A0004C80-5D59-B52C-236A-E03E2A9D6850}"/>
+          </ac:picMkLst>
+        </pc:picChg>
+        <pc:picChg chg="del">
+          <ac:chgData name="Daniel Lagos" userId="e08ab8c445020617" providerId="LiveId" clId="{90D4A433-95B9-4F5E-B3D6-EAA0E7AE3F32}" dt="2022-10-24T04:03:58.105" v="4589" actId="478"/>
+          <ac:picMkLst>
+            <pc:docMk/>
+            <pc:sldMk cId="2523414989" sldId="318"/>
+            <ac:picMk id="7" creationId="{A4D9B5CB-D72A-A1F0-BEA4-B051849789E8}"/>
+          </ac:picMkLst>
+        </pc:picChg>
+      </pc:sldChg>
+      <pc:sldChg chg="modSp mod">
+        <pc:chgData name="Daniel Lagos" userId="e08ab8c445020617" providerId="LiveId" clId="{90D4A433-95B9-4F5E-B3D6-EAA0E7AE3F32}" dt="2022-10-24T04:26:42.886" v="7006" actId="20577"/>
+        <pc:sldMkLst>
+          <pc:docMk/>
+          <pc:sldMk cId="3004269520" sldId="319"/>
+        </pc:sldMkLst>
+        <pc:spChg chg="mod">
+          <ac:chgData name="Daniel Lagos" userId="e08ab8c445020617" providerId="LiveId" clId="{90D4A433-95B9-4F5E-B3D6-EAA0E7AE3F32}" dt="2022-10-24T04:15:16.818" v="5615" actId="20577"/>
+          <ac:spMkLst>
+            <pc:docMk/>
+            <pc:sldMk cId="3004269520" sldId="319"/>
+            <ac:spMk id="2" creationId="{FA4A219A-70F0-773A-81B8-08A45FCF39FA}"/>
+          </ac:spMkLst>
+        </pc:spChg>
+        <pc:spChg chg="mod">
+          <ac:chgData name="Daniel Lagos" userId="e08ab8c445020617" providerId="LiveId" clId="{90D4A433-95B9-4F5E-B3D6-EAA0E7AE3F32}" dt="2022-10-24T04:26:42.886" v="7006" actId="20577"/>
+          <ac:spMkLst>
+            <pc:docMk/>
+            <pc:sldMk cId="3004269520" sldId="319"/>
+            <ac:spMk id="3" creationId="{64C827AE-726E-2566-B465-6E9719C90FAC}"/>
+          </ac:spMkLst>
+        </pc:spChg>
+      </pc:sldChg>
+      <pc:sldChg chg="modSp mod">
+        <pc:chgData name="Daniel Lagos" userId="e08ab8c445020617" providerId="LiveId" clId="{90D4A433-95B9-4F5E-B3D6-EAA0E7AE3F32}" dt="2022-10-24T04:29:27.445" v="7354" actId="20577"/>
+        <pc:sldMkLst>
+          <pc:docMk/>
+          <pc:sldMk cId="2491391348" sldId="320"/>
+        </pc:sldMkLst>
+        <pc:spChg chg="mod">
+          <ac:chgData name="Daniel Lagos" userId="e08ab8c445020617" providerId="LiveId" clId="{90D4A433-95B9-4F5E-B3D6-EAA0E7AE3F32}" dt="2022-10-24T04:29:27.445" v="7354" actId="20577"/>
+          <ac:spMkLst>
+            <pc:docMk/>
+            <pc:sldMk cId="2491391348" sldId="320"/>
+            <ac:spMk id="3" creationId="{64C827AE-726E-2566-B465-6E9719C90FAC}"/>
+          </ac:spMkLst>
+        </pc:spChg>
+      </pc:sldChg>
+      <pc:sldChg chg="addSp modSp new del mod setBg">
+        <pc:chgData name="Daniel Lagos" userId="e08ab8c445020617" providerId="LiveId" clId="{90D4A433-95B9-4F5E-B3D6-EAA0E7AE3F32}" dt="2022-10-24T03:04:58.760" v="1667" actId="2696"/>
+        <pc:sldMkLst>
+          <pc:docMk/>
+          <pc:sldMk cId="1612815738" sldId="321"/>
+        </pc:sldMkLst>
+        <pc:spChg chg="mod">
+          <ac:chgData name="Daniel Lagos" userId="e08ab8c445020617" providerId="LiveId" clId="{90D4A433-95B9-4F5E-B3D6-EAA0E7AE3F32}" dt="2022-10-24T03:03:36.076" v="1660" actId="26606"/>
+          <ac:spMkLst>
+            <pc:docMk/>
+            <pc:sldMk cId="1612815738" sldId="321"/>
+            <ac:spMk id="2" creationId="{044581AD-2A37-CEEB-4C67-18C9A3162B2A}"/>
+          </ac:spMkLst>
+        </pc:spChg>
+        <pc:spChg chg="mod">
+          <ac:chgData name="Daniel Lagos" userId="e08ab8c445020617" providerId="LiveId" clId="{90D4A433-95B9-4F5E-B3D6-EAA0E7AE3F32}" dt="2022-10-24T03:03:36.076" v="1660" actId="26606"/>
+          <ac:spMkLst>
+            <pc:docMk/>
+            <pc:sldMk cId="1612815738" sldId="321"/>
+            <ac:spMk id="3" creationId="{26A99305-018E-7D03-DBEC-0ECCD0A4565C}"/>
+          </ac:spMkLst>
+        </pc:spChg>
+        <pc:picChg chg="add mod">
+          <ac:chgData name="Daniel Lagos" userId="e08ab8c445020617" providerId="LiveId" clId="{90D4A433-95B9-4F5E-B3D6-EAA0E7AE3F32}" dt="2022-10-24T03:03:36.076" v="1660" actId="26606"/>
+          <ac:picMkLst>
+            <pc:docMk/>
+            <pc:sldMk cId="1612815738" sldId="321"/>
+            <ac:picMk id="5" creationId="{75EF5CC1-CF08-CA8D-44A5-AF73B7AF92CC}"/>
+          </ac:picMkLst>
+        </pc:picChg>
+      </pc:sldChg>
+      <pc:sldChg chg="add del setBg">
+        <pc:chgData name="Daniel Lagos" userId="e08ab8c445020617" providerId="LiveId" clId="{90D4A433-95B9-4F5E-B3D6-EAA0E7AE3F32}" dt="2022-10-24T03:06:14.041" v="1679" actId="2696"/>
+        <pc:sldMkLst>
+          <pc:docMk/>
+          <pc:sldMk cId="2302282287" sldId="321"/>
+        </pc:sldMkLst>
+      </pc:sldChg>
+      <pc:sldChg chg="modSp new del mod">
+        <pc:chgData name="Daniel Lagos" userId="e08ab8c445020617" providerId="LiveId" clId="{90D4A433-95B9-4F5E-B3D6-EAA0E7AE3F32}" dt="2022-10-24T04:27:10.141" v="7007" actId="47"/>
+        <pc:sldMkLst>
+          <pc:docMk/>
+          <pc:sldMk cId="3199493215" sldId="321"/>
+        </pc:sldMkLst>
+        <pc:spChg chg="mod">
+          <ac:chgData name="Daniel Lagos" userId="e08ab8c445020617" providerId="LiveId" clId="{90D4A433-95B9-4F5E-B3D6-EAA0E7AE3F32}" dt="2022-10-24T04:25:34.884" v="6960"/>
+          <ac:spMkLst>
+            <pc:docMk/>
+            <pc:sldMk cId="3199493215" sldId="321"/>
+            <ac:spMk id="2" creationId="{8940AD96-48E2-4148-5DB9-7D2BBB975082}"/>
+          </ac:spMkLst>
+        </pc:spChg>
+        <pc:spChg chg="mod">
+          <ac:chgData name="Daniel Lagos" userId="e08ab8c445020617" providerId="LiveId" clId="{90D4A433-95B9-4F5E-B3D6-EAA0E7AE3F32}" dt="2022-10-24T04:25:28.525" v="6959"/>
+          <ac:spMkLst>
+            <pc:docMk/>
+            <pc:sldMk cId="3199493215" sldId="321"/>
+            <ac:spMk id="3" creationId="{64753978-C5E1-E876-F0BC-1B2B691B64D9}"/>
           </ac:spMkLst>
         </pc:spChg>
       </pc:sldChg>
@@ -7850,6 +8894,15 @@
 <file path=ppt/slides/slide20.xml><?xml version="1.0" encoding="utf-8"?>
 <p:sld xmlns:a="http://schemas.openxmlformats.org/drawingml/2006/main" xmlns:r="http://schemas.openxmlformats.org/officeDocument/2006/relationships" xmlns:p="http://schemas.openxmlformats.org/presentationml/2006/main">
   <p:cSld>
+    <p:bg>
+      <p:bgPr>
+        <a:blipFill>
+          <a:blip r:embed="rId2"/>
+          <a:stretch/>
+        </a:blipFill>
+        <a:effectLst/>
+      </p:bgPr>
+    </p:bg>
     <p:spTree>
       <p:nvGrpSpPr>
         <p:cNvPr id="1" name=""/>
@@ -7880,9 +8933,16 @@
             <p:ph type="title"/>
           </p:nvPr>
         </p:nvSpPr>
-        <p:spPr/>
-        <p:txBody>
-          <a:bodyPr/>
+        <p:spPr>
+          <a:xfrm>
+            <a:off x="825909" y="808055"/>
+            <a:ext cx="3979205" cy="1453363"/>
+          </a:xfrm>
+        </p:spPr>
+        <p:txBody>
+          <a:bodyPr>
+            <a:normAutofit/>
+          </a:bodyPr>
           <a:lstStyle/>
           <a:p>
             <a:r>
@@ -7908,14 +8968,21 @@
             <p:ph idx="1"/>
           </p:nvPr>
         </p:nvSpPr>
-        <p:spPr/>
-        <p:txBody>
-          <a:bodyPr anchor="t"/>
-          <a:lstStyle/>
-          <a:p>
-            <a:r>
-              <a:rPr lang="en-US" dirty="0"/>
-              <a:t>Confirming data set is clean:  all values over 0, n= 21,944, devoid of variables not in use. </a:t>
+        <p:spPr>
+          <a:xfrm>
+            <a:off x="802178" y="2261420"/>
+            <a:ext cx="4002936" cy="3637935"/>
+          </a:xfrm>
+        </p:spPr>
+        <p:txBody>
+          <a:bodyPr>
+            <a:normAutofit/>
+          </a:bodyPr>
+          <a:lstStyle/>
+          <a:p>
+            <a:r>
+              <a:rPr lang="en-US" dirty="0"/>
+              <a:t>Original Data set:  Confirming data set is clean:  all values over 0, n= 21,944, devoid of variables not in use. </a:t>
             </a:r>
           </a:p>
           <a:p>
@@ -7938,19 +9005,47 @@
           <p:nvPr/>
         </p:nvPicPr>
         <p:blipFill>
-          <a:blip r:embed="rId2"/>
+          <a:blip r:embed="rId3"/>
           <a:stretch>
             <a:fillRect/>
           </a:stretch>
         </p:blipFill>
         <p:spPr>
           <a:xfrm>
-            <a:off x="2930402" y="2636226"/>
-            <a:ext cx="6067425" cy="3467100"/>
-          </a:xfrm>
-          <a:prstGeom prst="rect">
-            <a:avLst/>
+            <a:off x="5289752" y="1606286"/>
+            <a:ext cx="6095593" cy="3483196"/>
+          </a:xfrm>
+          <a:prstGeom prst="roundRect">
+            <a:avLst>
+              <a:gd name="adj" fmla="val 4380"/>
+            </a:avLst>
           </a:prstGeom>
+          <a:ln w="50800" cap="sq" cmpd="dbl">
+            <a:gradFill flip="none" rotWithShape="1">
+              <a:gsLst>
+                <a:gs pos="0">
+                  <a:srgbClr val="FFFFFF"/>
+                </a:gs>
+                <a:gs pos="100000">
+                  <a:schemeClr val="tx1">
+                    <a:alpha val="0"/>
+                  </a:schemeClr>
+                </a:gs>
+              </a:gsLst>
+              <a:path path="circle">
+                <a:fillToRect l="50000" t="50000" r="50000" b="50000"/>
+              </a:path>
+              <a:tileRect/>
+            </a:gradFill>
+            <a:miter lim="800000"/>
+          </a:ln>
+          <a:effectLst>
+            <a:outerShdw blurRad="254000" algn="tl" rotWithShape="0">
+              <a:srgbClr val="000000">
+                <a:alpha val="43000"/>
+              </a:srgbClr>
+            </a:outerShdw>
+          </a:effectLst>
         </p:spPr>
       </p:pic>
     </p:spTree>
@@ -8150,7 +9245,7 @@
       </p:sp>
       <p:sp>
         <p:nvSpPr>
-          <p:cNvPr id="21" name="Rectangle 14">
+          <p:cNvPr id="1037" name="Rectangle 1030">
             <a:extLst>
               <a:ext uri="{FF2B5EF4-FFF2-40B4-BE49-F238E27FC236}">
                 <a16:creationId xmlns:a16="http://schemas.microsoft.com/office/drawing/2014/main" id="{1C04857D-B1C1-41ED-B1B4-E3D6E3C7C4E6}"/>
@@ -8244,13 +9339,19 @@
           <a:p>
             <a:r>
               <a:rPr lang="en-US" dirty="0"/>
-              <a:t>Histogram of dependent variable DEPRESSION.  Left Skew.</a:t>
-            </a:r>
-          </a:p>
-          <a:p>
-            <a:r>
-              <a:rPr lang="en-US" dirty="0"/>
-              <a:t>AJ32:  Feeling depressed in the past 30 days?</a:t>
+              <a:t>Histogram of dependent variable DEPRESSION.  Majority of observation “not-depressed” compared to “depressed”.</a:t>
+            </a:r>
+          </a:p>
+          <a:p>
+            <a:r>
+              <a:rPr lang="en-US" dirty="0"/>
+              <a:t>AJ32 question:  Feeling depressed in the past 30 days?  </a:t>
+            </a:r>
+          </a:p>
+          <a:p>
+            <a:r>
+              <a:rPr lang="en-US" dirty="0"/>
+              <a:t>Changed label of AJ32 to DEPRESSION.</a:t>
             </a:r>
           </a:p>
           <a:p>
@@ -8263,42 +9364,21 @@
             <a:pPr lvl="1"/>
             <a:r>
               <a:rPr lang="en-US" dirty="0"/>
-              <a:t>1 = all the time</a:t>
+              <a:t>0 = Depressed</a:t>
             </a:r>
           </a:p>
           <a:p>
             <a:pPr lvl="1"/>
             <a:r>
               <a:rPr lang="en-US" dirty="0"/>
-              <a:t>2 = most of the time</a:t>
-            </a:r>
-          </a:p>
-          <a:p>
-            <a:pPr lvl="1"/>
-            <a:r>
-              <a:rPr lang="en-US" dirty="0"/>
-              <a:t>3 = some of the time</a:t>
-            </a:r>
-          </a:p>
-          <a:p>
-            <a:pPr lvl="1"/>
-            <a:r>
-              <a:rPr lang="en-US" dirty="0"/>
-              <a:t>4 = a little of the time</a:t>
-            </a:r>
-          </a:p>
-          <a:p>
-            <a:pPr lvl="1"/>
-            <a:r>
-              <a:rPr lang="en-US" dirty="0"/>
-              <a:t>5 = not at all</a:t>
-            </a:r>
-          </a:p>
-        </p:txBody>
-      </p:sp>
-      <p:sp>
-        <p:nvSpPr>
-          <p:cNvPr id="22" name="Rounded Rectangle 32">
+              <a:t>1 = Not-Depressed</a:t>
+            </a:r>
+          </a:p>
+        </p:txBody>
+      </p:sp>
+      <p:sp>
+        <p:nvSpPr>
+          <p:cNvPr id="1038" name="Rounded Rectangle 32">
             <a:extLst>
               <a:ext uri="{FF2B5EF4-FFF2-40B4-BE49-F238E27FC236}">
                 <a16:creationId xmlns:a16="http://schemas.microsoft.com/office/drawing/2014/main" id="{E5A9FA1E-7A9B-4CDA-91BB-87575F63E28F}"/>
@@ -8386,47 +9466,63 @@
       </p:sp>
       <p:pic>
         <p:nvPicPr>
-          <p:cNvPr id="8" name="Picture 7">
+          <p:cNvPr id="1026" name="Picture 2">
             <a:extLst>
               <a:ext uri="{FF2B5EF4-FFF2-40B4-BE49-F238E27FC236}">
-                <a16:creationId xmlns:a16="http://schemas.microsoft.com/office/drawing/2014/main" id="{E9CE5829-30D5-A94B-71DD-F2E0F92A5C29}"/>
+                <a16:creationId xmlns:a16="http://schemas.microsoft.com/office/drawing/2014/main" id="{94EFF6D2-7E3E-C12C-C241-5096ACCB24D9}"/>
               </a:ext>
             </a:extLst>
           </p:cNvPr>
           <p:cNvPicPr>
-            <a:picLocks noChangeAspect="1"/>
+            <a:picLocks noChangeAspect="1" noChangeArrowheads="1"/>
           </p:cNvPicPr>
           <p:nvPr/>
         </p:nvPicPr>
         <p:blipFill>
-          <a:blip r:embed="rId3"/>
+          <a:blip r:embed="rId3">
+            <a:extLst>
+              <a:ext uri="{28A0092B-C50C-407E-A947-70E740481C1C}">
+                <a14:useLocalDpi xmlns:a14="http://schemas.microsoft.com/office/drawing/2010/main" val="0"/>
+              </a:ext>
+            </a:extLst>
+          </a:blip>
           <a:stretch>
             <a:fillRect/>
           </a:stretch>
         </p:blipFill>
-        <p:spPr>
+        <p:spPr bwMode="auto">
           <a:xfrm>
-            <a:off x="6774785" y="733077"/>
-            <a:ext cx="4040751" cy="2636590"/>
+            <a:off x="6782764" y="3504276"/>
+            <a:ext cx="4024793" cy="2636590"/>
           </a:xfrm>
           <a:prstGeom prst="roundRect">
             <a:avLst>
               <a:gd name="adj" fmla="val 4207"/>
             </a:avLst>
           </a:prstGeom>
+          <a:noFill/>
           <a:ln w="50800" cap="sq" cmpd="dbl">
             <a:noFill/>
             <a:miter lim="800000"/>
           </a:ln>
           <a:effectLst/>
+          <a:extLst>
+            <a:ext uri="{909E8E84-426E-40DD-AFC4-6F175D3DCCD1}">
+              <a14:hiddenFill xmlns:a14="http://schemas.microsoft.com/office/drawing/2010/main">
+                <a:solidFill>
+                  <a:srgbClr val="FFFFFF"/>
+                </a:solidFill>
+              </a14:hiddenFill>
+            </a:ext>
+          </a:extLst>
         </p:spPr>
       </p:pic>
       <p:pic>
         <p:nvPicPr>
-          <p:cNvPr id="10" name="Picture 9">
+          <p:cNvPr id="7" name="Picture 6">
             <a:extLst>
               <a:ext uri="{FF2B5EF4-FFF2-40B4-BE49-F238E27FC236}">
-                <a16:creationId xmlns:a16="http://schemas.microsoft.com/office/drawing/2014/main" id="{6D87407C-7549-7608-29B3-30718BDFE9F8}"/>
+                <a16:creationId xmlns:a16="http://schemas.microsoft.com/office/drawing/2014/main" id="{52E62D81-396B-18F0-1716-845F08951ABA}"/>
               </a:ext>
             </a:extLst>
           </p:cNvPr>
@@ -8443,8 +9539,8 @@
         </p:blipFill>
         <p:spPr>
           <a:xfrm>
-            <a:off x="6588808" y="3483966"/>
-            <a:ext cx="4412702" cy="2636590"/>
+            <a:off x="6398259" y="815411"/>
+            <a:ext cx="4793801" cy="2636590"/>
           </a:xfrm>
           <a:prstGeom prst="roundRect">
             <a:avLst>
@@ -10271,6 +11367,15 @@
 <file path=ppt/slides/slide31.xml><?xml version="1.0" encoding="utf-8"?>
 <p:sld xmlns:a="http://schemas.openxmlformats.org/drawingml/2006/main" xmlns:r="http://schemas.openxmlformats.org/officeDocument/2006/relationships" xmlns:p="http://schemas.openxmlformats.org/presentationml/2006/main">
   <p:cSld>
+    <p:bg>
+      <p:bgPr>
+        <a:blipFill>
+          <a:blip r:embed="rId2"/>
+          <a:stretch/>
+        </a:blipFill>
+        <a:effectLst/>
+      </p:bgPr>
+    </p:bg>
     <p:spTree>
       <p:nvGrpSpPr>
         <p:cNvPr id="1" name=""/>
@@ -10301,15 +11406,23 @@
             <p:ph type="title"/>
           </p:nvPr>
         </p:nvSpPr>
-        <p:spPr/>
-        <p:txBody>
-          <a:bodyPr/>
-          <a:lstStyle/>
-          <a:p>
-            <a:r>
-              <a:rPr lang="en-US" dirty="0"/>
+        <p:spPr>
+          <a:xfrm>
+            <a:off x="825909" y="808055"/>
+            <a:ext cx="3979205" cy="1453363"/>
+          </a:xfrm>
+        </p:spPr>
+        <p:txBody>
+          <a:bodyPr>
+            <a:normAutofit/>
+          </a:bodyPr>
+          <a:lstStyle/>
+          <a:p>
+            <a:r>
+              <a:rPr lang="en-US"/>
               <a:t>Prepare  </a:t>
             </a:r>
+            <a:endParaRPr lang="en-US" dirty="0"/>
           </a:p>
         </p:txBody>
       </p:sp>
@@ -10329,46 +11442,53 @@
             <p:ph idx="1"/>
           </p:nvPr>
         </p:nvSpPr>
-        <p:spPr/>
-        <p:txBody>
-          <a:bodyPr/>
-          <a:lstStyle/>
-          <a:p>
-            <a:r>
-              <a:rPr lang="en-US" u="sng" dirty="0"/>
+        <p:spPr>
+          <a:xfrm>
+            <a:off x="802178" y="2261420"/>
+            <a:ext cx="4002936" cy="3637935"/>
+          </a:xfrm>
+        </p:spPr>
+        <p:txBody>
+          <a:bodyPr>
+            <a:normAutofit/>
+          </a:bodyPr>
+          <a:lstStyle/>
+          <a:p>
+            <a:r>
+              <a:rPr lang="en-US" u="sng"/>
               <a:t>Actions taken</a:t>
             </a:r>
             <a:r>
-              <a:rPr lang="en-US" dirty="0"/>
+              <a:rPr lang="en-US"/>
               <a:t>:  </a:t>
             </a:r>
           </a:p>
           <a:p>
             <a:pPr lvl="1"/>
             <a:r>
-              <a:rPr lang="en-US" dirty="0"/>
+              <a:rPr lang="en-US"/>
               <a:t>Before Analyze phase was conducted, variables were renamed so that the variable names were less ambiguous.</a:t>
             </a:r>
           </a:p>
           <a:p>
             <a:pPr lvl="1"/>
             <a:r>
-              <a:rPr lang="en-US" dirty="0"/>
+              <a:rPr lang="en-US"/>
               <a:t>Var DEPRESSION was changed to a binary structure</a:t>
             </a:r>
           </a:p>
           <a:p>
             <a:pPr lvl="2"/>
             <a:r>
-              <a:rPr lang="en-US" dirty="0"/>
-              <a:t>If DEPRESSION = 5 then NEW_DEP = 2 (not depressed)  </a:t>
+              <a:rPr lang="en-US"/>
+              <a:t>If DEPRESSION = 5 then NEW_DEP = 1  (not depressed)  </a:t>
             </a:r>
           </a:p>
           <a:p>
             <a:pPr lvl="2"/>
             <a:r>
-              <a:rPr lang="en-US" dirty="0"/>
-              <a:t>If DEPRESSION &lt;= 5 then NEW_DEP = 1 (depressed)</a:t>
+              <a:rPr lang="en-US"/>
+              <a:t>If DEPRESSION &lt;= 5 then NEW_DEP = 0  (depressed)</a:t>
             </a:r>
           </a:p>
           <a:p>
@@ -10376,6 +11496,64 @@
           </a:p>
         </p:txBody>
       </p:sp>
+      <p:pic>
+        <p:nvPicPr>
+          <p:cNvPr id="4" name="Picture 3">
+            <a:extLst>
+              <a:ext uri="{FF2B5EF4-FFF2-40B4-BE49-F238E27FC236}">
+                <a16:creationId xmlns:a16="http://schemas.microsoft.com/office/drawing/2014/main" id="{A329297A-BB3F-189B-9512-F51D3C038515}"/>
+              </a:ext>
+            </a:extLst>
+          </p:cNvPr>
+          <p:cNvPicPr>
+            <a:picLocks noChangeAspect="1"/>
+          </p:cNvPicPr>
+          <p:nvPr/>
+        </p:nvPicPr>
+        <p:blipFill>
+          <a:blip r:embed="rId3"/>
+          <a:stretch>
+            <a:fillRect/>
+          </a:stretch>
+        </p:blipFill>
+        <p:spPr>
+          <a:xfrm>
+            <a:off x="5289752" y="1914994"/>
+            <a:ext cx="6095593" cy="2865780"/>
+          </a:xfrm>
+          <a:prstGeom prst="roundRect">
+            <a:avLst>
+              <a:gd name="adj" fmla="val 4380"/>
+            </a:avLst>
+          </a:prstGeom>
+          <a:ln w="50800" cap="sq" cmpd="dbl">
+            <a:gradFill flip="none" rotWithShape="1">
+              <a:gsLst>
+                <a:gs pos="0">
+                  <a:srgbClr val="FFFFFF"/>
+                </a:gs>
+                <a:gs pos="100000">
+                  <a:schemeClr val="tx1">
+                    <a:alpha val="0"/>
+                  </a:schemeClr>
+                </a:gs>
+              </a:gsLst>
+              <a:path path="circle">
+                <a:fillToRect l="50000" t="50000" r="50000" b="50000"/>
+              </a:path>
+              <a:tileRect/>
+            </a:gradFill>
+            <a:miter lim="800000"/>
+          </a:ln>
+          <a:effectLst>
+            <a:outerShdw blurRad="254000" algn="tl" rotWithShape="0">
+              <a:srgbClr val="000000">
+                <a:alpha val="43000"/>
+              </a:srgbClr>
+            </a:outerShdw>
+          </a:effectLst>
+        </p:spPr>
+      </p:pic>
     </p:spTree>
     <p:extLst>
       <p:ext uri="{BB962C8B-B14F-4D97-AF65-F5344CB8AC3E}">
@@ -10433,8 +11611,8 @@
         </p:nvSpPr>
         <p:spPr>
           <a:xfrm>
-            <a:off x="685802" y="609600"/>
-            <a:ext cx="6282266" cy="1456267"/>
+            <a:off x="825909" y="808055"/>
+            <a:ext cx="3979205" cy="1453363"/>
           </a:xfrm>
         </p:spPr>
         <p:txBody>
@@ -10468,8 +11646,8 @@
         </p:nvSpPr>
         <p:spPr>
           <a:xfrm>
-            <a:off x="685802" y="2142067"/>
-            <a:ext cx="6282266" cy="4496125"/>
+            <a:off x="802178" y="1861930"/>
+            <a:ext cx="4002936" cy="4890053"/>
           </a:xfrm>
         </p:spPr>
         <p:txBody>
@@ -10478,45 +11656,128 @@
           </a:bodyPr>
           <a:lstStyle/>
           <a:p>
-            <a:r>
-              <a:rPr lang="en-US" dirty="0"/>
-              <a:t>This is a classification problem with labels, thus supervised type of ML.  Decision tree algorithm will be used.  </a:t>
-            </a:r>
-          </a:p>
-          <a:p>
-            <a:r>
-              <a:rPr lang="en-US" dirty="0"/>
-              <a:t>It should be noted that this model was originally run with 5 levels to var DEPRESSION.  Under this version of the model the histogram of predictions, precision score, and recall score contradicted accuracy score.  As a remedy, it was decided to change the structure of var DEPRESSION into binary.  The results of this new model will be reported, as they are the same as the results when DEPRESSION had 5 levels.</a:t>
-            </a:r>
-          </a:p>
-          <a:p>
-            <a:r>
-              <a:rPr lang="en-US" dirty="0"/>
-              <a:t>Parameters of model provided.  </a:t>
-            </a:r>
-          </a:p>
-          <a:p>
-            <a:pPr lvl="1"/>
-            <a:r>
-              <a:rPr lang="en-US" dirty="0"/>
-              <a:t>Criterion = entropy as this is better suited for non-binary data.</a:t>
-            </a:r>
-          </a:p>
-          <a:p>
-            <a:pPr lvl="1"/>
-            <a:r>
-              <a:rPr lang="en-US" dirty="0"/>
-              <a:t>All other parameters set to prevent overfitting.</a:t>
+            <a:pPr>
+              <a:lnSpc>
+                <a:spcPct val="90000"/>
+              </a:lnSpc>
+            </a:pPr>
+            <a:r>
+              <a:rPr lang="en-US" sz="1500" dirty="0"/>
+              <a:t>This is a classification problem with labels, thus supervised type of ML.  Neural network used, with the following hyperparameters for layers</a:t>
+            </a:r>
+          </a:p>
+          <a:p>
+            <a:pPr lvl="1">
+              <a:lnSpc>
+                <a:spcPct val="90000"/>
+              </a:lnSpc>
+            </a:pPr>
+            <a:r>
+              <a:rPr lang="en-US" sz="1500" dirty="0"/>
+              <a:t>Input layer:  3 neurons</a:t>
+            </a:r>
+          </a:p>
+          <a:p>
+            <a:pPr lvl="1">
+              <a:lnSpc>
+                <a:spcPct val="90000"/>
+              </a:lnSpc>
+            </a:pPr>
+            <a:r>
+              <a:rPr lang="en-US" sz="1500" dirty="0"/>
+              <a:t>Hidden layers:  4 layers, 300 neurons for all layers except for the last, contain 100 neurons.  Activation function to be “</a:t>
+            </a:r>
+            <a:r>
+              <a:rPr lang="en-US" sz="1500" dirty="0" err="1"/>
+              <a:t>relu</a:t>
+            </a:r>
+            <a:r>
+              <a:rPr lang="en-US" sz="1500" dirty="0"/>
+              <a:t>” for all layers </a:t>
+            </a:r>
+          </a:p>
+          <a:p>
+            <a:pPr lvl="1">
+              <a:lnSpc>
+                <a:spcPct val="90000"/>
+              </a:lnSpc>
+            </a:pPr>
+            <a:r>
+              <a:rPr lang="en-US" sz="1500" dirty="0"/>
+              <a:t>Output layer:  2 neurons, one for each class within var NEW_DEP.  Activation function to be “</a:t>
+            </a:r>
+            <a:r>
+              <a:rPr lang="en-US" sz="1500" dirty="0" err="1"/>
+              <a:t>softmax</a:t>
+            </a:r>
+            <a:r>
+              <a:rPr lang="en-US" sz="1500" dirty="0"/>
+              <a:t>”</a:t>
+            </a:r>
+          </a:p>
+          <a:p>
+            <a:pPr>
+              <a:lnSpc>
+                <a:spcPct val="90000"/>
+              </a:lnSpc>
+            </a:pPr>
+            <a:r>
+              <a:rPr lang="en-US" sz="1500" dirty="0"/>
+              <a:t>Other hyperparameters.  </a:t>
+            </a:r>
+          </a:p>
+          <a:p>
+            <a:pPr lvl="1">
+              <a:lnSpc>
+                <a:spcPct val="90000"/>
+              </a:lnSpc>
+            </a:pPr>
+            <a:r>
+              <a:rPr lang="en-US" sz="1500" dirty="0"/>
+              <a:t>Loss:  sparse categorical cross entropy</a:t>
+            </a:r>
+          </a:p>
+          <a:p>
+            <a:pPr lvl="1">
+              <a:lnSpc>
+                <a:spcPct val="90000"/>
+              </a:lnSpc>
+            </a:pPr>
+            <a:r>
+              <a:rPr lang="en-US" sz="1500" dirty="0"/>
+              <a:t>Optimizer:  gradient descent</a:t>
+            </a:r>
+          </a:p>
+          <a:p>
+            <a:pPr lvl="1">
+              <a:lnSpc>
+                <a:spcPct val="90000"/>
+              </a:lnSpc>
+            </a:pPr>
+            <a:r>
+              <a:rPr lang="en-US" sz="1500" dirty="0"/>
+              <a:t>Epochs:  50</a:t>
+            </a:r>
+          </a:p>
+          <a:p>
+            <a:pPr lvl="1">
+              <a:lnSpc>
+                <a:spcPct val="90000"/>
+              </a:lnSpc>
+            </a:pPr>
+            <a:r>
+              <a:rPr lang="en-US" sz="1500" dirty="0"/>
+              <a:t>Batch size:  32</a:t>
             </a:r>
           </a:p>
         </p:txBody>
       </p:sp>
       <p:pic>
         <p:nvPicPr>
-          <p:cNvPr id="5" name="Picture 4">
+          <p:cNvPr id="6" name="Picture 5" descr="Table&#10;&#10;Description automatically generated">
             <a:extLst>
               <a:ext uri="{FF2B5EF4-FFF2-40B4-BE49-F238E27FC236}">
-                <a16:creationId xmlns:a16="http://schemas.microsoft.com/office/drawing/2014/main" id="{F3D7FA0B-77F8-6D08-B846-1F8CA35430F1}"/>
+                <a16:creationId xmlns:a16="http://schemas.microsoft.com/office/drawing/2014/main" id="{C49BBC22-866A-C6A4-EE0C-2E34A7D78CA6}"/>
               </a:ext>
             </a:extLst>
           </p:cNvPr>
@@ -10533,8 +11794,8 @@
         </p:blipFill>
         <p:spPr>
           <a:xfrm>
-            <a:off x="7195281" y="1995384"/>
-            <a:ext cx="4375024" cy="3543769"/>
+            <a:off x="5289752" y="1519207"/>
+            <a:ext cx="6095593" cy="3657355"/>
           </a:xfrm>
           <a:prstGeom prst="roundRect">
             <a:avLst>
@@ -10610,10 +11871,10 @@
       </p:grpSpPr>
       <p:pic>
         <p:nvPicPr>
-          <p:cNvPr id="13" name="Picture 12">
+          <p:cNvPr id="32" name="Picture 24">
             <a:extLst>
               <a:ext uri="{FF2B5EF4-FFF2-40B4-BE49-F238E27FC236}">
-                <a16:creationId xmlns:a16="http://schemas.microsoft.com/office/drawing/2014/main" id="{83543A10-04EE-49E0-A9DE-22E1FAB9AED9}"/>
+                <a16:creationId xmlns:a16="http://schemas.microsoft.com/office/drawing/2014/main" id="{E5AA88FA-FA9B-40A0-AB33-86E7729DA88E}"/>
               </a:ext>
               <a:ext uri="{C183D7F6-B498-43B3-948B-1728B52AA6E4}">
                 <adec:decorative xmlns:adec="http://schemas.microsoft.com/office/drawing/2017/decorative" val="1"/>
@@ -10683,9 +11944,10 @@
           <a:p>
             <a:pPr algn="r"/>
             <a:r>
-              <a:rPr lang="en-US" sz="4000" dirty="0"/>
+              <a:rPr lang="en-US" sz="4000"/>
               <a:t>Analyze  </a:t>
             </a:r>
+            <a:endParaRPr lang="en-US" sz="4000" dirty="0"/>
           </a:p>
         </p:txBody>
       </p:sp>
@@ -10721,18 +11983,19 @@
               <a:buNone/>
             </a:pPr>
             <a:r>
-              <a:rPr lang="en-US" cap="all" dirty="0"/>
+              <a:rPr lang="en-US" cap="all"/>
               <a:t>Independent variables were split in the manner Shown above</a:t>
             </a:r>
-          </a:p>
-        </p:txBody>
-      </p:sp>
-      <p:sp>
-        <p:nvSpPr>
-          <p:cNvPr id="15" name="Rounded Rectangle 17">
+            <a:endParaRPr lang="en-US" cap="all" dirty="0"/>
+          </a:p>
+        </p:txBody>
+      </p:sp>
+      <p:sp>
+        <p:nvSpPr>
+          <p:cNvPr id="33" name="Rounded Rectangle 17">
             <a:extLst>
               <a:ext uri="{FF2B5EF4-FFF2-40B4-BE49-F238E27FC236}">
-                <a16:creationId xmlns:a16="http://schemas.microsoft.com/office/drawing/2014/main" id="{9B898DA6-F186-4D59-8802-5BC1FE9B7939}"/>
+                <a16:creationId xmlns:a16="http://schemas.microsoft.com/office/drawing/2014/main" id="{8B10BF6C-3665-4F44-AECF-93A3A986EEFF}"/>
               </a:ext>
               <a:ext uri="{C183D7F6-B498-43B3-948B-1728B52AA6E4}">
                 <adec:decorative xmlns:adec="http://schemas.microsoft.com/office/drawing/2017/decorative" val="1"/>
@@ -10753,7 +12016,7 @@
         <p:spPr>
           <a:xfrm>
             <a:off x="914400" y="614085"/>
-            <a:ext cx="10360152" cy="3794760"/>
+            <a:ext cx="3336883" cy="3794760"/>
           </a:xfrm>
           <a:prstGeom prst="roundRect">
             <a:avLst>
@@ -10817,10 +12080,10 @@
       </p:sp>
       <p:pic>
         <p:nvPicPr>
-          <p:cNvPr id="8" name="Picture 7">
+          <p:cNvPr id="5" name="Picture 4">
             <a:extLst>
               <a:ext uri="{FF2B5EF4-FFF2-40B4-BE49-F238E27FC236}">
-                <a16:creationId xmlns:a16="http://schemas.microsoft.com/office/drawing/2014/main" id="{80346EFF-D8AB-BD24-1860-4597B7ED1A47}"/>
+                <a16:creationId xmlns:a16="http://schemas.microsoft.com/office/drawing/2014/main" id="{7667E22D-B2C0-FF6C-D341-E3DF1DF7CC6A}"/>
               </a:ext>
             </a:extLst>
           </p:cNvPr>
@@ -10837,12 +12100,12 @@
         </p:blipFill>
         <p:spPr>
           <a:xfrm>
-            <a:off x="6665415" y="711200"/>
-            <a:ext cx="4205664" cy="3606800"/>
+            <a:off x="1028700" y="1259216"/>
+            <a:ext cx="3108282" cy="2510767"/>
           </a:xfrm>
           <a:prstGeom prst="roundRect">
             <a:avLst>
-              <a:gd name="adj" fmla="val 4380"/>
+              <a:gd name="adj" fmla="val 3441"/>
             </a:avLst>
           </a:prstGeom>
           <a:ln w="50800" cap="sq" cmpd="dbl">
@@ -10852,12 +12115,100 @@
           <a:effectLst/>
         </p:spPr>
       </p:pic>
+      <p:sp>
+        <p:nvSpPr>
+          <p:cNvPr id="34" name="Rounded Rectangle 19">
+            <a:extLst>
+              <a:ext uri="{FF2B5EF4-FFF2-40B4-BE49-F238E27FC236}">
+                <a16:creationId xmlns:a16="http://schemas.microsoft.com/office/drawing/2014/main" id="{2686FD45-663C-4668-8418-20199A171676}"/>
+              </a:ext>
+              <a:ext uri="{C183D7F6-B498-43B3-948B-1728B52AA6E4}">
+                <adec:decorative xmlns:adec="http://schemas.microsoft.com/office/drawing/2017/decorative" val="1"/>
+              </a:ext>
+            </a:extLst>
+          </p:cNvPr>
+          <p:cNvSpPr>
+            <a:spLocks noGrp="1" noRot="1" noChangeAspect="1" noMove="1" noResize="1" noEditPoints="1" noAdjustHandles="1" noChangeArrowheads="1" noChangeShapeType="1" noTextEdit="1"/>
+          </p:cNvSpPr>
+          <p:nvPr>
+            <p:extLst>
+              <p:ext uri="{386F3935-93C4-4BCD-93E2-E3B085C9AB24}">
+                <p16:designElem xmlns:p16="http://schemas.microsoft.com/office/powerpoint/2015/main" val="1"/>
+              </p:ext>
+            </p:extLst>
+          </p:nvPr>
+        </p:nvSpPr>
+        <p:spPr>
+          <a:xfrm>
+            <a:off x="4429083" y="614085"/>
+            <a:ext cx="3328416" cy="3794760"/>
+          </a:xfrm>
+          <a:prstGeom prst="roundRect">
+            <a:avLst>
+              <a:gd name="adj" fmla="val 5319"/>
+            </a:avLst>
+          </a:prstGeom>
+          <a:solidFill>
+            <a:schemeClr val="tx1"/>
+          </a:solidFill>
+          <a:ln w="50800" cap="sq" cmpd="dbl">
+            <a:gradFill flip="none" rotWithShape="1">
+              <a:gsLst>
+                <a:gs pos="0">
+                  <a:srgbClr val="FFFFFF"/>
+                </a:gs>
+                <a:gs pos="100000">
+                  <a:schemeClr val="tx1">
+                    <a:alpha val="0"/>
+                  </a:schemeClr>
+                </a:gs>
+              </a:gsLst>
+              <a:path path="circle">
+                <a:fillToRect l="50000" t="50000" r="50000" b="50000"/>
+              </a:path>
+              <a:tileRect/>
+            </a:gradFill>
+            <a:miter lim="800000"/>
+          </a:ln>
+          <a:effectLst>
+            <a:outerShdw blurRad="254000" algn="tl" rotWithShape="0">
+              <a:srgbClr val="000000">
+                <a:alpha val="43000"/>
+              </a:srgbClr>
+            </a:outerShdw>
+          </a:effectLst>
+        </p:spPr>
+        <p:style>
+          <a:lnRef idx="2">
+            <a:schemeClr val="accent1">
+              <a:shade val="50000"/>
+            </a:schemeClr>
+          </a:lnRef>
+          <a:fillRef idx="1">
+            <a:schemeClr val="accent1"/>
+          </a:fillRef>
+          <a:effectRef idx="0">
+            <a:schemeClr val="accent1"/>
+          </a:effectRef>
+          <a:fontRef idx="minor">
+            <a:schemeClr val="lt1"/>
+          </a:fontRef>
+        </p:style>
+        <p:txBody>
+          <a:bodyPr rtlCol="0" anchor="ctr"/>
+          <a:lstStyle/>
+          <a:p>
+            <a:pPr algn="ctr"/>
+            <a:endParaRPr lang="en-US"/>
+          </a:p>
+        </p:txBody>
+      </p:sp>
       <p:pic>
         <p:nvPicPr>
-          <p:cNvPr id="6" name="Picture 5">
+          <p:cNvPr id="11" name="Picture 10">
             <a:extLst>
               <a:ext uri="{FF2B5EF4-FFF2-40B4-BE49-F238E27FC236}">
-                <a16:creationId xmlns:a16="http://schemas.microsoft.com/office/drawing/2014/main" id="{1465E392-B091-18E9-0CB9-6440B7DAA9B0}"/>
+                <a16:creationId xmlns:a16="http://schemas.microsoft.com/office/drawing/2014/main" id="{EC861F9C-A746-ED60-73CE-9C4A0E8402B3}"/>
               </a:ext>
             </a:extLst>
           </p:cNvPr>
@@ -10874,12 +12225,137 @@
         </p:blipFill>
         <p:spPr>
           <a:xfrm>
-            <a:off x="1354862" y="708065"/>
-            <a:ext cx="4268403" cy="3606800"/>
+            <a:off x="4543382" y="1171764"/>
+            <a:ext cx="3099817" cy="2685671"/>
           </a:xfrm>
           <a:prstGeom prst="roundRect">
             <a:avLst>
-              <a:gd name="adj" fmla="val 4380"/>
+              <a:gd name="adj" fmla="val 3441"/>
+            </a:avLst>
+          </a:prstGeom>
+          <a:ln w="50800" cap="sq" cmpd="dbl">
+            <a:noFill/>
+            <a:miter lim="800000"/>
+          </a:ln>
+          <a:effectLst/>
+        </p:spPr>
+      </p:pic>
+      <p:sp>
+        <p:nvSpPr>
+          <p:cNvPr id="31" name="Rounded Rectangle 18">
+            <a:extLst>
+              <a:ext uri="{FF2B5EF4-FFF2-40B4-BE49-F238E27FC236}">
+                <a16:creationId xmlns:a16="http://schemas.microsoft.com/office/drawing/2014/main" id="{812F6BC3-2C27-4D47-B3FC-14C36ABB720A}"/>
+              </a:ext>
+              <a:ext uri="{C183D7F6-B498-43B3-948B-1728B52AA6E4}">
+                <adec:decorative xmlns:adec="http://schemas.microsoft.com/office/drawing/2017/decorative" val="1"/>
+              </a:ext>
+            </a:extLst>
+          </p:cNvPr>
+          <p:cNvSpPr>
+            <a:spLocks noGrp="1" noRot="1" noChangeAspect="1" noMove="1" noResize="1" noEditPoints="1" noAdjustHandles="1" noChangeArrowheads="1" noChangeShapeType="1" noTextEdit="1"/>
+          </p:cNvSpPr>
+          <p:nvPr>
+            <p:extLst>
+              <p:ext uri="{386F3935-93C4-4BCD-93E2-E3B085C9AB24}">
+                <p16:designElem xmlns:p16="http://schemas.microsoft.com/office/powerpoint/2015/main" val="1"/>
+              </p:ext>
+            </p:extLst>
+          </p:nvPr>
+        </p:nvSpPr>
+        <p:spPr>
+          <a:xfrm>
+            <a:off x="7935299" y="614085"/>
+            <a:ext cx="3328416" cy="3794760"/>
+          </a:xfrm>
+          <a:prstGeom prst="roundRect">
+            <a:avLst>
+              <a:gd name="adj" fmla="val 5319"/>
+            </a:avLst>
+          </a:prstGeom>
+          <a:solidFill>
+            <a:schemeClr val="tx1"/>
+          </a:solidFill>
+          <a:ln w="50800" cap="sq" cmpd="dbl">
+            <a:gradFill flip="none" rotWithShape="1">
+              <a:gsLst>
+                <a:gs pos="0">
+                  <a:srgbClr val="FFFFFF"/>
+                </a:gs>
+                <a:gs pos="100000">
+                  <a:schemeClr val="tx1">
+                    <a:alpha val="0"/>
+                  </a:schemeClr>
+                </a:gs>
+              </a:gsLst>
+              <a:path path="circle">
+                <a:fillToRect l="50000" t="50000" r="50000" b="50000"/>
+              </a:path>
+              <a:tileRect/>
+            </a:gradFill>
+            <a:miter lim="800000"/>
+          </a:ln>
+          <a:effectLst>
+            <a:outerShdw blurRad="254000" algn="tl" rotWithShape="0">
+              <a:srgbClr val="000000">
+                <a:alpha val="43000"/>
+              </a:srgbClr>
+            </a:outerShdw>
+          </a:effectLst>
+        </p:spPr>
+        <p:style>
+          <a:lnRef idx="2">
+            <a:schemeClr val="accent1">
+              <a:shade val="50000"/>
+            </a:schemeClr>
+          </a:lnRef>
+          <a:fillRef idx="1">
+            <a:schemeClr val="accent1"/>
+          </a:fillRef>
+          <a:effectRef idx="0">
+            <a:schemeClr val="accent1"/>
+          </a:effectRef>
+          <a:fontRef idx="minor">
+            <a:schemeClr val="lt1"/>
+          </a:fontRef>
+        </p:style>
+        <p:txBody>
+          <a:bodyPr rtlCol="0" anchor="ctr"/>
+          <a:lstStyle/>
+          <a:p>
+            <a:pPr algn="ctr"/>
+            <a:endParaRPr lang="en-US"/>
+          </a:p>
+        </p:txBody>
+      </p:sp>
+      <p:pic>
+        <p:nvPicPr>
+          <p:cNvPr id="9" name="Picture 8">
+            <a:extLst>
+              <a:ext uri="{FF2B5EF4-FFF2-40B4-BE49-F238E27FC236}">
+                <a16:creationId xmlns:a16="http://schemas.microsoft.com/office/drawing/2014/main" id="{5EC8CE47-9AC0-28E4-6350-617D365C7257}"/>
+              </a:ext>
+            </a:extLst>
+          </p:cNvPr>
+          <p:cNvPicPr>
+            <a:picLocks noChangeAspect="1"/>
+          </p:cNvPicPr>
+          <p:nvPr/>
+        </p:nvPicPr>
+        <p:blipFill>
+          <a:blip r:embed="rId6"/>
+          <a:stretch>
+            <a:fillRect/>
+          </a:stretch>
+        </p:blipFill>
+        <p:spPr>
+          <a:xfrm>
+            <a:off x="8049598" y="1200350"/>
+            <a:ext cx="3099817" cy="2628499"/>
+          </a:xfrm>
+          <a:prstGeom prst="roundRect">
+            <a:avLst>
+              <a:gd name="adj" fmla="val 3441"/>
             </a:avLst>
           </a:prstGeom>
           <a:ln w="50800" cap="sq" cmpd="dbl">
@@ -10930,10 +12406,10 @@
       </p:grpSpPr>
       <p:pic>
         <p:nvPicPr>
-          <p:cNvPr id="23" name="Picture 22">
+          <p:cNvPr id="49" name="Picture 43">
             <a:extLst>
               <a:ext uri="{FF2B5EF4-FFF2-40B4-BE49-F238E27FC236}">
-                <a16:creationId xmlns:a16="http://schemas.microsoft.com/office/drawing/2014/main" id="{83543A10-04EE-49E0-A9DE-22E1FAB9AED9}"/>
+                <a16:creationId xmlns:a16="http://schemas.microsoft.com/office/drawing/2014/main" id="{E5AA88FA-FA9B-40A0-AB33-86E7729DA88E}"/>
               </a:ext>
               <a:ext uri="{C183D7F6-B498-43B3-948B-1728B52AA6E4}">
                 <adec:decorative xmlns:adec="http://schemas.microsoft.com/office/drawing/2017/decorative" val="1"/>
@@ -11049,10 +12525,10 @@
       </p:sp>
       <p:sp>
         <p:nvSpPr>
-          <p:cNvPr id="25" name="Rounded Rectangle 17">
+          <p:cNvPr id="51" name="Rounded Rectangle 17">
             <a:extLst>
               <a:ext uri="{FF2B5EF4-FFF2-40B4-BE49-F238E27FC236}">
-                <a16:creationId xmlns:a16="http://schemas.microsoft.com/office/drawing/2014/main" id="{9B898DA6-F186-4D59-8802-5BC1FE9B7939}"/>
+                <a16:creationId xmlns:a16="http://schemas.microsoft.com/office/drawing/2014/main" id="{8B10BF6C-3665-4F44-AECF-93A3A986EEFF}"/>
               </a:ext>
               <a:ext uri="{C183D7F6-B498-43B3-948B-1728B52AA6E4}">
                 <adec:decorative xmlns:adec="http://schemas.microsoft.com/office/drawing/2017/decorative" val="1"/>
@@ -11073,7 +12549,7 @@
         <p:spPr>
           <a:xfrm>
             <a:off x="914400" y="614085"/>
-            <a:ext cx="10360152" cy="3794760"/>
+            <a:ext cx="3336883" cy="3794760"/>
           </a:xfrm>
           <a:prstGeom prst="roundRect">
             <a:avLst>
@@ -11137,10 +12613,10 @@
       </p:sp>
       <p:pic>
         <p:nvPicPr>
-          <p:cNvPr id="9" name="Picture 8">
+          <p:cNvPr id="8" name="Picture 7">
             <a:extLst>
               <a:ext uri="{FF2B5EF4-FFF2-40B4-BE49-F238E27FC236}">
-                <a16:creationId xmlns:a16="http://schemas.microsoft.com/office/drawing/2014/main" id="{E5E9A08F-27A3-9FAA-D9B6-BA7E6DD58FA3}"/>
+                <a16:creationId xmlns:a16="http://schemas.microsoft.com/office/drawing/2014/main" id="{2C04A818-1C2C-01DE-1FF1-0619887844FF}"/>
               </a:ext>
             </a:extLst>
           </p:cNvPr>
@@ -11157,12 +12633,12 @@
         </p:blipFill>
         <p:spPr>
           <a:xfrm>
-            <a:off x="7644573" y="711200"/>
-            <a:ext cx="2583248" cy="3606800"/>
+            <a:off x="1319234" y="711200"/>
+            <a:ext cx="2527213" cy="3606800"/>
           </a:xfrm>
           <a:prstGeom prst="roundRect">
             <a:avLst>
-              <a:gd name="adj" fmla="val 4380"/>
+              <a:gd name="adj" fmla="val 3441"/>
             </a:avLst>
           </a:prstGeom>
           <a:ln w="50800" cap="sq" cmpd="dbl">
@@ -11172,12 +12648,100 @@
           <a:effectLst/>
         </p:spPr>
       </p:pic>
+      <p:sp>
+        <p:nvSpPr>
+          <p:cNvPr id="48" name="Rounded Rectangle 19">
+            <a:extLst>
+              <a:ext uri="{FF2B5EF4-FFF2-40B4-BE49-F238E27FC236}">
+                <a16:creationId xmlns:a16="http://schemas.microsoft.com/office/drawing/2014/main" id="{2686FD45-663C-4668-8418-20199A171676}"/>
+              </a:ext>
+              <a:ext uri="{C183D7F6-B498-43B3-948B-1728B52AA6E4}">
+                <adec:decorative xmlns:adec="http://schemas.microsoft.com/office/drawing/2017/decorative" val="1"/>
+              </a:ext>
+            </a:extLst>
+          </p:cNvPr>
+          <p:cNvSpPr>
+            <a:spLocks noGrp="1" noRot="1" noChangeAspect="1" noMove="1" noResize="1" noEditPoints="1" noAdjustHandles="1" noChangeArrowheads="1" noChangeShapeType="1" noTextEdit="1"/>
+          </p:cNvSpPr>
+          <p:nvPr>
+            <p:extLst>
+              <p:ext uri="{386F3935-93C4-4BCD-93E2-E3B085C9AB24}">
+                <p16:designElem xmlns:p16="http://schemas.microsoft.com/office/powerpoint/2015/main" val="1"/>
+              </p:ext>
+            </p:extLst>
+          </p:nvPr>
+        </p:nvSpPr>
+        <p:spPr>
+          <a:xfrm>
+            <a:off x="4429083" y="614085"/>
+            <a:ext cx="3328416" cy="3794760"/>
+          </a:xfrm>
+          <a:prstGeom prst="roundRect">
+            <a:avLst>
+              <a:gd name="adj" fmla="val 5319"/>
+            </a:avLst>
+          </a:prstGeom>
+          <a:solidFill>
+            <a:schemeClr val="tx1"/>
+          </a:solidFill>
+          <a:ln w="50800" cap="sq" cmpd="dbl">
+            <a:gradFill flip="none" rotWithShape="1">
+              <a:gsLst>
+                <a:gs pos="0">
+                  <a:srgbClr val="FFFFFF"/>
+                </a:gs>
+                <a:gs pos="100000">
+                  <a:schemeClr val="tx1">
+                    <a:alpha val="0"/>
+                  </a:schemeClr>
+                </a:gs>
+              </a:gsLst>
+              <a:path path="circle">
+                <a:fillToRect l="50000" t="50000" r="50000" b="50000"/>
+              </a:path>
+              <a:tileRect/>
+            </a:gradFill>
+            <a:miter lim="800000"/>
+          </a:ln>
+          <a:effectLst>
+            <a:outerShdw blurRad="254000" algn="tl" rotWithShape="0">
+              <a:srgbClr val="000000">
+                <a:alpha val="43000"/>
+              </a:srgbClr>
+            </a:outerShdw>
+          </a:effectLst>
+        </p:spPr>
+        <p:style>
+          <a:lnRef idx="2">
+            <a:schemeClr val="accent1">
+              <a:shade val="50000"/>
+            </a:schemeClr>
+          </a:lnRef>
+          <a:fillRef idx="1">
+            <a:schemeClr val="accent1"/>
+          </a:fillRef>
+          <a:effectRef idx="0">
+            <a:schemeClr val="accent1"/>
+          </a:effectRef>
+          <a:fontRef idx="minor">
+            <a:schemeClr val="lt1"/>
+          </a:fontRef>
+        </p:style>
+        <p:txBody>
+          <a:bodyPr rtlCol="0" anchor="ctr"/>
+          <a:lstStyle/>
+          <a:p>
+            <a:pPr algn="ctr"/>
+            <a:endParaRPr lang="en-US"/>
+          </a:p>
+        </p:txBody>
+      </p:sp>
       <p:pic>
         <p:nvPicPr>
-          <p:cNvPr id="5" name="Picture 4">
+          <p:cNvPr id="11" name="Picture 10">
             <a:extLst>
               <a:ext uri="{FF2B5EF4-FFF2-40B4-BE49-F238E27FC236}">
-                <a16:creationId xmlns:a16="http://schemas.microsoft.com/office/drawing/2014/main" id="{A1067835-8955-56C8-9DB0-5BD88085CD21}"/>
+                <a16:creationId xmlns:a16="http://schemas.microsoft.com/office/drawing/2014/main" id="{30DE8C28-D44B-DFD3-5349-B02025181B13}"/>
               </a:ext>
             </a:extLst>
           </p:cNvPr>
@@ -11194,12 +12758,137 @@
         </p:blipFill>
         <p:spPr>
           <a:xfrm>
-            <a:off x="2230370" y="708065"/>
-            <a:ext cx="2722642" cy="3606800"/>
+            <a:off x="5019448" y="711200"/>
+            <a:ext cx="2147685" cy="3606800"/>
           </a:xfrm>
           <a:prstGeom prst="roundRect">
             <a:avLst>
-              <a:gd name="adj" fmla="val 4380"/>
+              <a:gd name="adj" fmla="val 3441"/>
+            </a:avLst>
+          </a:prstGeom>
+          <a:ln w="50800" cap="sq" cmpd="dbl">
+            <a:noFill/>
+            <a:miter lim="800000"/>
+          </a:ln>
+          <a:effectLst/>
+        </p:spPr>
+      </p:pic>
+      <p:sp>
+        <p:nvSpPr>
+          <p:cNvPr id="50" name="Rounded Rectangle 18">
+            <a:extLst>
+              <a:ext uri="{FF2B5EF4-FFF2-40B4-BE49-F238E27FC236}">
+                <a16:creationId xmlns:a16="http://schemas.microsoft.com/office/drawing/2014/main" id="{812F6BC3-2C27-4D47-B3FC-14C36ABB720A}"/>
+              </a:ext>
+              <a:ext uri="{C183D7F6-B498-43B3-948B-1728B52AA6E4}">
+                <adec:decorative xmlns:adec="http://schemas.microsoft.com/office/drawing/2017/decorative" val="1"/>
+              </a:ext>
+            </a:extLst>
+          </p:cNvPr>
+          <p:cNvSpPr>
+            <a:spLocks noGrp="1" noRot="1" noChangeAspect="1" noMove="1" noResize="1" noEditPoints="1" noAdjustHandles="1" noChangeArrowheads="1" noChangeShapeType="1" noTextEdit="1"/>
+          </p:cNvSpPr>
+          <p:nvPr>
+            <p:extLst>
+              <p:ext uri="{386F3935-93C4-4BCD-93E2-E3B085C9AB24}">
+                <p16:designElem xmlns:p16="http://schemas.microsoft.com/office/powerpoint/2015/main" val="1"/>
+              </p:ext>
+            </p:extLst>
+          </p:nvPr>
+        </p:nvSpPr>
+        <p:spPr>
+          <a:xfrm>
+            <a:off x="7935299" y="614085"/>
+            <a:ext cx="3328416" cy="3794760"/>
+          </a:xfrm>
+          <a:prstGeom prst="roundRect">
+            <a:avLst>
+              <a:gd name="adj" fmla="val 5319"/>
+            </a:avLst>
+          </a:prstGeom>
+          <a:solidFill>
+            <a:schemeClr val="tx1"/>
+          </a:solidFill>
+          <a:ln w="50800" cap="sq" cmpd="dbl">
+            <a:gradFill flip="none" rotWithShape="1">
+              <a:gsLst>
+                <a:gs pos="0">
+                  <a:srgbClr val="FFFFFF"/>
+                </a:gs>
+                <a:gs pos="100000">
+                  <a:schemeClr val="tx1">
+                    <a:alpha val="0"/>
+                  </a:schemeClr>
+                </a:gs>
+              </a:gsLst>
+              <a:path path="circle">
+                <a:fillToRect l="50000" t="50000" r="50000" b="50000"/>
+              </a:path>
+              <a:tileRect/>
+            </a:gradFill>
+            <a:miter lim="800000"/>
+          </a:ln>
+          <a:effectLst>
+            <a:outerShdw blurRad="254000" algn="tl" rotWithShape="0">
+              <a:srgbClr val="000000">
+                <a:alpha val="43000"/>
+              </a:srgbClr>
+            </a:outerShdw>
+          </a:effectLst>
+        </p:spPr>
+        <p:style>
+          <a:lnRef idx="2">
+            <a:schemeClr val="accent1">
+              <a:shade val="50000"/>
+            </a:schemeClr>
+          </a:lnRef>
+          <a:fillRef idx="1">
+            <a:schemeClr val="accent1"/>
+          </a:fillRef>
+          <a:effectRef idx="0">
+            <a:schemeClr val="accent1"/>
+          </a:effectRef>
+          <a:fontRef idx="minor">
+            <a:schemeClr val="lt1"/>
+          </a:fontRef>
+        </p:style>
+        <p:txBody>
+          <a:bodyPr rtlCol="0" anchor="ctr"/>
+          <a:lstStyle/>
+          <a:p>
+            <a:pPr algn="ctr"/>
+            <a:endParaRPr lang="en-US"/>
+          </a:p>
+        </p:txBody>
+      </p:sp>
+      <p:pic>
+        <p:nvPicPr>
+          <p:cNvPr id="6" name="Picture 5">
+            <a:extLst>
+              <a:ext uri="{FF2B5EF4-FFF2-40B4-BE49-F238E27FC236}">
+                <a16:creationId xmlns:a16="http://schemas.microsoft.com/office/drawing/2014/main" id="{25042640-965F-4618-345F-80B5D3DDFCDE}"/>
+              </a:ext>
+            </a:extLst>
+          </p:cNvPr>
+          <p:cNvPicPr>
+            <a:picLocks noChangeAspect="1"/>
+          </p:cNvPicPr>
+          <p:nvPr/>
+        </p:nvPicPr>
+        <p:blipFill>
+          <a:blip r:embed="rId6"/>
+          <a:stretch>
+            <a:fillRect/>
+          </a:stretch>
+        </p:blipFill>
+        <p:spPr>
+          <a:xfrm>
+            <a:off x="8413270" y="711200"/>
+            <a:ext cx="2372473" cy="3606800"/>
+          </a:xfrm>
+          <a:prstGeom prst="roundRect">
+            <a:avLst>
+              <a:gd name="adj" fmla="val 3441"/>
             </a:avLst>
           </a:prstGeom>
           <a:ln w="50800" cap="sq" cmpd="dbl">
@@ -11290,7 +12979,25 @@
           <a:p>
             <a:r>
               <a:rPr lang="en-US" dirty="0"/>
-              <a:t>After conducting training, the model, predictions were produced.   The accuracy score, precision score, recall score was produced, as well as histogram of predictions, and a plot of decision tree were produced and analyzed.</a:t>
+              <a:t>After conducting training and validation of neural network, loss accuracy, validation loss, and validation accuracy metrics were produced.  </a:t>
+            </a:r>
+          </a:p>
+          <a:p>
+            <a:r>
+              <a:rPr lang="en-US" dirty="0"/>
+              <a:t>Plot of neural network is based on training and validation set.</a:t>
+            </a:r>
+          </a:p>
+          <a:p>
+            <a:r>
+              <a:rPr lang="en-US" dirty="0"/>
+              <a:t>Evaluation was conducted on test set, producing loss and accuracy scores as well as confusion matrix.</a:t>
+            </a:r>
+          </a:p>
+          <a:p>
+            <a:r>
+              <a:rPr lang="en-US" dirty="0"/>
+              <a:t>Note:  originally this network was conducted with two hidden layers.  In an attempt to optimize, 2 hidden layers were added, increasing the number of hidden layers to 4.. This presentation reports on results with additional layers, as there are no significant differences.</a:t>
             </a:r>
           </a:p>
           <a:p>
@@ -11385,26 +13092,62 @@
           <a:p>
             <a:r>
               <a:rPr lang="en-US" dirty="0"/>
-              <a:t>Accuracy score of 75.2554% </a:t>
-            </a:r>
-          </a:p>
-          <a:p>
-            <a:r>
-              <a:rPr lang="en-US" dirty="0"/>
-              <a:t>Precision score of 56.6338%</a:t>
-            </a:r>
-          </a:p>
-          <a:p>
-            <a:r>
-              <a:rPr lang="en-US" dirty="0"/>
-              <a:t>Recall score of 0.0</a:t>
-            </a:r>
-          </a:p>
-          <a:p>
-            <a:r>
-              <a:rPr lang="en-US" dirty="0"/>
-              <a:t>Though accuracy score is high, precision score just below 60% is not favorable.  Furthermore, recall score of 0 typically means classifier is not truly predicting True Positives.</a:t>
-            </a:r>
+              <a:t>Training scores:  </a:t>
+            </a:r>
+          </a:p>
+          <a:p>
+            <a:pPr lvl="1"/>
+            <a:r>
+              <a:rPr lang="en-US" dirty="0"/>
+              <a:t>Loss: 53.88% </a:t>
+            </a:r>
+          </a:p>
+          <a:p>
+            <a:pPr lvl="1"/>
+            <a:r>
+              <a:rPr lang="en-US" dirty="0"/>
+              <a:t>Accuracy: 75.26% </a:t>
+            </a:r>
+          </a:p>
+          <a:p>
+            <a:pPr lvl="1"/>
+            <a:r>
+              <a:rPr lang="en-US" dirty="0"/>
+              <a:t>Val loss: 52.75%</a:t>
+            </a:r>
+          </a:p>
+          <a:p>
+            <a:pPr lvl="1"/>
+            <a:r>
+              <a:rPr lang="en-US" dirty="0"/>
+              <a:t> Val accuracy: 76.35%</a:t>
+            </a:r>
+          </a:p>
+          <a:p>
+            <a:r>
+              <a:rPr lang="en-US" dirty="0"/>
+              <a:t>Testing scores:  </a:t>
+            </a:r>
+          </a:p>
+          <a:p>
+            <a:pPr lvl="1"/>
+            <a:r>
+              <a:rPr lang="en-US" dirty="0"/>
+              <a:t>Loss: 54.63% </a:t>
+            </a:r>
+          </a:p>
+          <a:p>
+            <a:pPr lvl="1"/>
+            <a:r>
+              <a:rPr lang="en-US" dirty="0"/>
+              <a:t>Accuracy: 75.09%</a:t>
+            </a:r>
+          </a:p>
+          <a:p>
+            <a:pPr marL="0" indent="0">
+              <a:buNone/>
+            </a:pPr>
+            <a:endParaRPr lang="en-US" dirty="0"/>
           </a:p>
           <a:p>
             <a:endParaRPr lang="en-US" dirty="0"/>
@@ -11468,8 +13211,8 @@
         </p:nvSpPr>
         <p:spPr>
           <a:xfrm>
-            <a:off x="685801" y="609600"/>
-            <a:ext cx="5219699" cy="1456267"/>
+            <a:off x="825909" y="808055"/>
+            <a:ext cx="3979205" cy="1453363"/>
           </a:xfrm>
         </p:spPr>
         <p:txBody>
@@ -11503,8 +13246,8 @@
         </p:nvSpPr>
         <p:spPr>
           <a:xfrm>
-            <a:off x="685801" y="2142067"/>
-            <a:ext cx="5219699" cy="3649133"/>
+            <a:off x="802178" y="2261420"/>
+            <a:ext cx="4002936" cy="3637935"/>
           </a:xfrm>
         </p:spPr>
         <p:txBody>
@@ -11515,11 +13258,14 @@
           <a:p>
             <a:r>
               <a:rPr lang="en-US" dirty="0"/>
-              <a:t>Histogram of predictions indicates that model is not considering DEPRESSION(1).</a:t>
-            </a:r>
-          </a:p>
-          <a:p>
-            <a:endParaRPr lang="en-US" dirty="0"/>
+              <a:t>Plot of NN:  There is very little complexity.  </a:t>
+            </a:r>
+          </a:p>
+          <a:p>
+            <a:r>
+              <a:rPr lang="en-US" dirty="0"/>
+              <a:t>As a reminder, this plot is based on training and validation sets.</a:t>
+            </a:r>
           </a:p>
           <a:p>
             <a:endParaRPr lang="en-US" dirty="0"/>
@@ -11528,10 +13274,10 @@
       </p:sp>
       <p:pic>
         <p:nvPicPr>
-          <p:cNvPr id="7" name="Picture 6">
+          <p:cNvPr id="5" name="Picture 4">
             <a:extLst>
               <a:ext uri="{FF2B5EF4-FFF2-40B4-BE49-F238E27FC236}">
-                <a16:creationId xmlns:a16="http://schemas.microsoft.com/office/drawing/2014/main" id="{CE8FE8A1-277D-996F-1C76-1714EBEC4341}"/>
+                <a16:creationId xmlns:a16="http://schemas.microsoft.com/office/drawing/2014/main" id="{A0004C80-5D59-B52C-236A-E03E2A9D6850}"/>
               </a:ext>
             </a:extLst>
           </p:cNvPr>
@@ -11540,15 +13286,16 @@
           </p:cNvPicPr>
           <p:nvPr/>
         </p:nvPicPr>
-        <p:blipFill rotWithShape="1">
+        <p:blipFill>
           <a:blip r:embed="rId3"/>
-          <a:srcRect l="1595" r="3739" b="2"/>
-          <a:stretch/>
+          <a:stretch>
+            <a:fillRect/>
+          </a:stretch>
         </p:blipFill>
         <p:spPr>
           <a:xfrm>
-            <a:off x="6198830" y="639097"/>
-            <a:ext cx="5447070" cy="5250425"/>
+            <a:off x="7138357" y="796413"/>
+            <a:ext cx="2708008" cy="5761720"/>
           </a:xfrm>
           <a:prstGeom prst="roundRect">
             <a:avLst>
@@ -11586,7 +13333,7 @@
     </p:spTree>
     <p:extLst>
       <p:ext uri="{BB962C8B-B14F-4D97-AF65-F5344CB8AC3E}">
-        <p14:creationId xmlns:p14="http://schemas.microsoft.com/office/powerpoint/2010/main" val="3846949896"/>
+        <p14:creationId xmlns:p14="http://schemas.microsoft.com/office/powerpoint/2010/main" val="2523414989"/>
       </p:ext>
     </p:extLst>
   </p:cSld>
@@ -11640,8 +13387,8 @@
         </p:nvSpPr>
         <p:spPr>
           <a:xfrm>
-            <a:off x="1361187" y="1030288"/>
-            <a:ext cx="4099947" cy="1035579"/>
+            <a:off x="825909" y="808055"/>
+            <a:ext cx="3979205" cy="1453363"/>
           </a:xfrm>
         </p:spPr>
         <p:txBody>
@@ -11659,72 +13406,6 @@
       </p:sp>
       <p:sp>
         <p:nvSpPr>
-          <p:cNvPr id="12" name="Rectangle 11">
-            <a:extLst>
-              <a:ext uri="{FF2B5EF4-FFF2-40B4-BE49-F238E27FC236}">
-                <a16:creationId xmlns:a16="http://schemas.microsoft.com/office/drawing/2014/main" id="{1C04857D-B1C1-41ED-B1B4-E3D6E3C7C4E6}"/>
-              </a:ext>
-              <a:ext uri="{C183D7F6-B498-43B3-948B-1728B52AA6E4}">
-                <adec:decorative xmlns:adec="http://schemas.microsoft.com/office/drawing/2017/decorative" val="1"/>
-              </a:ext>
-            </a:extLst>
-          </p:cNvPr>
-          <p:cNvSpPr>
-            <a:spLocks noGrp="1" noRot="1" noChangeAspect="1" noMove="1" noResize="1" noEditPoints="1" noAdjustHandles="1" noChangeArrowheads="1" noChangeShapeType="1" noTextEdit="1"/>
-          </p:cNvSpPr>
-          <p:nvPr>
-            <p:extLst>
-              <p:ext uri="{386F3935-93C4-4BCD-93E2-E3B085C9AB24}">
-                <p16:designElem xmlns:p16="http://schemas.microsoft.com/office/powerpoint/2015/main" val="1"/>
-              </p:ext>
-            </p:extLst>
-          </p:nvPr>
-        </p:nvSpPr>
-        <p:spPr>
-          <a:xfrm rot="16200000">
-            <a:off x="-1797333" y="4261157"/>
-            <a:ext cx="2971800" cy="170837"/>
-          </a:xfrm>
-          <a:prstGeom prst="rect">
-            <a:avLst/>
-          </a:prstGeom>
-          <a:solidFill>
-            <a:schemeClr val="accent3">
-              <a:lumMod val="60000"/>
-              <a:lumOff val="40000"/>
-            </a:schemeClr>
-          </a:solidFill>
-          <a:ln>
-            <a:noFill/>
-          </a:ln>
-        </p:spPr>
-        <p:style>
-          <a:lnRef idx="2">
-            <a:schemeClr val="accent1">
-              <a:shade val="50000"/>
-            </a:schemeClr>
-          </a:lnRef>
-          <a:fillRef idx="1">
-            <a:schemeClr val="accent1"/>
-          </a:fillRef>
-          <a:effectRef idx="0">
-            <a:schemeClr val="accent1"/>
-          </a:effectRef>
-          <a:fontRef idx="minor">
-            <a:schemeClr val="lt1"/>
-          </a:fontRef>
-        </p:style>
-        <p:txBody>
-          <a:bodyPr rtlCol="0" anchor="ctr"/>
-          <a:lstStyle/>
-          <a:p>
-            <a:pPr algn="ctr"/>
-            <a:endParaRPr lang="en-US"/>
-          </a:p>
-        </p:txBody>
-      </p:sp>
-      <p:sp>
-        <p:nvSpPr>
           <p:cNvPr id="3" name="Content Placeholder 2">
             <a:extLst>
               <a:ext uri="{FF2B5EF4-FFF2-40B4-BE49-F238E27FC236}">
@@ -11741,8 +13422,8 @@
         </p:nvSpPr>
         <p:spPr>
           <a:xfrm>
-            <a:off x="1361187" y="2142067"/>
-            <a:ext cx="4099947" cy="3649133"/>
+            <a:off x="802178" y="2261420"/>
+            <a:ext cx="4002936" cy="3637935"/>
           </a:xfrm>
         </p:spPr>
         <p:txBody>
@@ -11753,53 +13434,73 @@
           <a:p>
             <a:r>
               <a:rPr lang="en-US" dirty="0"/>
-              <a:t>Feature importance:  This is meant to determine how the model is weighing the variables</a:t>
-            </a:r>
-          </a:p>
-          <a:p>
-            <a:r>
-              <a:rPr lang="en-US" dirty="0"/>
-              <a:t>Output clearly shows that GEN_HEALTH is the only variable considered important by the model.</a:t>
-            </a:r>
-          </a:p>
-        </p:txBody>
-      </p:sp>
-      <p:sp>
-        <p:nvSpPr>
-          <p:cNvPr id="14" name="Rounded Rectangle 32">
+              <a:t>Model performance chart</a:t>
+            </a:r>
+          </a:p>
+          <a:p>
+            <a:pPr lvl="1"/>
+            <a:r>
+              <a:rPr lang="en-US" dirty="0"/>
+              <a:t>X-axis indicates epochs</a:t>
+            </a:r>
+          </a:p>
+          <a:p>
+            <a:pPr lvl="1"/>
+            <a:r>
+              <a:rPr lang="en-US" dirty="0"/>
+              <a:t>Y-axis indicates score</a:t>
+            </a:r>
+          </a:p>
+          <a:p>
+            <a:r>
+              <a:rPr lang="en-US" dirty="0"/>
+              <a:t>We have two sets of horizontal lines, indicating no gain after initial epoch.</a:t>
+            </a:r>
+          </a:p>
+          <a:p>
+            <a:r>
+              <a:rPr lang="en-US" dirty="0"/>
+              <a:t>Network was unable to improve scores after 50 epochs</a:t>
+            </a:r>
+          </a:p>
+          <a:p>
+            <a:endParaRPr lang="en-US" dirty="0"/>
+          </a:p>
+          <a:p>
+            <a:endParaRPr lang="en-US" dirty="0"/>
+          </a:p>
+        </p:txBody>
+      </p:sp>
+      <p:pic>
+        <p:nvPicPr>
+          <p:cNvPr id="10" name="Picture 9">
             <a:extLst>
               <a:ext uri="{FF2B5EF4-FFF2-40B4-BE49-F238E27FC236}">
-                <a16:creationId xmlns:a16="http://schemas.microsoft.com/office/drawing/2014/main" id="{E5A9FA1E-7A9B-4CDA-91BB-87575F63E28F}"/>
-              </a:ext>
-              <a:ext uri="{C183D7F6-B498-43B3-948B-1728B52AA6E4}">
-                <adec:decorative xmlns:adec="http://schemas.microsoft.com/office/drawing/2017/decorative" val="1"/>
+                <a16:creationId xmlns:a16="http://schemas.microsoft.com/office/drawing/2014/main" id="{F508A979-7F97-0E41-1F5F-0536AA78143A}"/>
               </a:ext>
             </a:extLst>
           </p:cNvPr>
-          <p:cNvSpPr>
-            <a:spLocks noGrp="1" noRot="1" noChangeAspect="1" noMove="1" noResize="1" noEditPoints="1" noAdjustHandles="1" noChangeArrowheads="1" noChangeShapeType="1" noTextEdit="1"/>
-          </p:cNvSpPr>
-          <p:nvPr>
-            <p:extLst>
-              <p:ext uri="{386F3935-93C4-4BCD-93E2-E3B085C9AB24}">
-                <p16:designElem xmlns:p16="http://schemas.microsoft.com/office/powerpoint/2015/main" val="1"/>
-              </p:ext>
-            </p:extLst>
-          </p:nvPr>
-        </p:nvSpPr>
+          <p:cNvPicPr>
+            <a:picLocks noChangeAspect="1"/>
+          </p:cNvPicPr>
+          <p:nvPr/>
+        </p:nvPicPr>
+        <p:blipFill>
+          <a:blip r:embed="rId3"/>
+          <a:stretch>
+            <a:fillRect/>
+          </a:stretch>
+        </p:blipFill>
         <p:spPr>
           <a:xfrm>
-            <a:off x="6082585" y="639097"/>
-            <a:ext cx="5433751" cy="5575438"/>
+            <a:off x="5289752" y="1755411"/>
+            <a:ext cx="6095593" cy="3184947"/>
           </a:xfrm>
           <a:prstGeom prst="roundRect">
             <a:avLst>
-              <a:gd name="adj" fmla="val 3449"/>
+              <a:gd name="adj" fmla="val 4380"/>
             </a:avLst>
           </a:prstGeom>
-          <a:solidFill>
-            <a:schemeClr val="tx1"/>
-          </a:solidFill>
           <a:ln w="50800" cap="sq" cmpd="dbl">
             <a:gradFill flip="none" rotWithShape="1">
               <a:gsLst>
@@ -11827,109 +13528,11 @@
             </a:outerShdw>
           </a:effectLst>
         </p:spPr>
-        <p:style>
-          <a:lnRef idx="2">
-            <a:schemeClr val="accent1">
-              <a:shade val="50000"/>
-            </a:schemeClr>
-          </a:lnRef>
-          <a:fillRef idx="1">
-            <a:schemeClr val="accent1"/>
-          </a:fillRef>
-          <a:effectRef idx="0">
-            <a:schemeClr val="accent1"/>
-          </a:effectRef>
-          <a:fontRef idx="minor">
-            <a:schemeClr val="lt1"/>
-          </a:fontRef>
-        </p:style>
-        <p:txBody>
-          <a:bodyPr rtlCol="0" anchor="ctr"/>
-          <a:lstStyle/>
-          <a:p>
-            <a:pPr algn="ctr"/>
-            <a:endParaRPr lang="en-US"/>
-          </a:p>
-        </p:txBody>
-      </p:sp>
-      <p:pic>
-        <p:nvPicPr>
-          <p:cNvPr id="5" name="Picture 4">
-            <a:extLst>
-              <a:ext uri="{FF2B5EF4-FFF2-40B4-BE49-F238E27FC236}">
-                <a16:creationId xmlns:a16="http://schemas.microsoft.com/office/drawing/2014/main" id="{27EF342B-891F-A73E-7857-E28CC8FF40A9}"/>
-              </a:ext>
-            </a:extLst>
-          </p:cNvPr>
-          <p:cNvPicPr>
-            <a:picLocks noChangeAspect="1"/>
-          </p:cNvPicPr>
-          <p:nvPr/>
-        </p:nvPicPr>
-        <p:blipFill>
-          <a:blip r:embed="rId3"/>
-          <a:stretch>
-            <a:fillRect/>
-          </a:stretch>
-        </p:blipFill>
-        <p:spPr>
-          <a:xfrm>
-            <a:off x="7020104" y="733077"/>
-            <a:ext cx="3550112" cy="2636590"/>
-          </a:xfrm>
-          <a:prstGeom prst="roundRect">
-            <a:avLst>
-              <a:gd name="adj" fmla="val 4207"/>
-            </a:avLst>
-          </a:prstGeom>
-          <a:ln w="50800" cap="sq" cmpd="dbl">
-            <a:noFill/>
-            <a:miter lim="800000"/>
-          </a:ln>
-          <a:effectLst/>
-        </p:spPr>
-      </p:pic>
-      <p:pic>
-        <p:nvPicPr>
-          <p:cNvPr id="7" name="Picture 6">
-            <a:extLst>
-              <a:ext uri="{FF2B5EF4-FFF2-40B4-BE49-F238E27FC236}">
-                <a16:creationId xmlns:a16="http://schemas.microsoft.com/office/drawing/2014/main" id="{CEDCF21C-136D-CE2B-80BD-3B09A9273EEC}"/>
-              </a:ext>
-            </a:extLst>
-          </p:cNvPr>
-          <p:cNvPicPr>
-            <a:picLocks noChangeAspect="1"/>
-          </p:cNvPicPr>
-          <p:nvPr/>
-        </p:nvPicPr>
-        <p:blipFill>
-          <a:blip r:embed="rId4"/>
-          <a:stretch>
-            <a:fillRect/>
-          </a:stretch>
-        </p:blipFill>
-        <p:spPr>
-          <a:xfrm>
-            <a:off x="6175192" y="3734282"/>
-            <a:ext cx="5239935" cy="2135957"/>
-          </a:xfrm>
-          <a:prstGeom prst="roundRect">
-            <a:avLst>
-              <a:gd name="adj" fmla="val 4528"/>
-            </a:avLst>
-          </a:prstGeom>
-          <a:ln w="50800" cap="sq" cmpd="dbl">
-            <a:noFill/>
-            <a:miter lim="800000"/>
-          </a:ln>
-          <a:effectLst/>
-        </p:spPr>
       </p:pic>
     </p:spTree>
     <p:extLst>
       <p:ext uri="{BB962C8B-B14F-4D97-AF65-F5344CB8AC3E}">
-        <p14:creationId xmlns:p14="http://schemas.microsoft.com/office/powerpoint/2010/main" val="1978051639"/>
+        <p14:creationId xmlns:p14="http://schemas.microsoft.com/office/powerpoint/2010/main" val="3846949896"/>
       </p:ext>
     </p:extLst>
   </p:cSld>
@@ -11965,6 +13568,51 @@
           <a:chExt cx="0" cy="0"/>
         </a:xfrm>
       </p:grpSpPr>
+      <p:pic>
+        <p:nvPicPr>
+          <p:cNvPr id="10" name="Picture 9">
+            <a:extLst>
+              <a:ext uri="{FF2B5EF4-FFF2-40B4-BE49-F238E27FC236}">
+                <a16:creationId xmlns:a16="http://schemas.microsoft.com/office/drawing/2014/main" id="{6AF6706C-CF07-43A1-BCC4-CBA5D33820DA}"/>
+              </a:ext>
+              <a:ext uri="{C183D7F6-B498-43B3-948B-1728B52AA6E4}">
+                <adec:decorative xmlns:adec="http://schemas.microsoft.com/office/drawing/2017/decorative" val="1"/>
+              </a:ext>
+            </a:extLst>
+          </p:cNvPr>
+          <p:cNvPicPr>
+            <a:picLocks noGrp="1" noRot="1" noChangeAspect="1" noMove="1" noResize="1" noEditPoints="1" noAdjustHandles="1" noChangeArrowheads="1" noChangeShapeType="1" noCrop="1"/>
+          </p:cNvPicPr>
+          <p:nvPr>
+            <p:extLst>
+              <p:ext uri="{386F3935-93C4-4BCD-93E2-E3B085C9AB24}">
+                <p16:designElem xmlns:p16="http://schemas.microsoft.com/office/powerpoint/2015/main" val="1"/>
+              </p:ext>
+            </p:extLst>
+          </p:nvPr>
+        </p:nvPicPr>
+        <p:blipFill>
+          <a:blip r:embed="rId3">
+            <a:extLst>
+              <a:ext uri="{28A0092B-C50C-407E-A947-70E740481C1C}">
+                <a14:useLocalDpi xmlns:a14="http://schemas.microsoft.com/office/drawing/2010/main" val="0"/>
+              </a:ext>
+            </a:extLst>
+          </a:blip>
+          <a:stretch>
+            <a:fillRect/>
+          </a:stretch>
+        </p:blipFill>
+        <p:spPr>
+          <a:xfrm>
+            <a:off x="0" y="0"/>
+            <a:ext cx="12188825" cy="6856214"/>
+          </a:xfrm>
+          <a:prstGeom prst="rect">
+            <a:avLst/>
+          </a:prstGeom>
+        </p:spPr>
+      </p:pic>
       <p:sp>
         <p:nvSpPr>
           <p:cNvPr id="2" name="Title 1">
@@ -11983,18 +13631,19 @@
         </p:nvSpPr>
         <p:spPr>
           <a:xfrm>
-            <a:off x="685801" y="609600"/>
-            <a:ext cx="5219699" cy="1456267"/>
-          </a:xfrm>
-        </p:spPr>
-        <p:txBody>
-          <a:bodyPr>
+            <a:off x="1032933" y="4538133"/>
+            <a:ext cx="10127192" cy="931341"/>
+          </a:xfrm>
+        </p:spPr>
+        <p:txBody>
+          <a:bodyPr vert="horz" lIns="91440" tIns="45720" rIns="91440" bIns="45720" rtlCol="0" anchor="b">
             <a:normAutofit/>
           </a:bodyPr>
           <a:lstStyle/>
           <a:p>
-            <a:r>
-              <a:rPr lang="en-US" dirty="0"/>
+            <a:pPr algn="r"/>
+            <a:r>
+              <a:rPr lang="en-US" sz="4000" dirty="0"/>
               <a:t>Report  </a:t>
             </a:r>
           </a:p>
@@ -12018,35 +13667,32 @@
         </p:nvSpPr>
         <p:spPr>
           <a:xfrm>
-            <a:off x="685801" y="2142067"/>
-            <a:ext cx="5219699" cy="3649133"/>
-          </a:xfrm>
-        </p:spPr>
-        <p:txBody>
-          <a:bodyPr>
+            <a:off x="3962399" y="5461009"/>
+            <a:ext cx="7197726" cy="406391"/>
+          </a:xfrm>
+        </p:spPr>
+        <p:txBody>
+          <a:bodyPr vert="horz" lIns="91440" tIns="45720" rIns="91440" bIns="45720" rtlCol="0" anchor="t">
             <a:normAutofit/>
           </a:bodyPr>
           <a:lstStyle/>
           <a:p>
-            <a:r>
-              <a:rPr lang="en-US" dirty="0"/>
-              <a:t>Bar chart confirms output from previous slide, that is that SMOKING and POVERTY are not considered.</a:t>
-            </a:r>
-          </a:p>
-          <a:p>
-            <a:r>
-              <a:rPr lang="en-US" dirty="0"/>
-              <a:t>This may be the reason for the contradiction between accuracy score and precision and recall scores.</a:t>
+            <a:pPr marL="0" indent="0" algn="r">
+              <a:buNone/>
+            </a:pPr>
+            <a:r>
+              <a:rPr lang="en-US" cap="all" dirty="0"/>
+              <a:t>Loss:  54.63%, accuracy:  75.10%, results similar to training scores</a:t>
             </a:r>
           </a:p>
         </p:txBody>
       </p:sp>
       <p:pic>
         <p:nvPicPr>
-          <p:cNvPr id="6" name="Picture 5">
+          <p:cNvPr id="5" name="Picture 4">
             <a:extLst>
               <a:ext uri="{FF2B5EF4-FFF2-40B4-BE49-F238E27FC236}">
-                <a16:creationId xmlns:a16="http://schemas.microsoft.com/office/drawing/2014/main" id="{928699FC-97FA-0298-F1A7-F12C6EEF59D1}"/>
+                <a16:creationId xmlns:a16="http://schemas.microsoft.com/office/drawing/2014/main" id="{EE00B99E-D8F6-FBA4-25DE-2DFF8CDFCA23}"/>
               </a:ext>
             </a:extLst>
           </p:cNvPr>
@@ -12055,15 +13701,16 @@
           </p:cNvPicPr>
           <p:nvPr/>
         </p:nvPicPr>
-        <p:blipFill rotWithShape="1">
-          <a:blip r:embed="rId3"/>
-          <a:srcRect r="6369" b="-1"/>
-          <a:stretch/>
+        <p:blipFill>
+          <a:blip r:embed="rId4"/>
+          <a:stretch>
+            <a:fillRect/>
+          </a:stretch>
         </p:blipFill>
         <p:spPr>
           <a:xfrm>
-            <a:off x="6198830" y="639097"/>
-            <a:ext cx="5447070" cy="5250425"/>
+            <a:off x="922867" y="1467040"/>
+            <a:ext cx="10346266" cy="2095119"/>
           </a:xfrm>
           <a:prstGeom prst="roundRect">
             <a:avLst>
@@ -12298,8 +13945,8 @@
         </p:nvSpPr>
         <p:spPr>
           <a:xfrm>
-            <a:off x="685801" y="609600"/>
-            <a:ext cx="5219699" cy="1456267"/>
+            <a:off x="825909" y="808055"/>
+            <a:ext cx="3979205" cy="1453363"/>
           </a:xfrm>
         </p:spPr>
         <p:txBody>
@@ -12333,8 +13980,8 @@
         </p:nvSpPr>
         <p:spPr>
           <a:xfrm>
-            <a:off x="685801" y="2142067"/>
-            <a:ext cx="5219699" cy="3649133"/>
+            <a:off x="802178" y="2261420"/>
+            <a:ext cx="4002936" cy="3637935"/>
           </a:xfrm>
         </p:spPr>
         <p:txBody>
@@ -12345,13 +13992,19 @@
           <a:p>
             <a:r>
               <a:rPr lang="en-US" dirty="0"/>
-              <a:t>Plot of Decision Tree indicates no real depth to the model.</a:t>
-            </a:r>
-          </a:p>
-          <a:p>
-            <a:r>
-              <a:rPr lang="en-US" dirty="0"/>
-              <a:t>Plot confirms that DEPRESSION is the only variable considered important by the decision tree classifier.</a:t>
+              <a:t>Confusion matrix plot:  We would expect to see the upper left box to be a dark green if the model were correctly predicting “Depressed”</a:t>
+            </a:r>
+          </a:p>
+          <a:p>
+            <a:r>
+              <a:rPr lang="en-US" dirty="0"/>
+              <a:t>We see that network is mis-categorizing “depressed” as “not-depressed”</a:t>
+            </a:r>
+          </a:p>
+          <a:p>
+            <a:r>
+              <a:rPr lang="en-US" dirty="0"/>
+              <a:t>Network is correctly categorizing “not-depressed”</a:t>
             </a:r>
           </a:p>
           <a:p>
@@ -12361,10 +14014,10 @@
       </p:sp>
       <p:pic>
         <p:nvPicPr>
-          <p:cNvPr id="7" name="Picture 6">
+          <p:cNvPr id="6" name="Picture 5">
             <a:extLst>
               <a:ext uri="{FF2B5EF4-FFF2-40B4-BE49-F238E27FC236}">
-                <a16:creationId xmlns:a16="http://schemas.microsoft.com/office/drawing/2014/main" id="{A4D9B5CB-D72A-A1F0-BEA4-B051849789E8}"/>
+                <a16:creationId xmlns:a16="http://schemas.microsoft.com/office/drawing/2014/main" id="{97FB48DA-B472-1B98-6AAB-891EB434F583}"/>
               </a:ext>
             </a:extLst>
           </p:cNvPr>
@@ -12373,15 +14026,16 @@
           </p:cNvPicPr>
           <p:nvPr/>
         </p:nvPicPr>
-        <p:blipFill rotWithShape="1">
+        <p:blipFill>
           <a:blip r:embed="rId3"/>
-          <a:srcRect r="2480" b="1"/>
-          <a:stretch/>
+          <a:stretch>
+            <a:fillRect/>
+          </a:stretch>
         </p:blipFill>
         <p:spPr>
           <a:xfrm>
-            <a:off x="6198830" y="639097"/>
-            <a:ext cx="5447070" cy="5250425"/>
+            <a:off x="5713927" y="796413"/>
+            <a:ext cx="5247242" cy="5102943"/>
           </a:xfrm>
           <a:prstGeom prst="roundRect">
             <a:avLst>
@@ -12419,7 +14073,7 @@
     </p:spTree>
     <p:extLst>
       <p:ext uri="{BB962C8B-B14F-4D97-AF65-F5344CB8AC3E}">
-        <p14:creationId xmlns:p14="http://schemas.microsoft.com/office/powerpoint/2010/main" val="2523414989"/>
+        <p14:creationId xmlns:p14="http://schemas.microsoft.com/office/powerpoint/2010/main" val="1978051639"/>
       </p:ext>
     </p:extLst>
   </p:cSld>
@@ -12469,7 +14123,7 @@
           <a:p>
             <a:r>
               <a:rPr lang="en-US" dirty="0"/>
-              <a:t>Act  </a:t>
+              <a:t>Act</a:t>
             </a:r>
           </a:p>
         </p:txBody>
@@ -12498,39 +14152,43 @@
         </p:spPr>
         <p:txBody>
           <a:bodyPr>
-            <a:normAutofit/>
+            <a:normAutofit lnSpcReduction="10000"/>
           </a:bodyPr>
           <a:lstStyle/>
           <a:p>
             <a:r>
               <a:rPr lang="en-US" dirty="0"/>
-              <a:t>Model is ignoring two of the three variables.  Normally this would indicate that GEN_HEALTH is the only variable that is relevant to predicting DEPRESSION.  The implication here is that POVERTY is not related to DEPRESSION, forcing us to reject H_A, and accept H_0.  However, the contradiction between accuracy score and precision and recall scores indicates that DEPRESSION = f(GEN_HEALTH) is not a good model on its own, something else may be going on.</a:t>
-            </a:r>
-          </a:p>
-          <a:p>
-            <a:r>
-              <a:rPr lang="en-US" dirty="0"/>
-              <a:t>We provide two possible courses of action:</a:t>
-            </a:r>
-          </a:p>
-          <a:p>
-            <a:pPr lvl="1"/>
-            <a:r>
-              <a:rPr lang="en-US" dirty="0"/>
-              <a:t>Because GEN_HEALTH is a predictor, and POVERTY and SMOKING are not considered, the model can be re-run with more than 3 independent variables.  This will leverage the power of a decision tree, and possibly produce a model with better precision and recall scores. </a:t>
-            </a:r>
-          </a:p>
-          <a:p>
-            <a:pPr lvl="1"/>
-            <a:r>
-              <a:rPr lang="en-US" dirty="0"/>
-              <a:t>Run the same variables, but with a regression type of model, possibly a multivariate regression.</a:t>
-            </a:r>
-          </a:p>
-          <a:p>
-            <a:r>
-              <a:rPr lang="en-US" dirty="0"/>
-              <a:t>It should be noted, that when this model was run with 5 categories for DEPRESSION, we received the exact same values for accuracy, precision and recalls scores.  The levels of categories was a non-issue.</a:t>
+              <a:t>Low accuracy scores of 75%, large misclassification of “depressed” as “not-depressed.”  In the neural network plot we see that there is very little complexity.  All these factors seem to indicate that the three variables are not sufficient in predicting depression.  </a:t>
+            </a:r>
+          </a:p>
+          <a:p>
+            <a:r>
+              <a:rPr lang="en-US" dirty="0"/>
+              <a:t>If we only consider these results, we must conclude that POVERTY, GEN_HEALTH, and SMOKING do not adequately predict DEPRESSION, forcing us to accept H_0.  </a:t>
+            </a:r>
+          </a:p>
+          <a:p>
+            <a:r>
+              <a:rPr lang="en-US" dirty="0"/>
+              <a:t>Hyperparameters were adjusted by adding more hidden layers, this did not produce significant changes.  Neither the model nor the hyperparameters are the issue. </a:t>
+            </a:r>
+          </a:p>
+          <a:p>
+            <a:r>
+              <a:rPr lang="en-US" dirty="0"/>
+              <a:t>It should be noted that a decision tree was previously conducted on the same data and variables.  Results here are consistent with results of decision tree.  This further confirms that the analytical technique is not the issue with the mis-classifications weakening the model.</a:t>
+            </a:r>
+          </a:p>
+          <a:p>
+            <a:r>
+              <a:rPr lang="en-US" dirty="0"/>
+              <a:t>Also, there is a large body of published research that shows strong connections with depression and poverty.  We cannot eliminate this variable, unless we ignore publish research.  </a:t>
+            </a:r>
+          </a:p>
+          <a:p>
+            <a:r>
+              <a:rPr lang="en-US" dirty="0"/>
+              <a:t>It must be further noted that the model is correctly predicting “not-depressed.”  We can hypothesize that this is either an accident or that the model requires more complexity by adding more variables.</a:t>
             </a:r>
           </a:p>
         </p:txBody>
@@ -12623,14 +14281,35 @@
           <a:p>
             <a:r>
               <a:rPr lang="en-US" dirty="0"/>
-              <a:t>In short, the results of this  model are inconclusive, and further analysis is required either by adding variables, or using a different analytical technique.</a:t>
-            </a:r>
-          </a:p>
-          <a:p>
-            <a:r>
-              <a:rPr lang="en-US" dirty="0"/>
-              <a:t>Given that other published research has shown that poverty does affect depression, and the contradictions found in this analysis, it may be that the wrong technique was applied.  Therefore, recommend that the same variables be used with a different type of model.  One that involves a multivariate regression would seem the most favorable.</a:t>
-            </a:r>
+              <a:t>Two courses of action are recommended:  </a:t>
+            </a:r>
+          </a:p>
+          <a:p>
+            <a:pPr lvl="1"/>
+            <a:r>
+              <a:rPr lang="en-US" dirty="0"/>
+              <a:t>Conduct a thorough test on neural networks hyper-parameters, to confirm that changing these will not provide much more improvement to model.  Given that we have added to the complexity of the </a:t>
+            </a:r>
+            <a:r>
+              <a:rPr lang="en-US" dirty="0" err="1"/>
+              <a:t>nueral</a:t>
+            </a:r>
+            <a:r>
+              <a:rPr lang="en-US" dirty="0"/>
+              <a:t> network by adding two hidden layers with 300 neurons each, I do not expect to find much improvement by this course of action.  This is merely recommended to be systematic in testing.  Recommend using another NN algorithm to find optimal hyperparameters.  </a:t>
+            </a:r>
+          </a:p>
+          <a:p>
+            <a:pPr lvl="1"/>
+            <a:r>
+              <a:rPr lang="en-US" dirty="0"/>
+              <a:t>Conduct PCA of original dataset.  Objective is to improve prediction power by finding more variables or eliminating current variables.  Our main goal is to address misclassification of depressed” vs “</a:t>
+            </a:r>
+            <a:r>
+              <a:rPr lang="en-US"/>
+              <a:t>not-depressed”</a:t>
+            </a:r>
+            <a:endParaRPr lang="en-US" dirty="0"/>
           </a:p>
         </p:txBody>
       </p:sp>
@@ -13393,7 +15072,7 @@
         <p:spPr>
           <a:xfrm>
             <a:off x="4094161" y="975196"/>
-            <a:ext cx="3314700" cy="1151792"/>
+            <a:ext cx="3314700" cy="965747"/>
           </a:xfrm>
           <a:prstGeom prst="rect">
             <a:avLst/>
@@ -13434,7 +15113,7 @@
                   <a:schemeClr val="tx1"/>
                 </a:solidFill>
               </a:rPr>
-              <a:t>:  Decision Tree</a:t>
+              <a:t>:  Neural Network</a:t>
             </a:r>
           </a:p>
         </p:txBody>
@@ -13453,8 +15132,8 @@
         </p:nvSpPr>
         <p:spPr>
           <a:xfrm>
-            <a:off x="4094161" y="2590294"/>
-            <a:ext cx="3314700" cy="1151792"/>
+            <a:off x="3285428" y="2292853"/>
+            <a:ext cx="4774408" cy="2139350"/>
           </a:xfrm>
           <a:prstGeom prst="rect">
             <a:avLst/>
@@ -13487,7 +15166,7 @@
                   <a:schemeClr val="tx1"/>
                 </a:solidFill>
               </a:rPr>
-              <a:t>Estimator</a:t>
+              <a:t>Model</a:t>
             </a:r>
             <a:r>
               <a:rPr lang="en-US" dirty="0">
@@ -13497,13 +15176,16 @@
               </a:rPr>
               <a:t>:  </a:t>
             </a:r>
+          </a:p>
+          <a:p>
+            <a:pPr algn="ctr"/>
             <a:r>
               <a:rPr lang="en-US" dirty="0" err="1">
                 <a:solidFill>
                   <a:schemeClr val="tx1"/>
                 </a:solidFill>
               </a:rPr>
-              <a:t>DecisionTreeClassifier</a:t>
+              <a:t>keras.models.Sequential</a:t>
             </a:r>
             <a:r>
               <a:rPr lang="en-US" dirty="0">
@@ -13511,7 +15193,139 @@
                   <a:schemeClr val="tx1"/>
                 </a:solidFill>
               </a:rPr>
-              <a:t> from scikit-learn</a:t>
+              <a:t>()</a:t>
+            </a:r>
+          </a:p>
+          <a:p>
+            <a:pPr algn="ctr"/>
+            <a:r>
+              <a:rPr lang="en-US" dirty="0">
+                <a:solidFill>
+                  <a:schemeClr val="tx1"/>
+                </a:solidFill>
+              </a:rPr>
+              <a:t> from </a:t>
+            </a:r>
+            <a:r>
+              <a:rPr lang="en-US" dirty="0" err="1">
+                <a:solidFill>
+                  <a:schemeClr val="tx1"/>
+                </a:solidFill>
+              </a:rPr>
+              <a:t>Keras</a:t>
+            </a:r>
+            <a:r>
+              <a:rPr lang="en-US" dirty="0">
+                <a:solidFill>
+                  <a:schemeClr val="tx1"/>
+                </a:solidFill>
+              </a:rPr>
+              <a:t> library</a:t>
+            </a:r>
+          </a:p>
+          <a:p>
+            <a:pPr algn="ctr"/>
+            <a:r>
+              <a:rPr lang="en-US" b="1" dirty="0">
+                <a:solidFill>
+                  <a:schemeClr val="tx1"/>
+                </a:solidFill>
+              </a:rPr>
+              <a:t>Input layer</a:t>
+            </a:r>
+            <a:r>
+              <a:rPr lang="en-US" dirty="0">
+                <a:solidFill>
+                  <a:schemeClr val="tx1"/>
+                </a:solidFill>
+              </a:rPr>
+              <a:t>:  3 neurons</a:t>
+            </a:r>
+          </a:p>
+          <a:p>
+            <a:pPr algn="ctr"/>
+            <a:r>
+              <a:rPr lang="en-US" b="1" dirty="0">
+                <a:solidFill>
+                  <a:schemeClr val="tx1"/>
+                </a:solidFill>
+              </a:rPr>
+              <a:t>Hidden layer</a:t>
+            </a:r>
+            <a:r>
+              <a:rPr lang="en-US" dirty="0">
+                <a:solidFill>
+                  <a:schemeClr val="tx1"/>
+                </a:solidFill>
+              </a:rPr>
+              <a:t>:  4 layers, 300 neurons.  Last layer 100 neurons.  Using “</a:t>
+            </a:r>
+            <a:r>
+              <a:rPr lang="en-US" dirty="0" err="1">
+                <a:solidFill>
+                  <a:schemeClr val="tx1"/>
+                </a:solidFill>
+              </a:rPr>
+              <a:t>relu</a:t>
+            </a:r>
+            <a:r>
+              <a:rPr lang="en-US" dirty="0">
+                <a:solidFill>
+                  <a:schemeClr val="tx1"/>
+                </a:solidFill>
+              </a:rPr>
+              <a:t>” for activation function</a:t>
+            </a:r>
+          </a:p>
+          <a:p>
+            <a:pPr algn="ctr"/>
+            <a:r>
+              <a:rPr lang="en-US" b="1" dirty="0">
+                <a:solidFill>
+                  <a:schemeClr val="tx1"/>
+                </a:solidFill>
+              </a:rPr>
+              <a:t>Output</a:t>
+            </a:r>
+            <a:r>
+              <a:rPr lang="en-US" dirty="0">
+                <a:solidFill>
+                  <a:schemeClr val="tx1"/>
+                </a:solidFill>
+              </a:rPr>
+              <a:t> </a:t>
+            </a:r>
+            <a:r>
+              <a:rPr lang="en-US" b="1" dirty="0">
+                <a:solidFill>
+                  <a:schemeClr val="tx1"/>
+                </a:solidFill>
+              </a:rPr>
+              <a:t>layer:  </a:t>
+            </a:r>
+            <a:r>
+              <a:rPr lang="en-US" dirty="0">
+                <a:solidFill>
+                  <a:schemeClr val="tx1"/>
+                </a:solidFill>
+              </a:rPr>
+              <a:t>2 neurons, “</a:t>
+            </a:r>
+            <a:r>
+              <a:rPr lang="en-US" dirty="0" err="1">
+                <a:solidFill>
+                  <a:schemeClr val="tx1"/>
+                </a:solidFill>
+              </a:rPr>
+              <a:t>softmax</a:t>
+            </a:r>
+            <a:r>
+              <a:rPr lang="en-US" dirty="0">
+                <a:solidFill>
+                  <a:schemeClr val="tx1"/>
+                </a:solidFill>
+              </a:rPr>
+              <a:t>” for activation.</a:t>
             </a:r>
           </a:p>
         </p:txBody>
@@ -13530,8 +15344,8 @@
         </p:nvSpPr>
         <p:spPr>
           <a:xfrm>
-            <a:off x="4094161" y="4188763"/>
-            <a:ext cx="3314700" cy="1473273"/>
+            <a:off x="3009834" y="4775127"/>
+            <a:ext cx="5404761" cy="1473273"/>
           </a:xfrm>
           <a:prstGeom prst="rect">
             <a:avLst/>
@@ -13583,7 +15397,7 @@
                   <a:schemeClr val="tx1"/>
                 </a:solidFill>
               </a:rPr>
-              <a:t>Split Data into data frame with dependent variable, and independent variables.  Split data into training and testing data sets</a:t>
+              <a:t>Split Data into data frame with dependent variable, and independent variables.  Split data into training, validation, and testing data sets</a:t>
             </a:r>
             <a:endParaRPr lang="en-US" u="sng" dirty="0">
               <a:solidFill>
@@ -13649,14 +15463,13 @@
           </p:cNvPr>
           <p:cNvCxnSpPr>
             <a:cxnSpLocks/>
-            <a:endCxn id="10" idx="0"/>
           </p:cNvCxnSpPr>
           <p:nvPr/>
         </p:nvCxnSpPr>
         <p:spPr>
           <a:xfrm>
-            <a:off x="5745649" y="2126988"/>
-            <a:ext cx="5862" cy="463306"/>
+            <a:off x="5759486" y="4483680"/>
+            <a:ext cx="0" cy="308938"/>
           </a:xfrm>
           <a:prstGeom prst="straightConnector1">
             <a:avLst/>
@@ -13699,8 +15512,8 @@
         </p:nvCxnSpPr>
         <p:spPr>
           <a:xfrm>
-            <a:off x="5745649" y="3742086"/>
-            <a:ext cx="0" cy="463306"/>
+            <a:off x="5745649" y="1946022"/>
+            <a:ext cx="0" cy="346831"/>
           </a:xfrm>
           <a:prstGeom prst="straightConnector1">
             <a:avLst/>
@@ -13743,8 +15556,8 @@
         </p:nvCxnSpPr>
         <p:spPr>
           <a:xfrm>
-            <a:off x="5749974" y="5662036"/>
-            <a:ext cx="0" cy="763702"/>
+            <a:off x="5759486" y="6248400"/>
+            <a:ext cx="0" cy="298817"/>
           </a:xfrm>
           <a:prstGeom prst="straightConnector1">
             <a:avLst/>
@@ -13843,8 +15656,8 @@
         </p:nvSpPr>
         <p:spPr>
           <a:xfrm>
-            <a:off x="4094161" y="975196"/>
-            <a:ext cx="3314700" cy="928419"/>
+            <a:off x="3509880" y="957352"/>
+            <a:ext cx="4676587" cy="1866819"/>
           </a:xfrm>
           <a:prstGeom prst="rect">
             <a:avLst/>
@@ -13877,7 +15690,7 @@
                   <a:schemeClr val="tx1"/>
                 </a:solidFill>
               </a:rPr>
-              <a:t>Train Estimator</a:t>
+              <a:t>Training and validation</a:t>
             </a:r>
             <a:r>
               <a:rPr lang="en-US" dirty="0">
@@ -13896,7 +15709,51 @@
                   <a:schemeClr val="tx1"/>
                 </a:solidFill>
               </a:rPr>
-              <a:t>Use training set</a:t>
+              <a:t>Use training and validation sets</a:t>
+            </a:r>
+          </a:p>
+          <a:p>
+            <a:pPr algn="ctr"/>
+            <a:r>
+              <a:rPr lang="en-US" dirty="0">
+                <a:solidFill>
+                  <a:schemeClr val="tx1"/>
+                </a:solidFill>
+              </a:rPr>
+              <a:t>Loss function:  sparse categorical cross entropy</a:t>
+            </a:r>
+          </a:p>
+          <a:p>
+            <a:pPr algn="ctr"/>
+            <a:r>
+              <a:rPr lang="en-US" dirty="0">
+                <a:solidFill>
+                  <a:schemeClr val="tx1"/>
+                </a:solidFill>
+              </a:rPr>
+              <a:t>Optimizer:  gradient descent</a:t>
+            </a:r>
+          </a:p>
+          <a:p>
+            <a:pPr algn="ctr"/>
+            <a:r>
+              <a:rPr lang="en-US" dirty="0">
+                <a:solidFill>
+                  <a:schemeClr val="tx1"/>
+                </a:solidFill>
+              </a:rPr>
+              <a:t>Epochs:  50</a:t>
+            </a:r>
+          </a:p>
+          <a:p>
+            <a:pPr algn="ctr"/>
+            <a:r>
+              <a:rPr lang="en-US" dirty="0">
+                <a:solidFill>
+                  <a:schemeClr val="tx1"/>
+                </a:solidFill>
+              </a:rPr>
+              <a:t>Batch size:  32</a:t>
             </a:r>
           </a:p>
         </p:txBody>
@@ -13915,7 +15772,7 @@
         </p:nvSpPr>
         <p:spPr>
           <a:xfrm>
-            <a:off x="4094161" y="2331585"/>
+            <a:off x="4094161" y="3271861"/>
             <a:ext cx="3314700" cy="1151792"/>
           </a:xfrm>
           <a:prstGeom prst="rect">
@@ -13949,7 +15806,7 @@
                   <a:schemeClr val="tx1"/>
                 </a:solidFill>
               </a:rPr>
-              <a:t>Test Estimator</a:t>
+              <a:t>Test Model</a:t>
             </a:r>
             <a:r>
               <a:rPr lang="en-US" dirty="0">
@@ -13987,8 +15844,8 @@
         </p:nvSpPr>
         <p:spPr>
           <a:xfrm>
-            <a:off x="4094161" y="3931066"/>
-            <a:ext cx="3314700" cy="1438956"/>
+            <a:off x="2739818" y="4871342"/>
+            <a:ext cx="6076386" cy="1438956"/>
           </a:xfrm>
           <a:prstGeom prst="rect">
             <a:avLst/>
@@ -14021,7 +15878,7 @@
                   <a:schemeClr val="tx1"/>
                 </a:solidFill>
               </a:rPr>
-              <a:t>Assess Model Performance</a:t>
+              <a:t>Assess Model Performance Metrics</a:t>
             </a:r>
             <a:r>
               <a:rPr lang="en-US" dirty="0">
@@ -14040,7 +15897,7 @@
                   <a:schemeClr val="tx1"/>
                 </a:solidFill>
               </a:rPr>
-              <a:t>Accuracy score</a:t>
+              <a:t>Loss, accuracy, validation loss, and validation-accuracy</a:t>
             </a:r>
           </a:p>
           <a:p>
@@ -14051,24 +15908,8 @@
                   <a:schemeClr val="tx1"/>
                 </a:solidFill>
               </a:rPr>
-              <a:t>Precision score</a:t>
-            </a:r>
-          </a:p>
-          <a:p>
-            <a:pPr algn="ctr"/>
-            <a:r>
-              <a:rPr lang="en-US" dirty="0">
-                <a:solidFill>
-                  <a:schemeClr val="tx1"/>
-                </a:solidFill>
-              </a:rPr>
-              <a:t>Recall Score</a:t>
-            </a:r>
-            <a:endParaRPr lang="en-US" u="sng" dirty="0">
-              <a:solidFill>
-                <a:schemeClr val="tx1"/>
-              </a:solidFill>
-            </a:endParaRPr>
+              <a:t>Probability of predictions</a:t>
+            </a:r>
           </a:p>
         </p:txBody>
       </p:sp>
@@ -14083,13 +15924,12 @@
           </p:cNvPr>
           <p:cNvCxnSpPr>
             <a:cxnSpLocks/>
-            <a:endCxn id="9" idx="0"/>
           </p:cNvCxnSpPr>
           <p:nvPr/>
         </p:nvCxnSpPr>
         <p:spPr>
           <a:xfrm>
-            <a:off x="5745649" y="681645"/>
+            <a:off x="5745649" y="707518"/>
             <a:ext cx="5862" cy="293551"/>
           </a:xfrm>
           <a:prstGeom prst="straightConnector1">
@@ -14133,7 +15973,7 @@
         </p:nvCxnSpPr>
         <p:spPr>
           <a:xfrm>
-            <a:off x="5745649" y="1895301"/>
+            <a:off x="5771527" y="2852835"/>
             <a:ext cx="5862" cy="463306"/>
           </a:xfrm>
           <a:prstGeom prst="straightConnector1">
@@ -14177,7 +16017,7 @@
         </p:nvCxnSpPr>
         <p:spPr>
           <a:xfrm>
-            <a:off x="5745649" y="3492702"/>
+            <a:off x="5771527" y="4432978"/>
             <a:ext cx="0" cy="463306"/>
           </a:xfrm>
           <a:prstGeom prst="straightConnector1">
@@ -14221,7 +16061,7 @@
         </p:nvCxnSpPr>
         <p:spPr>
           <a:xfrm>
-            <a:off x="5740102" y="5374150"/>
+            <a:off x="5765980" y="6314426"/>
             <a:ext cx="0" cy="463306"/>
           </a:xfrm>
           <a:prstGeom prst="straightConnector1">
@@ -14321,8 +16161,8 @@
         </p:nvSpPr>
         <p:spPr>
           <a:xfrm>
-            <a:off x="4094161" y="2080790"/>
-            <a:ext cx="3314700" cy="928419"/>
+            <a:off x="2676331" y="2072160"/>
+            <a:ext cx="6355526" cy="1946333"/>
           </a:xfrm>
           <a:prstGeom prst="rect">
             <a:avLst/>
@@ -14374,7 +16214,7 @@
                   <a:schemeClr val="tx1"/>
                 </a:solidFill>
               </a:rPr>
-              <a:t>Histogram of predictions</a:t>
+              <a:t>Results of Loss, accuracy, validation loss, and validation-accuracy</a:t>
             </a:r>
           </a:p>
           <a:p>
@@ -14385,7 +16225,18 @@
                   <a:schemeClr val="tx1"/>
                 </a:solidFill>
               </a:rPr>
-              <a:t>Plot of Decision Tree </a:t>
+              <a:t>Plot of Confusion Matrix</a:t>
+            </a:r>
+          </a:p>
+          <a:p>
+            <a:pPr algn="ctr"/>
+            <a:r>
+              <a:rPr lang="en-US" dirty="0">
+                <a:solidFill>
+                  <a:schemeClr val="tx1"/>
+                </a:solidFill>
+              </a:rPr>
+              <a:t>Plot of NN</a:t>
             </a:r>
           </a:p>
         </p:txBody>
@@ -14404,7 +16255,7 @@
         </p:nvSpPr>
         <p:spPr>
           <a:xfrm>
-            <a:off x="4094161" y="3437179"/>
+            <a:off x="4094161" y="4446463"/>
             <a:ext cx="3314700" cy="1151792"/>
           </a:xfrm>
           <a:prstGeom prst="rect">
@@ -14473,13 +16324,12 @@
           </p:cNvPr>
           <p:cNvCxnSpPr>
             <a:cxnSpLocks/>
-            <a:endCxn id="9" idx="0"/>
           </p:cNvCxnSpPr>
           <p:nvPr/>
         </p:nvCxnSpPr>
         <p:spPr>
           <a:xfrm>
-            <a:off x="5745649" y="1787239"/>
+            <a:off x="5745649" y="1778609"/>
             <a:ext cx="5862" cy="293551"/>
           </a:xfrm>
           <a:prstGeom prst="straightConnector1">
@@ -14523,7 +16373,7 @@
         </p:nvCxnSpPr>
         <p:spPr>
           <a:xfrm>
-            <a:off x="5745649" y="3000895"/>
+            <a:off x="5745649" y="4010179"/>
             <a:ext cx="5862" cy="463306"/>
           </a:xfrm>
           <a:prstGeom prst="straightConnector1">
@@ -15109,6 +16959,23 @@
 </file>
 
 <file path=customXml/item1.xml><?xml version="1.0" encoding="utf-8"?>
+<?mso-contentType ?>
+<FormTemplates xmlns="http://schemas.microsoft.com/sharepoint/v3/contenttype/forms">
+  <Display>DocumentLibraryForm</Display>
+  <Edit>DocumentLibraryForm</Edit>
+  <New>DocumentLibraryForm</New>
+</FormTemplates>
+</file>
+
+<file path=customXml/item2.xml><?xml version="1.0" encoding="utf-8"?>
+<p:properties xmlns:p="http://schemas.microsoft.com/office/2006/metadata/properties" xmlns:xsi="http://www.w3.org/2001/XMLSchema-instance" xmlns:pc="http://schemas.microsoft.com/office/infopath/2007/PartnerControls">
+  <documentManagement>
+    <MediaServiceKeyPoints xmlns="71af3243-3dd4-4a8d-8c0d-dd76da1f02a5" xsi:nil="true"/>
+  </documentManagement>
+</p:properties>
+</file>
+
+<file path=customXml/item3.xml><?xml version="1.0" encoding="utf-8"?>
 <ct:contentTypeSchema xmlns:ct="http://schemas.microsoft.com/office/2006/metadata/contentType" xmlns:ma="http://schemas.microsoft.com/office/2006/metadata/properties/metaAttributes" ct:_="" ma:_="" ma:contentTypeName="Document" ma:contentTypeID="0x01010079F111ED35F8CC479449609E8A0923A6" ma:contentTypeVersion="11" ma:contentTypeDescription="Create a new document." ma:contentTypeScope="" ma:versionID="9677210f24a1be23c92c90fd886aa0aa">
   <xsd:schema xmlns:xsd="http://www.w3.org/2001/XMLSchema" xmlns:xs="http://www.w3.org/2001/XMLSchema" xmlns:p="http://schemas.microsoft.com/office/2006/metadata/properties" xmlns:ns2="71af3243-3dd4-4a8d-8c0d-dd76da1f02a5" xmlns:ns3="16c05727-aa75-4e4a-9b5f-8a80a1165891" targetNamespace="http://schemas.microsoft.com/office/2006/metadata/properties" ma:root="true" ma:fieldsID="60e05723c5c1908df1a1a4ebf11d344e" ns2:_="" ns3:_="">
     <xsd:import namespace="71af3243-3dd4-4a8d-8c0d-dd76da1f02a5"/>
@@ -15319,24 +17186,25 @@
 </ct:contentTypeSchema>
 </file>
 
-<file path=customXml/item2.xml><?xml version="1.0" encoding="utf-8"?>
-<?mso-contentType ?>
-<FormTemplates xmlns="http://schemas.microsoft.com/sharepoint/v3/contenttype/forms">
-  <Display>DocumentLibraryForm</Display>
-  <Edit>DocumentLibraryForm</Edit>
-  <New>DocumentLibraryForm</New>
-</FormTemplates>
+<file path=customXml/itemProps1.xml><?xml version="1.0" encoding="utf-8"?>
+<ds:datastoreItem xmlns:ds="http://schemas.openxmlformats.org/officeDocument/2006/customXml" ds:itemID="{FE57094B-4684-420B-AFE0-4E41CA2AF714}">
+  <ds:schemaRefs>
+    <ds:schemaRef ds:uri="http://schemas.microsoft.com/sharepoint/v3/contenttype/forms"/>
+  </ds:schemaRefs>
+</ds:datastoreItem>
 </file>
 
-<file path=customXml/item3.xml><?xml version="1.0" encoding="utf-8"?>
-<p:properties xmlns:p="http://schemas.microsoft.com/office/2006/metadata/properties" xmlns:xsi="http://www.w3.org/2001/XMLSchema-instance" xmlns:pc="http://schemas.microsoft.com/office/infopath/2007/PartnerControls">
-  <documentManagement>
-    <MediaServiceKeyPoints xmlns="71af3243-3dd4-4a8d-8c0d-dd76da1f02a5" xsi:nil="true"/>
-  </documentManagement>
-</p:properties>
+<file path=customXml/itemProps2.xml><?xml version="1.0" encoding="utf-8"?>
+<ds:datastoreItem xmlns:ds="http://schemas.openxmlformats.org/officeDocument/2006/customXml" ds:itemID="{B26D5668-1971-40BB-BC7C-94C9B101AAB7}">
+  <ds:schemaRefs>
+    <ds:schemaRef ds:uri="http://schemas.microsoft.com/office/2006/metadata/properties"/>
+    <ds:schemaRef ds:uri="http://schemas.microsoft.com/office/infopath/2007/PartnerControls"/>
+    <ds:schemaRef ds:uri="71af3243-3dd4-4a8d-8c0d-dd76da1f02a5"/>
+  </ds:schemaRefs>
+</ds:datastoreItem>
 </file>
 
-<file path=customXml/itemProps1.xml><?xml version="1.0" encoding="utf-8"?>
+<file path=customXml/itemProps3.xml><?xml version="1.0" encoding="utf-8"?>
 <ds:datastoreItem xmlns:ds="http://schemas.openxmlformats.org/officeDocument/2006/customXml" ds:itemID="{3370F4A1-FC59-4361-989F-6C79533DA565}">
   <ds:schemaRefs>
     <ds:schemaRef ds:uri="http://schemas.microsoft.com/office/2006/metadata/contentType"/>
@@ -15353,22 +17221,4 @@
     <ds:schemaRef ds:uri="http://schemas.microsoft.com/internal/obd"/>
   </ds:schemaRefs>
 </ds:datastoreItem>
-</file>
-
-<file path=customXml/itemProps2.xml><?xml version="1.0" encoding="utf-8"?>
-<ds:datastoreItem xmlns:ds="http://schemas.openxmlformats.org/officeDocument/2006/customXml" ds:itemID="{FE57094B-4684-420B-AFE0-4E41CA2AF714}">
-  <ds:schemaRefs>
-    <ds:schemaRef ds:uri="http://schemas.microsoft.com/sharepoint/v3/contenttype/forms"/>
-  </ds:schemaRefs>
-</ds:datastoreItem>
-</file>
-
-<file path=customXml/itemProps3.xml><?xml version="1.0" encoding="utf-8"?>
-<ds:datastoreItem xmlns:ds="http://schemas.openxmlformats.org/officeDocument/2006/customXml" ds:itemID="{B26D5668-1971-40BB-BC7C-94C9B101AAB7}">
-  <ds:schemaRefs>
-    <ds:schemaRef ds:uri="http://schemas.microsoft.com/office/2006/metadata/properties"/>
-    <ds:schemaRef ds:uri="http://schemas.microsoft.com/office/infopath/2007/PartnerControls"/>
-    <ds:schemaRef ds:uri="71af3243-3dd4-4a8d-8c0d-dd76da1f02a5"/>
-  </ds:schemaRefs>
-</ds:datastoreItem>
 </file>
</xml_diff>